<commit_message>
Continue work with presentation
</commit_message>
<xml_diff>
--- a/Presentation/2015 - Microsoft Azure.pptx
+++ b/Presentation/2015 - Microsoft Azure.pptx
@@ -332,6 +332,7 @@
             <c:showLeaderLines val="0"/>
             <c:extLst>
               <c:ext xmlns:c15="http://schemas.microsoft.com/office/drawing/2012/chart" uri="{CE6537A1-D6FC-4f65-9D91-7224C49458BB}">
+                <c15:layout/>
                 <c15:showLeaderLines val="1"/>
                 <c15:leaderLines>
                   <c:spPr>
@@ -475,6 +476,7 @@
             <c:showLeaderLines val="0"/>
             <c:extLst>
               <c:ext xmlns:c15="http://schemas.microsoft.com/office/drawing/2012/chart" uri="{CE6537A1-D6FC-4f65-9D91-7224C49458BB}">
+                <c15:layout/>
                 <c15:showLeaderLines val="1"/>
                 <c15:leaderLines>
                   <c:spPr>
@@ -618,6 +620,7 @@
             <c:showLeaderLines val="0"/>
             <c:extLst>
               <c:ext xmlns:c15="http://schemas.microsoft.com/office/drawing/2012/chart" uri="{CE6537A1-D6FC-4f65-9D91-7224C49458BB}">
+                <c15:layout/>
                 <c15:showLeaderLines val="1"/>
                 <c15:leaderLines>
                   <c:spPr>
@@ -706,12 +709,12 @@
         </c:dLbls>
         <c:gapWidth val="150"/>
         <c:shape val="box"/>
-        <c:axId val="-1741705296"/>
-        <c:axId val="-1741708016"/>
+        <c:axId val="-1923831984"/>
+        <c:axId val="-1923839600"/>
         <c:axId val="0"/>
       </c:bar3DChart>
       <c:catAx>
-        <c:axId val="-1741705296"/>
+        <c:axId val="-1923831984"/>
         <c:scaling>
           <c:orientation val="minMax"/>
         </c:scaling>
@@ -762,7 +765,7 @@
             <a:endParaRPr lang="ru-RU"/>
           </a:p>
         </c:txPr>
-        <c:crossAx val="-1741708016"/>
+        <c:crossAx val="-1923839600"/>
         <c:crosses val="autoZero"/>
         <c:auto val="1"/>
         <c:lblAlgn val="ctr"/>
@@ -770,7 +773,7 @@
         <c:noMultiLvlLbl val="0"/>
       </c:catAx>
       <c:valAx>
-        <c:axId val="-1741708016"/>
+        <c:axId val="-1923839600"/>
         <c:scaling>
           <c:orientation val="minMax"/>
           <c:max val="1"/>
@@ -824,7 +827,7 @@
             <a:endParaRPr lang="ru-RU"/>
           </a:p>
         </c:txPr>
-        <c:crossAx val="-1741705296"/>
+        <c:crossAx val="-1923831984"/>
         <c:crosses val="autoZero"/>
         <c:crossBetween val="between"/>
       </c:valAx>
@@ -959,6 +962,7 @@
           </a:p>
         </c:rich>
       </c:tx>
+      <c:layout/>
       <c:overlay val="0"/>
       <c:spPr>
         <a:noFill/>
@@ -1060,6 +1064,7 @@
             <c:showLeaderLines val="0"/>
             <c:extLst>
               <c:ext xmlns:c15="http://schemas.microsoft.com/office/drawing/2012/chart" uri="{CE6537A1-D6FC-4f65-9D91-7224C49458BB}">
+                <c15:layout/>
                 <c15:showLeaderLines val="1"/>
                 <c15:leaderLines>
                   <c:spPr>
@@ -1167,6 +1172,7 @@
             <c:showLeaderLines val="0"/>
             <c:extLst>
               <c:ext xmlns:c15="http://schemas.microsoft.com/office/drawing/2012/chart" uri="{CE6537A1-D6FC-4f65-9D91-7224C49458BB}">
+                <c15:layout/>
                 <c15:showLeaderLines val="1"/>
                 <c15:leaderLines>
                   <c:spPr>
@@ -1274,6 +1280,7 @@
             <c:showLeaderLines val="0"/>
             <c:extLst>
               <c:ext xmlns:c15="http://schemas.microsoft.com/office/drawing/2012/chart" uri="{CE6537A1-D6FC-4f65-9D91-7224C49458BB}">
+                <c15:layout/>
                 <c15:showLeaderLines val="1"/>
                 <c15:leaderLines>
                   <c:spPr>
@@ -1381,6 +1388,7 @@
             <c:showLeaderLines val="0"/>
             <c:extLst>
               <c:ext xmlns:c15="http://schemas.microsoft.com/office/drawing/2012/chart" uri="{CE6537A1-D6FC-4f65-9D91-7224C49458BB}">
+                <c15:layout/>
                 <c15:showLeaderLines val="1"/>
                 <c15:leaderLines>
                   <c:spPr>
@@ -1433,11 +1441,11 @@
         </c:dLbls>
         <c:gapWidth val="219"/>
         <c:overlap val="-27"/>
-        <c:axId val="-1741703664"/>
-        <c:axId val="-1741702576"/>
+        <c:axId val="-1923839056"/>
+        <c:axId val="-1923837424"/>
       </c:barChart>
       <c:catAx>
-        <c:axId val="-1741703664"/>
+        <c:axId val="-1923839056"/>
         <c:scaling>
           <c:orientation val="minMax"/>
         </c:scaling>
@@ -1480,7 +1488,7 @@
             <a:endParaRPr lang="ru-RU"/>
           </a:p>
         </c:txPr>
-        <c:crossAx val="-1741702576"/>
+        <c:crossAx val="-1923837424"/>
         <c:crosses val="autoZero"/>
         <c:auto val="1"/>
         <c:lblAlgn val="ctr"/>
@@ -1488,7 +1496,7 @@
         <c:noMultiLvlLbl val="0"/>
       </c:catAx>
       <c:valAx>
-        <c:axId val="-1741702576"/>
+        <c:axId val="-1923837424"/>
         <c:scaling>
           <c:orientation val="minMax"/>
         </c:scaling>
@@ -1539,7 +1547,7 @@
             <a:endParaRPr lang="ru-RU"/>
           </a:p>
         </c:txPr>
-        <c:crossAx val="-1741703664"/>
+        <c:crossAx val="-1923839056"/>
         <c:crosses val="autoZero"/>
         <c:crossBetween val="between"/>
         <c:majorUnit val="1"/>
@@ -1554,6 +1562,7 @@
     </c:plotArea>
     <c:legend>
       <c:legendPos val="b"/>
+      <c:layout/>
       <c:overlay val="0"/>
       <c:spPr>
         <a:noFill/>
@@ -1655,6 +1664,7 @@
           </a:p>
         </c:rich>
       </c:tx>
+      <c:layout/>
       <c:overlay val="0"/>
       <c:spPr>
         <a:noFill/>
@@ -1756,6 +1766,7 @@
             <c:showLeaderLines val="0"/>
             <c:extLst>
               <c:ext xmlns:c15="http://schemas.microsoft.com/office/drawing/2012/chart" uri="{CE6537A1-D6FC-4f65-9D91-7224C49458BB}">
+                <c15:layout/>
                 <c15:showLeaderLines val="1"/>
                 <c15:leaderLines>
                   <c:spPr>
@@ -1863,6 +1874,7 @@
             <c:showLeaderLines val="0"/>
             <c:extLst>
               <c:ext xmlns:c15="http://schemas.microsoft.com/office/drawing/2012/chart" uri="{CE6537A1-D6FC-4f65-9D91-7224C49458BB}">
+                <c15:layout/>
                 <c15:showLeaderLines val="1"/>
                 <c15:leaderLines>
                   <c:spPr>
@@ -1970,6 +1982,7 @@
             <c:showLeaderLines val="0"/>
             <c:extLst>
               <c:ext xmlns:c15="http://schemas.microsoft.com/office/drawing/2012/chart" uri="{CE6537A1-D6FC-4f65-9D91-7224C49458BB}">
+                <c15:layout/>
                 <c15:showLeaderLines val="1"/>
                 <c15:leaderLines>
                   <c:spPr>
@@ -2077,6 +2090,7 @@
             <c:showLeaderLines val="0"/>
             <c:extLst>
               <c:ext xmlns:c15="http://schemas.microsoft.com/office/drawing/2012/chart" uri="{CE6537A1-D6FC-4f65-9D91-7224C49458BB}">
+                <c15:layout/>
                 <c15:showLeaderLines val="1"/>
                 <c15:leaderLines>
                   <c:spPr>
@@ -2129,11 +2143,11 @@
         </c:dLbls>
         <c:gapWidth val="219"/>
         <c:overlap val="-27"/>
-        <c:axId val="-1741704208"/>
-        <c:axId val="-1741710736"/>
+        <c:axId val="-1923831440"/>
+        <c:axId val="-1923844496"/>
       </c:barChart>
       <c:catAx>
-        <c:axId val="-1741704208"/>
+        <c:axId val="-1923831440"/>
         <c:scaling>
           <c:orientation val="minMax"/>
         </c:scaling>
@@ -2176,7 +2190,7 @@
             <a:endParaRPr lang="ru-RU"/>
           </a:p>
         </c:txPr>
-        <c:crossAx val="-1741710736"/>
+        <c:crossAx val="-1923844496"/>
         <c:crosses val="autoZero"/>
         <c:auto val="1"/>
         <c:lblAlgn val="ctr"/>
@@ -2184,7 +2198,7 @@
         <c:noMultiLvlLbl val="0"/>
       </c:catAx>
       <c:valAx>
-        <c:axId val="-1741710736"/>
+        <c:axId val="-1923844496"/>
         <c:scaling>
           <c:orientation val="minMax"/>
         </c:scaling>
@@ -2235,7 +2249,7 @@
             <a:endParaRPr lang="ru-RU"/>
           </a:p>
         </c:txPr>
-        <c:crossAx val="-1741704208"/>
+        <c:crossAx val="-1923831440"/>
         <c:crosses val="autoZero"/>
         <c:crossBetween val="between"/>
       </c:valAx>
@@ -2249,6 +2263,7 @@
     </c:plotArea>
     <c:legend>
       <c:legendPos val="b"/>
+      <c:layout/>
       <c:overlay val="0"/>
       <c:spPr>
         <a:noFill/>
@@ -2351,6 +2366,7 @@
           </a:p>
         </c:rich>
       </c:tx>
+      <c:layout/>
       <c:overlay val="0"/>
       <c:spPr>
         <a:noFill/>
@@ -2546,6 +2562,7 @@
           <c:dLbls>
             <c:dLbl>
               <c:idx val="0"/>
+              <c:layout/>
               <c:numFmt formatCode="0%" sourceLinked="0"/>
               <c:spPr>
                 <a:solidFill>
@@ -2596,11 +2613,14 @@
               <c:showPercent val="0"/>
               <c:showBubbleSize val="0"/>
               <c:extLst>
-                <c:ext xmlns:c15="http://schemas.microsoft.com/office/drawing/2012/chart" uri="{CE6537A1-D6FC-4f65-9D91-7224C49458BB}"/>
+                <c:ext xmlns:c15="http://schemas.microsoft.com/office/drawing/2012/chart" uri="{CE6537A1-D6FC-4f65-9D91-7224C49458BB}">
+                  <c15:layout/>
+                </c:ext>
               </c:extLst>
             </c:dLbl>
             <c:dLbl>
               <c:idx val="1"/>
+              <c:layout/>
               <c:numFmt formatCode="0%" sourceLinked="0"/>
               <c:spPr>
                 <a:solidFill>
@@ -2651,11 +2671,14 @@
               <c:showPercent val="0"/>
               <c:showBubbleSize val="0"/>
               <c:extLst>
-                <c:ext xmlns:c15="http://schemas.microsoft.com/office/drawing/2012/chart" uri="{CE6537A1-D6FC-4f65-9D91-7224C49458BB}"/>
+                <c:ext xmlns:c15="http://schemas.microsoft.com/office/drawing/2012/chart" uri="{CE6537A1-D6FC-4f65-9D91-7224C49458BB}">
+                  <c15:layout/>
+                </c:ext>
               </c:extLst>
             </c:dLbl>
             <c:dLbl>
               <c:idx val="2"/>
+              <c:layout/>
               <c:numFmt formatCode="0%" sourceLinked="0"/>
               <c:spPr>
                 <a:solidFill>
@@ -2706,7 +2729,9 @@
               <c:showPercent val="0"/>
               <c:showBubbleSize val="0"/>
               <c:extLst>
-                <c:ext xmlns:c15="http://schemas.microsoft.com/office/drawing/2012/chart" uri="{CE6537A1-D6FC-4f65-9D91-7224C49458BB}"/>
+                <c:ext xmlns:c15="http://schemas.microsoft.com/office/drawing/2012/chart" uri="{CE6537A1-D6FC-4f65-9D91-7224C49458BB}">
+                  <c15:layout/>
+                </c:ext>
               </c:extLst>
             </c:dLbl>
             <c:numFmt formatCode="0%" sourceLinked="0"/>
@@ -8825,8 +8850,8 @@
     <dgm:cxn modelId="{575B3600-AE0C-420F-8794-BCB16D1F06E9}" type="presOf" srcId="{A9FF98FB-0436-4A21-80D5-98984A5D7DEF}" destId="{2C989446-76CB-491D-A9E5-90C479CC1EB6}" srcOrd="0" destOrd="0" presId="urn:microsoft.com/office/officeart/2008/layout/RadialCluster"/>
     <dgm:cxn modelId="{25BE697C-FF0A-419D-B6D0-97D1FD6CF3AD}" type="presOf" srcId="{D723C67C-B8EF-4E8B-B78C-64AF01B8DE70}" destId="{42C5E428-457C-4D2D-B9F7-8D88B989BAC4}" srcOrd="0" destOrd="0" presId="urn:microsoft.com/office/officeart/2008/layout/RadialCluster"/>
     <dgm:cxn modelId="{A1C3788A-9CBD-4238-9560-BF12EBE8E844}" srcId="{318EB9F8-A3B4-4FA7-9997-4937EB56EAEC}" destId="{E401A207-D970-4540-A7D8-1D2DE637C704}" srcOrd="0" destOrd="0" parTransId="{663A62C9-9B3D-48E0-A3FC-618886457E72}" sibTransId="{6DFC798E-040C-44FF-A79A-A674AC8D6016}"/>
+    <dgm:cxn modelId="{3E39D600-3319-414C-AC04-E60BBD6480B0}" type="presOf" srcId="{1CA18002-A7AB-4BC8-AE26-63D7D0F48C28}" destId="{905EE044-8A93-48F4-B923-0A245442EAF2}" srcOrd="0" destOrd="0" presId="urn:microsoft.com/office/officeart/2008/layout/RadialCluster"/>
     <dgm:cxn modelId="{CCE361DE-2928-429E-AB70-57B21A35219B}" srcId="{E401A207-D970-4540-A7D8-1D2DE637C704}" destId="{CF41F630-8275-45B3-9FEF-10BF54F25AE4}" srcOrd="2" destOrd="0" parTransId="{5D132AE9-BFD6-4DFD-8F8E-F3F27B48509E}" sibTransId="{291DC6B3-14F8-4F12-8666-49622576D9A8}"/>
-    <dgm:cxn modelId="{3E39D600-3319-414C-AC04-E60BBD6480B0}" type="presOf" srcId="{1CA18002-A7AB-4BC8-AE26-63D7D0F48C28}" destId="{905EE044-8A93-48F4-B923-0A245442EAF2}" srcOrd="0" destOrd="0" presId="urn:microsoft.com/office/officeart/2008/layout/RadialCluster"/>
     <dgm:cxn modelId="{56F9A2B6-4CD9-4FAB-891D-7372F6270179}" type="presOf" srcId="{0D4F7F9C-13D9-41A2-91CB-B4D407DADAF8}" destId="{A1DBB35B-359C-44C1-948D-F0C4AB873D98}" srcOrd="0" destOrd="0" presId="urn:microsoft.com/office/officeart/2008/layout/RadialCluster"/>
     <dgm:cxn modelId="{5B482096-7B1A-4610-B289-1382C4FDA82F}" type="presParOf" srcId="{E837BDE3-383E-40B2-A6FC-7B4752AEE84C}" destId="{5447C531-E157-4A38-8E15-D58CFDE83DDB}" srcOrd="0" destOrd="0" presId="urn:microsoft.com/office/officeart/2008/layout/RadialCluster"/>
     <dgm:cxn modelId="{44A70410-ABF5-4E70-804C-59ECD011A6F3}" type="presParOf" srcId="{5447C531-E157-4A38-8E15-D58CFDE83DDB}" destId="{25056C25-FD7A-454A-BD80-5797A854A1C9}" srcOrd="0" destOrd="0" presId="urn:microsoft.com/office/officeart/2008/layout/RadialCluster"/>
@@ -8863,6 +8888,800 @@
       <dsp:cNvGrpSpPr/>
     </dsp:nvGrpSpPr>
     <dsp:grpSpPr/>
+    <dsp:sp modelId="{506CC8FD-2E26-4AE7-B13D-71BBCE420E2C}">
+      <dsp:nvSpPr>
+        <dsp:cNvPr id="0" name=""/>
+        <dsp:cNvSpPr/>
+      </dsp:nvSpPr>
+      <dsp:spPr>
+        <a:xfrm>
+          <a:off x="1724949" y="1204142"/>
+          <a:ext cx="915812" cy="915812"/>
+        </a:xfrm>
+        <a:prstGeom prst="ellipse">
+          <a:avLst/>
+        </a:prstGeom>
+        <a:solidFill>
+          <a:srgbClr val="92D050"/>
+        </a:solidFill>
+        <a:ln w="25400" cap="flat" cmpd="sng" algn="ctr">
+          <a:solidFill>
+            <a:schemeClr val="accent3">
+              <a:lumMod val="75000"/>
+            </a:schemeClr>
+          </a:solidFill>
+          <a:prstDash val="solid"/>
+        </a:ln>
+        <a:effectLst/>
+      </dsp:spPr>
+      <dsp:style>
+        <a:lnRef idx="2">
+          <a:scrgbClr r="0" g="0" b="0"/>
+        </a:lnRef>
+        <a:fillRef idx="1">
+          <a:scrgbClr r="0" g="0" b="0"/>
+        </a:fillRef>
+        <a:effectRef idx="0">
+          <a:scrgbClr r="0" g="0" b="0"/>
+        </a:effectRef>
+        <a:fontRef idx="minor">
+          <a:schemeClr val="lt1"/>
+        </a:fontRef>
+      </dsp:style>
+      <dsp:txBody>
+        <a:bodyPr spcFirstLastPara="0" vert="horz" wrap="square" lIns="12700" tIns="12700" rIns="12700" bIns="12700" numCol="1" spcCol="1270" anchor="ctr" anchorCtr="0">
+          <a:noAutofit/>
+        </a:bodyPr>
+        <a:lstStyle/>
+        <a:p>
+          <a:pPr lvl="0" algn="ctr" defTabSz="889000">
+            <a:lnSpc>
+              <a:spcPct val="90000"/>
+            </a:lnSpc>
+            <a:spcBef>
+              <a:spcPct val="0"/>
+            </a:spcBef>
+            <a:spcAft>
+              <a:spcPct val="35000"/>
+            </a:spcAft>
+          </a:pPr>
+          <a:r>
+            <a:rPr lang="en-US" sz="2000" kern="1200" dirty="0" smtClean="0"/>
+            <a:t>SaaS</a:t>
+          </a:r>
+          <a:endParaRPr lang="ru-RU" sz="2000" kern="1200" dirty="0"/>
+        </a:p>
+      </dsp:txBody>
+      <dsp:txXfrm>
+        <a:off x="1859067" y="1338260"/>
+        <a:ext cx="647576" cy="647576"/>
+      </dsp:txXfrm>
+    </dsp:sp>
+    <dsp:sp modelId="{BD3E845E-4D7C-4CE3-83BC-20831ED88AEC}">
+      <dsp:nvSpPr>
+        <dsp:cNvPr id="0" name=""/>
+        <dsp:cNvSpPr/>
+      </dsp:nvSpPr>
+      <dsp:spPr>
+        <a:xfrm rot="16200000">
+          <a:off x="2044493" y="1046901"/>
+          <a:ext cx="276723" cy="37759"/>
+        </a:xfrm>
+        <a:custGeom>
+          <a:avLst/>
+          <a:gdLst/>
+          <a:ahLst/>
+          <a:cxnLst/>
+          <a:rect l="0" t="0" r="0" b="0"/>
+          <a:pathLst>
+            <a:path>
+              <a:moveTo>
+                <a:pt x="0" y="18879"/>
+              </a:moveTo>
+              <a:lnTo>
+                <a:pt x="276723" y="18879"/>
+              </a:lnTo>
+            </a:path>
+          </a:pathLst>
+        </a:custGeom>
+        <a:noFill/>
+        <a:ln w="25400" cap="flat" cmpd="sng" algn="ctr">
+          <a:solidFill>
+            <a:schemeClr val="accent1">
+              <a:shade val="60000"/>
+              <a:hueOff val="0"/>
+              <a:satOff val="0"/>
+              <a:lumOff val="0"/>
+              <a:alphaOff val="0"/>
+            </a:schemeClr>
+          </a:solidFill>
+          <a:prstDash val="solid"/>
+        </a:ln>
+        <a:effectLst/>
+      </dsp:spPr>
+      <dsp:style>
+        <a:lnRef idx="2">
+          <a:scrgbClr r="0" g="0" b="0"/>
+        </a:lnRef>
+        <a:fillRef idx="0">
+          <a:scrgbClr r="0" g="0" b="0"/>
+        </a:fillRef>
+        <a:effectRef idx="0">
+          <a:scrgbClr r="0" g="0" b="0"/>
+        </a:effectRef>
+        <a:fontRef idx="minor"/>
+      </dsp:style>
+      <dsp:txBody>
+        <a:bodyPr spcFirstLastPara="0" vert="horz" wrap="square" lIns="12700" tIns="0" rIns="12700" bIns="0" numCol="1" spcCol="1270" anchor="ctr" anchorCtr="0">
+          <a:noAutofit/>
+        </a:bodyPr>
+        <a:lstStyle/>
+        <a:p>
+          <a:pPr lvl="0" algn="ctr" defTabSz="222250">
+            <a:lnSpc>
+              <a:spcPct val="90000"/>
+            </a:lnSpc>
+            <a:spcBef>
+              <a:spcPct val="0"/>
+            </a:spcBef>
+            <a:spcAft>
+              <a:spcPct val="35000"/>
+            </a:spcAft>
+          </a:pPr>
+          <a:endParaRPr lang="ru-RU" sz="500" kern="1200"/>
+        </a:p>
+      </dsp:txBody>
+      <dsp:txXfrm>
+        <a:off x="2175937" y="1058862"/>
+        <a:ext cx="13836" cy="13836"/>
+      </dsp:txXfrm>
+    </dsp:sp>
+    <dsp:sp modelId="{19A07A34-1010-48C6-A801-BD8D5D256EA9}">
+      <dsp:nvSpPr>
+        <dsp:cNvPr id="0" name=""/>
+        <dsp:cNvSpPr/>
+      </dsp:nvSpPr>
+      <dsp:spPr>
+        <a:xfrm>
+          <a:off x="1724949" y="11606"/>
+          <a:ext cx="915812" cy="915812"/>
+        </a:xfrm>
+        <a:prstGeom prst="ellipse">
+          <a:avLst/>
+        </a:prstGeom>
+        <a:solidFill>
+          <a:srgbClr val="00B0F0"/>
+        </a:solidFill>
+        <a:ln w="25400" cap="flat" cmpd="sng" algn="ctr">
+          <a:solidFill>
+            <a:schemeClr val="tx2">
+              <a:lumMod val="60000"/>
+              <a:lumOff val="40000"/>
+            </a:schemeClr>
+          </a:solidFill>
+          <a:prstDash val="solid"/>
+        </a:ln>
+        <a:effectLst/>
+      </dsp:spPr>
+      <dsp:style>
+        <a:lnRef idx="2">
+          <a:scrgbClr r="0" g="0" b="0"/>
+        </a:lnRef>
+        <a:fillRef idx="1">
+          <a:scrgbClr r="0" g="0" b="0"/>
+        </a:fillRef>
+        <a:effectRef idx="0">
+          <a:scrgbClr r="0" g="0" b="0"/>
+        </a:effectRef>
+        <a:fontRef idx="minor">
+          <a:schemeClr val="lt1"/>
+        </a:fontRef>
+      </dsp:style>
+      <dsp:txBody>
+        <a:bodyPr spcFirstLastPara="0" vert="horz" wrap="square" lIns="12700" tIns="12700" rIns="12700" bIns="12700" numCol="1" spcCol="1270" anchor="ctr" anchorCtr="0">
+          <a:noAutofit/>
+        </a:bodyPr>
+        <a:lstStyle/>
+        <a:p>
+          <a:pPr lvl="0" algn="ctr" defTabSz="889000">
+            <a:lnSpc>
+              <a:spcPct val="90000"/>
+            </a:lnSpc>
+            <a:spcBef>
+              <a:spcPct val="0"/>
+            </a:spcBef>
+            <a:spcAft>
+              <a:spcPct val="35000"/>
+            </a:spcAft>
+          </a:pPr>
+          <a:endParaRPr lang="ru-RU" sz="2000" kern="1200"/>
+        </a:p>
+      </dsp:txBody>
+      <dsp:txXfrm>
+        <a:off x="1859067" y="145724"/>
+        <a:ext cx="647576" cy="647576"/>
+      </dsp:txXfrm>
+    </dsp:sp>
+    <dsp:sp modelId="{A40744F3-8F59-4D61-9DF6-A37D24278559}">
+      <dsp:nvSpPr>
+        <dsp:cNvPr id="0" name=""/>
+        <dsp:cNvSpPr/>
+      </dsp:nvSpPr>
+      <dsp:spPr>
+        <a:xfrm rot="20520000">
+          <a:off x="2611578" y="1458912"/>
+          <a:ext cx="276723" cy="37759"/>
+        </a:xfrm>
+        <a:custGeom>
+          <a:avLst/>
+          <a:gdLst/>
+          <a:ahLst/>
+          <a:cxnLst/>
+          <a:rect l="0" t="0" r="0" b="0"/>
+          <a:pathLst>
+            <a:path>
+              <a:moveTo>
+                <a:pt x="0" y="18879"/>
+              </a:moveTo>
+              <a:lnTo>
+                <a:pt x="276723" y="18879"/>
+              </a:lnTo>
+            </a:path>
+          </a:pathLst>
+        </a:custGeom>
+        <a:noFill/>
+        <a:ln w="25400" cap="flat" cmpd="sng" algn="ctr">
+          <a:solidFill>
+            <a:schemeClr val="accent1">
+              <a:shade val="60000"/>
+              <a:hueOff val="0"/>
+              <a:satOff val="0"/>
+              <a:lumOff val="0"/>
+              <a:alphaOff val="0"/>
+            </a:schemeClr>
+          </a:solidFill>
+          <a:prstDash val="solid"/>
+        </a:ln>
+        <a:effectLst/>
+      </dsp:spPr>
+      <dsp:style>
+        <a:lnRef idx="2">
+          <a:scrgbClr r="0" g="0" b="0"/>
+        </a:lnRef>
+        <a:fillRef idx="0">
+          <a:scrgbClr r="0" g="0" b="0"/>
+        </a:fillRef>
+        <a:effectRef idx="0">
+          <a:scrgbClr r="0" g="0" b="0"/>
+        </a:effectRef>
+        <a:fontRef idx="minor"/>
+      </dsp:style>
+      <dsp:txBody>
+        <a:bodyPr spcFirstLastPara="0" vert="horz" wrap="square" lIns="12700" tIns="0" rIns="12700" bIns="0" numCol="1" spcCol="1270" anchor="ctr" anchorCtr="0">
+          <a:noAutofit/>
+        </a:bodyPr>
+        <a:lstStyle/>
+        <a:p>
+          <a:pPr lvl="0" algn="ctr" defTabSz="222250">
+            <a:lnSpc>
+              <a:spcPct val="90000"/>
+            </a:lnSpc>
+            <a:spcBef>
+              <a:spcPct val="0"/>
+            </a:spcBef>
+            <a:spcAft>
+              <a:spcPct val="35000"/>
+            </a:spcAft>
+          </a:pPr>
+          <a:endParaRPr lang="ru-RU" sz="500" kern="1200"/>
+        </a:p>
+      </dsp:txBody>
+      <dsp:txXfrm>
+        <a:off x="2743022" y="1470874"/>
+        <a:ext cx="13836" cy="13836"/>
+      </dsp:txXfrm>
+    </dsp:sp>
+    <dsp:sp modelId="{16A90822-693B-4AAA-A690-D1B7BBE713D3}">
+      <dsp:nvSpPr>
+        <dsp:cNvPr id="0" name=""/>
+        <dsp:cNvSpPr/>
+      </dsp:nvSpPr>
+      <dsp:spPr>
+        <a:xfrm>
+          <a:off x="2859118" y="835628"/>
+          <a:ext cx="915812" cy="915812"/>
+        </a:xfrm>
+        <a:prstGeom prst="ellipse">
+          <a:avLst/>
+        </a:prstGeom>
+        <a:solidFill>
+          <a:srgbClr val="00B0F0"/>
+        </a:solidFill>
+        <a:ln w="25400" cap="flat" cmpd="sng" algn="ctr">
+          <a:solidFill>
+            <a:schemeClr val="tx2">
+              <a:lumMod val="60000"/>
+              <a:lumOff val="40000"/>
+            </a:schemeClr>
+          </a:solidFill>
+          <a:prstDash val="solid"/>
+        </a:ln>
+        <a:effectLst/>
+      </dsp:spPr>
+      <dsp:style>
+        <a:lnRef idx="2">
+          <a:scrgbClr r="0" g="0" b="0"/>
+        </a:lnRef>
+        <a:fillRef idx="1">
+          <a:scrgbClr r="0" g="0" b="0"/>
+        </a:fillRef>
+        <a:effectRef idx="0">
+          <a:scrgbClr r="0" g="0" b="0"/>
+        </a:effectRef>
+        <a:fontRef idx="minor">
+          <a:schemeClr val="lt1"/>
+        </a:fontRef>
+      </dsp:style>
+      <dsp:txBody>
+        <a:bodyPr spcFirstLastPara="0" vert="horz" wrap="square" lIns="12700" tIns="12700" rIns="12700" bIns="12700" numCol="1" spcCol="1270" anchor="ctr" anchorCtr="0">
+          <a:noAutofit/>
+        </a:bodyPr>
+        <a:lstStyle/>
+        <a:p>
+          <a:pPr lvl="0" algn="ctr" defTabSz="889000">
+            <a:lnSpc>
+              <a:spcPct val="90000"/>
+            </a:lnSpc>
+            <a:spcBef>
+              <a:spcPct val="0"/>
+            </a:spcBef>
+            <a:spcAft>
+              <a:spcPct val="35000"/>
+            </a:spcAft>
+          </a:pPr>
+          <a:endParaRPr lang="ru-RU" sz="2000" kern="1200" dirty="0"/>
+        </a:p>
+      </dsp:txBody>
+      <dsp:txXfrm>
+        <a:off x="2993236" y="969746"/>
+        <a:ext cx="647576" cy="647576"/>
+      </dsp:txXfrm>
+    </dsp:sp>
+    <dsp:sp modelId="{0B2CB517-7DD7-48E1-8259-4393B3E0C3EC}">
+      <dsp:nvSpPr>
+        <dsp:cNvPr id="0" name=""/>
+        <dsp:cNvSpPr/>
+      </dsp:nvSpPr>
+      <dsp:spPr>
+        <a:xfrm rot="3240000">
+          <a:off x="2394971" y="2125560"/>
+          <a:ext cx="276723" cy="37759"/>
+        </a:xfrm>
+        <a:custGeom>
+          <a:avLst/>
+          <a:gdLst/>
+          <a:ahLst/>
+          <a:cxnLst/>
+          <a:rect l="0" t="0" r="0" b="0"/>
+          <a:pathLst>
+            <a:path>
+              <a:moveTo>
+                <a:pt x="0" y="18879"/>
+              </a:moveTo>
+              <a:lnTo>
+                <a:pt x="276723" y="18879"/>
+              </a:lnTo>
+            </a:path>
+          </a:pathLst>
+        </a:custGeom>
+        <a:noFill/>
+        <a:ln w="25400" cap="flat" cmpd="sng" algn="ctr">
+          <a:solidFill>
+            <a:schemeClr val="accent1">
+              <a:shade val="60000"/>
+              <a:hueOff val="0"/>
+              <a:satOff val="0"/>
+              <a:lumOff val="0"/>
+              <a:alphaOff val="0"/>
+            </a:schemeClr>
+          </a:solidFill>
+          <a:prstDash val="solid"/>
+        </a:ln>
+        <a:effectLst/>
+      </dsp:spPr>
+      <dsp:style>
+        <a:lnRef idx="2">
+          <a:scrgbClr r="0" g="0" b="0"/>
+        </a:lnRef>
+        <a:fillRef idx="0">
+          <a:scrgbClr r="0" g="0" b="0"/>
+        </a:fillRef>
+        <a:effectRef idx="0">
+          <a:scrgbClr r="0" g="0" b="0"/>
+        </a:effectRef>
+        <a:fontRef idx="minor"/>
+      </dsp:style>
+      <dsp:txBody>
+        <a:bodyPr spcFirstLastPara="0" vert="horz" wrap="square" lIns="12700" tIns="0" rIns="12700" bIns="0" numCol="1" spcCol="1270" anchor="ctr" anchorCtr="0">
+          <a:noAutofit/>
+        </a:bodyPr>
+        <a:lstStyle/>
+        <a:p>
+          <a:pPr lvl="0" algn="ctr" defTabSz="222250">
+            <a:lnSpc>
+              <a:spcPct val="90000"/>
+            </a:lnSpc>
+            <a:spcBef>
+              <a:spcPct val="0"/>
+            </a:spcBef>
+            <a:spcAft>
+              <a:spcPct val="35000"/>
+            </a:spcAft>
+          </a:pPr>
+          <a:endParaRPr lang="ru-RU" sz="500" kern="1200"/>
+        </a:p>
+      </dsp:txBody>
+      <dsp:txXfrm>
+        <a:off x="2526415" y="2137522"/>
+        <a:ext cx="13836" cy="13836"/>
+      </dsp:txXfrm>
+    </dsp:sp>
+    <dsp:sp modelId="{8F6D8065-965B-4A4F-B6F8-BDB592D2B4BF}">
+      <dsp:nvSpPr>
+        <dsp:cNvPr id="0" name=""/>
+        <dsp:cNvSpPr/>
+      </dsp:nvSpPr>
+      <dsp:spPr>
+        <a:xfrm>
+          <a:off x="2425904" y="2168924"/>
+          <a:ext cx="915812" cy="915812"/>
+        </a:xfrm>
+        <a:prstGeom prst="ellipse">
+          <a:avLst/>
+        </a:prstGeom>
+        <a:solidFill>
+          <a:srgbClr val="00B0F0"/>
+        </a:solidFill>
+        <a:ln w="25400" cap="flat" cmpd="sng" algn="ctr">
+          <a:solidFill>
+            <a:schemeClr val="tx2">
+              <a:lumMod val="60000"/>
+              <a:lumOff val="40000"/>
+            </a:schemeClr>
+          </a:solidFill>
+          <a:prstDash val="solid"/>
+        </a:ln>
+        <a:effectLst/>
+      </dsp:spPr>
+      <dsp:style>
+        <a:lnRef idx="2">
+          <a:scrgbClr r="0" g="0" b="0"/>
+        </a:lnRef>
+        <a:fillRef idx="1">
+          <a:scrgbClr r="0" g="0" b="0"/>
+        </a:fillRef>
+        <a:effectRef idx="0">
+          <a:scrgbClr r="0" g="0" b="0"/>
+        </a:effectRef>
+        <a:fontRef idx="minor">
+          <a:schemeClr val="lt1"/>
+        </a:fontRef>
+      </dsp:style>
+      <dsp:txBody>
+        <a:bodyPr spcFirstLastPara="0" vert="horz" wrap="square" lIns="12700" tIns="12700" rIns="12700" bIns="12700" numCol="1" spcCol="1270" anchor="ctr" anchorCtr="0">
+          <a:noAutofit/>
+        </a:bodyPr>
+        <a:lstStyle/>
+        <a:p>
+          <a:pPr lvl="0" algn="ctr" defTabSz="889000">
+            <a:lnSpc>
+              <a:spcPct val="90000"/>
+            </a:lnSpc>
+            <a:spcBef>
+              <a:spcPct val="0"/>
+            </a:spcBef>
+            <a:spcAft>
+              <a:spcPct val="35000"/>
+            </a:spcAft>
+          </a:pPr>
+          <a:endParaRPr lang="ru-RU" sz="2000" kern="1200"/>
+        </a:p>
+      </dsp:txBody>
+      <dsp:txXfrm>
+        <a:off x="2560022" y="2303042"/>
+        <a:ext cx="647576" cy="647576"/>
+      </dsp:txXfrm>
+    </dsp:sp>
+    <dsp:sp modelId="{9036BBB6-75F0-4F69-9249-B49C871EAD6A}">
+      <dsp:nvSpPr>
+        <dsp:cNvPr id="0" name=""/>
+        <dsp:cNvSpPr/>
+      </dsp:nvSpPr>
+      <dsp:spPr>
+        <a:xfrm rot="7560000">
+          <a:off x="1694016" y="2125560"/>
+          <a:ext cx="276723" cy="37759"/>
+        </a:xfrm>
+        <a:custGeom>
+          <a:avLst/>
+          <a:gdLst/>
+          <a:ahLst/>
+          <a:cxnLst/>
+          <a:rect l="0" t="0" r="0" b="0"/>
+          <a:pathLst>
+            <a:path>
+              <a:moveTo>
+                <a:pt x="0" y="18879"/>
+              </a:moveTo>
+              <a:lnTo>
+                <a:pt x="276723" y="18879"/>
+              </a:lnTo>
+            </a:path>
+          </a:pathLst>
+        </a:custGeom>
+        <a:noFill/>
+        <a:ln w="25400" cap="flat" cmpd="sng" algn="ctr">
+          <a:solidFill>
+            <a:schemeClr val="accent1">
+              <a:shade val="60000"/>
+              <a:hueOff val="0"/>
+              <a:satOff val="0"/>
+              <a:lumOff val="0"/>
+              <a:alphaOff val="0"/>
+            </a:schemeClr>
+          </a:solidFill>
+          <a:prstDash val="solid"/>
+        </a:ln>
+        <a:effectLst/>
+      </dsp:spPr>
+      <dsp:style>
+        <a:lnRef idx="2">
+          <a:scrgbClr r="0" g="0" b="0"/>
+        </a:lnRef>
+        <a:fillRef idx="0">
+          <a:scrgbClr r="0" g="0" b="0"/>
+        </a:fillRef>
+        <a:effectRef idx="0">
+          <a:scrgbClr r="0" g="0" b="0"/>
+        </a:effectRef>
+        <a:fontRef idx="minor"/>
+      </dsp:style>
+      <dsp:txBody>
+        <a:bodyPr spcFirstLastPara="0" vert="horz" wrap="square" lIns="12700" tIns="0" rIns="12700" bIns="0" numCol="1" spcCol="1270" anchor="ctr" anchorCtr="0">
+          <a:noAutofit/>
+        </a:bodyPr>
+        <a:lstStyle/>
+        <a:p>
+          <a:pPr lvl="0" algn="ctr" defTabSz="222250">
+            <a:lnSpc>
+              <a:spcPct val="90000"/>
+            </a:lnSpc>
+            <a:spcBef>
+              <a:spcPct val="0"/>
+            </a:spcBef>
+            <a:spcAft>
+              <a:spcPct val="35000"/>
+            </a:spcAft>
+          </a:pPr>
+          <a:endParaRPr lang="ru-RU" sz="500" kern="1200"/>
+        </a:p>
+      </dsp:txBody>
+      <dsp:txXfrm rot="10800000">
+        <a:off x="1825459" y="2137522"/>
+        <a:ext cx="13836" cy="13836"/>
+      </dsp:txXfrm>
+    </dsp:sp>
+    <dsp:sp modelId="{935A1F96-8C6B-4CB8-B151-B31C97F5597D}">
+      <dsp:nvSpPr>
+        <dsp:cNvPr id="0" name=""/>
+        <dsp:cNvSpPr/>
+      </dsp:nvSpPr>
+      <dsp:spPr>
+        <a:xfrm>
+          <a:off x="1023993" y="2168924"/>
+          <a:ext cx="915812" cy="915812"/>
+        </a:xfrm>
+        <a:prstGeom prst="ellipse">
+          <a:avLst/>
+        </a:prstGeom>
+        <a:solidFill>
+          <a:srgbClr val="00B0F0"/>
+        </a:solidFill>
+        <a:ln w="25400" cap="flat" cmpd="sng" algn="ctr">
+          <a:solidFill>
+            <a:schemeClr val="tx2">
+              <a:lumMod val="60000"/>
+              <a:lumOff val="40000"/>
+            </a:schemeClr>
+          </a:solidFill>
+          <a:prstDash val="solid"/>
+        </a:ln>
+        <a:effectLst/>
+      </dsp:spPr>
+      <dsp:style>
+        <a:lnRef idx="2">
+          <a:scrgbClr r="0" g="0" b="0"/>
+        </a:lnRef>
+        <a:fillRef idx="1">
+          <a:scrgbClr r="0" g="0" b="0"/>
+        </a:fillRef>
+        <a:effectRef idx="0">
+          <a:scrgbClr r="0" g="0" b="0"/>
+        </a:effectRef>
+        <a:fontRef idx="minor">
+          <a:schemeClr val="lt1"/>
+        </a:fontRef>
+      </dsp:style>
+      <dsp:txBody>
+        <a:bodyPr spcFirstLastPara="0" vert="horz" wrap="square" lIns="12700" tIns="12700" rIns="12700" bIns="12700" numCol="1" spcCol="1270" anchor="ctr" anchorCtr="0">
+          <a:noAutofit/>
+        </a:bodyPr>
+        <a:lstStyle/>
+        <a:p>
+          <a:pPr lvl="0" algn="ctr" defTabSz="889000">
+            <a:lnSpc>
+              <a:spcPct val="90000"/>
+            </a:lnSpc>
+            <a:spcBef>
+              <a:spcPct val="0"/>
+            </a:spcBef>
+            <a:spcAft>
+              <a:spcPct val="35000"/>
+            </a:spcAft>
+          </a:pPr>
+          <a:endParaRPr lang="ru-RU" sz="2000" kern="1200"/>
+        </a:p>
+      </dsp:txBody>
+      <dsp:txXfrm>
+        <a:off x="1158111" y="2303042"/>
+        <a:ext cx="647576" cy="647576"/>
+      </dsp:txXfrm>
+    </dsp:sp>
+    <dsp:sp modelId="{4DE8A120-1BCB-4D6E-B1F9-4BDCEC7C5779}">
+      <dsp:nvSpPr>
+        <dsp:cNvPr id="0" name=""/>
+        <dsp:cNvSpPr/>
+      </dsp:nvSpPr>
+      <dsp:spPr>
+        <a:xfrm rot="11880000">
+          <a:off x="1477409" y="1458912"/>
+          <a:ext cx="276723" cy="37759"/>
+        </a:xfrm>
+        <a:custGeom>
+          <a:avLst/>
+          <a:gdLst/>
+          <a:ahLst/>
+          <a:cxnLst/>
+          <a:rect l="0" t="0" r="0" b="0"/>
+          <a:pathLst>
+            <a:path>
+              <a:moveTo>
+                <a:pt x="0" y="18879"/>
+              </a:moveTo>
+              <a:lnTo>
+                <a:pt x="276723" y="18879"/>
+              </a:lnTo>
+            </a:path>
+          </a:pathLst>
+        </a:custGeom>
+        <a:noFill/>
+        <a:ln w="25400" cap="flat" cmpd="sng" algn="ctr">
+          <a:solidFill>
+            <a:schemeClr val="accent1">
+              <a:shade val="60000"/>
+              <a:hueOff val="0"/>
+              <a:satOff val="0"/>
+              <a:lumOff val="0"/>
+              <a:alphaOff val="0"/>
+            </a:schemeClr>
+          </a:solidFill>
+          <a:prstDash val="solid"/>
+        </a:ln>
+        <a:effectLst/>
+      </dsp:spPr>
+      <dsp:style>
+        <a:lnRef idx="2">
+          <a:scrgbClr r="0" g="0" b="0"/>
+        </a:lnRef>
+        <a:fillRef idx="0">
+          <a:scrgbClr r="0" g="0" b="0"/>
+        </a:fillRef>
+        <a:effectRef idx="0">
+          <a:scrgbClr r="0" g="0" b="0"/>
+        </a:effectRef>
+        <a:fontRef idx="minor"/>
+      </dsp:style>
+      <dsp:txBody>
+        <a:bodyPr spcFirstLastPara="0" vert="horz" wrap="square" lIns="12700" tIns="0" rIns="12700" bIns="0" numCol="1" spcCol="1270" anchor="ctr" anchorCtr="0">
+          <a:noAutofit/>
+        </a:bodyPr>
+        <a:lstStyle/>
+        <a:p>
+          <a:pPr lvl="0" algn="ctr" defTabSz="222250">
+            <a:lnSpc>
+              <a:spcPct val="90000"/>
+            </a:lnSpc>
+            <a:spcBef>
+              <a:spcPct val="0"/>
+            </a:spcBef>
+            <a:spcAft>
+              <a:spcPct val="35000"/>
+            </a:spcAft>
+          </a:pPr>
+          <a:endParaRPr lang="ru-RU" sz="500" kern="1200"/>
+        </a:p>
+      </dsp:txBody>
+      <dsp:txXfrm rot="10800000">
+        <a:off x="1608852" y="1470874"/>
+        <a:ext cx="13836" cy="13836"/>
+      </dsp:txXfrm>
+    </dsp:sp>
+    <dsp:sp modelId="{95A2D75F-3C3F-4653-A5FC-8BF0D4D6EEFE}">
+      <dsp:nvSpPr>
+        <dsp:cNvPr id="0" name=""/>
+        <dsp:cNvSpPr/>
+      </dsp:nvSpPr>
+      <dsp:spPr>
+        <a:xfrm>
+          <a:off x="590779" y="835628"/>
+          <a:ext cx="915812" cy="915812"/>
+        </a:xfrm>
+        <a:prstGeom prst="ellipse">
+          <a:avLst/>
+        </a:prstGeom>
+        <a:solidFill>
+          <a:srgbClr val="00B0F0"/>
+        </a:solidFill>
+        <a:ln w="25400" cap="flat" cmpd="sng" algn="ctr">
+          <a:solidFill>
+            <a:schemeClr val="tx2">
+              <a:lumMod val="60000"/>
+              <a:lumOff val="40000"/>
+            </a:schemeClr>
+          </a:solidFill>
+          <a:prstDash val="solid"/>
+        </a:ln>
+        <a:effectLst/>
+      </dsp:spPr>
+      <dsp:style>
+        <a:lnRef idx="2">
+          <a:scrgbClr r="0" g="0" b="0"/>
+        </a:lnRef>
+        <a:fillRef idx="1">
+          <a:scrgbClr r="0" g="0" b="0"/>
+        </a:fillRef>
+        <a:effectRef idx="0">
+          <a:scrgbClr r="0" g="0" b="0"/>
+        </a:effectRef>
+        <a:fontRef idx="minor">
+          <a:schemeClr val="lt1"/>
+        </a:fontRef>
+      </dsp:style>
+      <dsp:txBody>
+        <a:bodyPr spcFirstLastPara="0" vert="horz" wrap="square" lIns="12700" tIns="12700" rIns="12700" bIns="12700" numCol="1" spcCol="1270" anchor="ctr" anchorCtr="0">
+          <a:noAutofit/>
+        </a:bodyPr>
+        <a:lstStyle/>
+        <a:p>
+          <a:pPr lvl="0" algn="ctr" defTabSz="889000">
+            <a:lnSpc>
+              <a:spcPct val="90000"/>
+            </a:lnSpc>
+            <a:spcBef>
+              <a:spcPct val="0"/>
+            </a:spcBef>
+            <a:spcAft>
+              <a:spcPct val="35000"/>
+            </a:spcAft>
+          </a:pPr>
+          <a:endParaRPr lang="ru-RU" sz="2000" kern="1200"/>
+        </a:p>
+      </dsp:txBody>
+      <dsp:txXfrm>
+        <a:off x="724897" y="969746"/>
+        <a:ext cx="647576" cy="647576"/>
+      </dsp:txXfrm>
+    </dsp:sp>
   </dsp:spTree>
 </dsp:drawing>
 </file>
@@ -8875,6 +9694,215 @@
       <dsp:cNvGrpSpPr/>
     </dsp:nvGrpSpPr>
     <dsp:grpSpPr/>
+    <dsp:sp modelId="{25056C25-FD7A-454A-BD80-5797A854A1C9}">
+      <dsp:nvSpPr>
+        <dsp:cNvPr id="0" name=""/>
+        <dsp:cNvSpPr/>
+      </dsp:nvSpPr>
+      <dsp:spPr>
+        <a:xfrm>
+          <a:off x="898173" y="782679"/>
+          <a:ext cx="822207" cy="878051"/>
+        </a:xfrm>
+        <a:prstGeom prst="roundRect">
+          <a:avLst/>
+        </a:prstGeom>
+        <a:solidFill>
+          <a:schemeClr val="bg1">
+            <a:lumMod val="95000"/>
+          </a:schemeClr>
+        </a:solidFill>
+        <a:ln w="25400" cap="flat" cmpd="sng" algn="ctr">
+          <a:solidFill>
+            <a:srgbClr val="92D050"/>
+          </a:solidFill>
+          <a:prstDash val="solid"/>
+        </a:ln>
+        <a:effectLst/>
+      </dsp:spPr>
+      <dsp:style>
+        <a:lnRef idx="2">
+          <a:scrgbClr r="0" g="0" b="0"/>
+        </a:lnRef>
+        <a:fillRef idx="1">
+          <a:scrgbClr r="0" g="0" b="0"/>
+        </a:fillRef>
+        <a:effectRef idx="0">
+          <a:scrgbClr r="0" g="0" b="0"/>
+        </a:effectRef>
+        <a:fontRef idx="minor">
+          <a:schemeClr val="lt1"/>
+        </a:fontRef>
+      </dsp:style>
+      <dsp:txBody>
+        <a:bodyPr spcFirstLastPara="0" vert="horz" wrap="square" lIns="58420" tIns="58420" rIns="58420" bIns="58420" numCol="1" spcCol="1270" anchor="ctr" anchorCtr="0">
+          <a:noAutofit/>
+        </a:bodyPr>
+        <a:lstStyle/>
+        <a:p>
+          <a:pPr lvl="0" algn="ctr" defTabSz="1022350">
+            <a:lnSpc>
+              <a:spcPct val="90000"/>
+            </a:lnSpc>
+            <a:spcBef>
+              <a:spcPct val="0"/>
+            </a:spcBef>
+            <a:spcAft>
+              <a:spcPct val="35000"/>
+            </a:spcAft>
+          </a:pPr>
+          <a:r>
+            <a:rPr lang="en-US" sz="2300" kern="1200" dirty="0" err="1" smtClean="0">
+              <a:ln>
+                <a:noFill/>
+              </a:ln>
+              <a:solidFill>
+                <a:srgbClr val="92D050"/>
+              </a:solidFill>
+            </a:rPr>
+            <a:t>IaaS</a:t>
+          </a:r>
+          <a:endParaRPr lang="ru-RU" sz="2300" kern="1200" dirty="0">
+            <a:ln>
+              <a:noFill/>
+            </a:ln>
+            <a:solidFill>
+              <a:srgbClr val="92D050"/>
+            </a:solidFill>
+          </a:endParaRPr>
+        </a:p>
+      </dsp:txBody>
+      <dsp:txXfrm>
+        <a:off x="938310" y="822816"/>
+        <a:ext cx="741933" cy="797777"/>
+      </dsp:txXfrm>
+    </dsp:sp>
+    <dsp:sp modelId="{40765CB4-C294-459A-8862-FC5E44F7FB91}">
+      <dsp:nvSpPr>
+        <dsp:cNvPr id="0" name=""/>
+        <dsp:cNvSpPr/>
+      </dsp:nvSpPr>
+      <dsp:spPr>
+        <a:xfrm rot="21564252">
+          <a:off x="1720370" y="1215414"/>
+          <a:ext cx="387672" cy="0"/>
+        </a:xfrm>
+        <a:custGeom>
+          <a:avLst/>
+          <a:gdLst/>
+          <a:ahLst/>
+          <a:cxnLst/>
+          <a:rect l="0" t="0" r="0" b="0"/>
+          <a:pathLst>
+            <a:path>
+              <a:moveTo>
+                <a:pt x="0" y="0"/>
+              </a:moveTo>
+              <a:lnTo>
+                <a:pt x="387672" y="0"/>
+              </a:lnTo>
+            </a:path>
+          </a:pathLst>
+        </a:custGeom>
+        <a:noFill/>
+        <a:ln w="25400" cap="flat" cmpd="sng" algn="ctr">
+          <a:solidFill>
+            <a:srgbClr val="00B0F0"/>
+          </a:solidFill>
+          <a:prstDash val="solid"/>
+        </a:ln>
+        <a:effectLst/>
+      </dsp:spPr>
+      <dsp:style>
+        <a:lnRef idx="2">
+          <a:scrgbClr r="0" g="0" b="0"/>
+        </a:lnRef>
+        <a:fillRef idx="0">
+          <a:scrgbClr r="0" g="0" b="0"/>
+        </a:fillRef>
+        <a:effectRef idx="0">
+          <a:scrgbClr r="0" g="0" b="0"/>
+        </a:effectRef>
+        <a:fontRef idx="minor"/>
+      </dsp:style>
+    </dsp:sp>
+    <dsp:sp modelId="{EEF398F6-2EF8-48AB-9AFF-6A7FD5CA2064}">
+      <dsp:nvSpPr>
+        <dsp:cNvPr id="0" name=""/>
+        <dsp:cNvSpPr/>
+      </dsp:nvSpPr>
+      <dsp:spPr>
+        <a:xfrm>
+          <a:off x="2108032" y="799901"/>
+          <a:ext cx="2675962" cy="799167"/>
+        </a:xfrm>
+        <a:prstGeom prst="roundRect">
+          <a:avLst/>
+        </a:prstGeom>
+        <a:solidFill>
+          <a:schemeClr val="bg1">
+            <a:lumMod val="95000"/>
+          </a:schemeClr>
+        </a:solidFill>
+        <a:ln w="25400" cap="flat" cmpd="sng" algn="ctr">
+          <a:solidFill>
+            <a:srgbClr val="00B0F0"/>
+          </a:solidFill>
+          <a:prstDash val="solid"/>
+        </a:ln>
+        <a:effectLst/>
+      </dsp:spPr>
+      <dsp:style>
+        <a:lnRef idx="2">
+          <a:scrgbClr r="0" g="0" b="0"/>
+        </a:lnRef>
+        <a:fillRef idx="1">
+          <a:scrgbClr r="0" g="0" b="0"/>
+        </a:fillRef>
+        <a:effectRef idx="0">
+          <a:scrgbClr r="0" g="0" b="0"/>
+        </a:effectRef>
+        <a:fontRef idx="minor">
+          <a:schemeClr val="lt1"/>
+        </a:fontRef>
+      </dsp:style>
+      <dsp:txBody>
+        <a:bodyPr spcFirstLastPara="0" vert="horz" wrap="square" lIns="540000" tIns="55880" rIns="55880" bIns="55880" numCol="1" spcCol="1270" anchor="ctr" anchorCtr="0">
+          <a:noAutofit/>
+        </a:bodyPr>
+        <a:lstStyle/>
+        <a:p>
+          <a:pPr lvl="0" algn="ctr" defTabSz="977900">
+            <a:lnSpc>
+              <a:spcPct val="90000"/>
+            </a:lnSpc>
+            <a:spcBef>
+              <a:spcPct val="0"/>
+            </a:spcBef>
+            <a:spcAft>
+              <a:spcPct val="35000"/>
+            </a:spcAft>
+          </a:pPr>
+          <a:r>
+            <a:rPr lang="en-US" sz="2200" b="0" i="0" kern="1200" dirty="0" smtClean="0">
+              <a:solidFill>
+                <a:srgbClr val="00B0F0"/>
+              </a:solidFill>
+            </a:rPr>
+            <a:t>Virtual Machines</a:t>
+          </a:r>
+          <a:endParaRPr lang="ru-RU" sz="2200" kern="1200" dirty="0">
+            <a:solidFill>
+              <a:srgbClr val="00B0F0"/>
+            </a:solidFill>
+          </a:endParaRPr>
+        </a:p>
+      </dsp:txBody>
+      <dsp:txXfrm>
+        <a:off x="2147044" y="838913"/>
+        <a:ext cx="2597938" cy="721143"/>
+      </dsp:txXfrm>
+    </dsp:sp>
   </dsp:spTree>
 </dsp:drawing>
 </file>
@@ -8887,6 +9915,1007 @@
       <dsp:cNvGrpSpPr/>
     </dsp:nvGrpSpPr>
     <dsp:grpSpPr/>
+    <dsp:sp modelId="{25056C25-FD7A-454A-BD80-5797A854A1C9}">
+      <dsp:nvSpPr>
+        <dsp:cNvPr id="0" name=""/>
+        <dsp:cNvSpPr/>
+      </dsp:nvSpPr>
+      <dsp:spPr>
+        <a:xfrm>
+          <a:off x="2222095" y="1180473"/>
+          <a:ext cx="523382" cy="558930"/>
+        </a:xfrm>
+        <a:prstGeom prst="roundRect">
+          <a:avLst/>
+        </a:prstGeom>
+        <a:solidFill>
+          <a:schemeClr val="bg1">
+            <a:lumMod val="95000"/>
+          </a:schemeClr>
+        </a:solidFill>
+        <a:ln w="25400" cap="flat" cmpd="sng" algn="ctr">
+          <a:solidFill>
+            <a:srgbClr val="92D050"/>
+          </a:solidFill>
+          <a:prstDash val="solid"/>
+        </a:ln>
+        <a:effectLst/>
+      </dsp:spPr>
+      <dsp:style>
+        <a:lnRef idx="2">
+          <a:scrgbClr r="0" g="0" b="0"/>
+        </a:lnRef>
+        <a:fillRef idx="1">
+          <a:scrgbClr r="0" g="0" b="0"/>
+        </a:fillRef>
+        <a:effectRef idx="0">
+          <a:scrgbClr r="0" g="0" b="0"/>
+        </a:effectRef>
+        <a:fontRef idx="minor">
+          <a:schemeClr val="lt1"/>
+        </a:fontRef>
+      </dsp:style>
+      <dsp:txBody>
+        <a:bodyPr spcFirstLastPara="0" vert="horz" wrap="square" lIns="33020" tIns="33020" rIns="33020" bIns="33020" numCol="1" spcCol="1270" anchor="ctr" anchorCtr="0">
+          <a:noAutofit/>
+        </a:bodyPr>
+        <a:lstStyle/>
+        <a:p>
+          <a:pPr lvl="0" algn="ctr" defTabSz="577850">
+            <a:lnSpc>
+              <a:spcPct val="90000"/>
+            </a:lnSpc>
+            <a:spcBef>
+              <a:spcPct val="0"/>
+            </a:spcBef>
+            <a:spcAft>
+              <a:spcPct val="35000"/>
+            </a:spcAft>
+          </a:pPr>
+          <a:r>
+            <a:rPr lang="en-US" sz="1300" kern="1200" dirty="0" err="1" smtClean="0">
+              <a:ln>
+                <a:noFill/>
+              </a:ln>
+              <a:solidFill>
+                <a:srgbClr val="92D050"/>
+              </a:solidFill>
+            </a:rPr>
+            <a:t>PaaS</a:t>
+          </a:r>
+          <a:endParaRPr lang="ru-RU" sz="1300" kern="1200" dirty="0">
+            <a:ln>
+              <a:noFill/>
+            </a:ln>
+            <a:solidFill>
+              <a:srgbClr val="92D050"/>
+            </a:solidFill>
+          </a:endParaRPr>
+        </a:p>
+      </dsp:txBody>
+      <dsp:txXfrm>
+        <a:off x="2247644" y="1206022"/>
+        <a:ext cx="472284" cy="507832"/>
+      </dsp:txXfrm>
+    </dsp:sp>
+    <dsp:sp modelId="{40765CB4-C294-459A-8862-FC5E44F7FB91}">
+      <dsp:nvSpPr>
+        <dsp:cNvPr id="0" name=""/>
+        <dsp:cNvSpPr/>
+      </dsp:nvSpPr>
+      <dsp:spPr>
+        <a:xfrm rot="18531129">
+          <a:off x="2574776" y="900204"/>
+          <a:ext cx="719773" cy="0"/>
+        </a:xfrm>
+        <a:custGeom>
+          <a:avLst/>
+          <a:gdLst/>
+          <a:ahLst/>
+          <a:cxnLst/>
+          <a:rect l="0" t="0" r="0" b="0"/>
+          <a:pathLst>
+            <a:path>
+              <a:moveTo>
+                <a:pt x="0" y="0"/>
+              </a:moveTo>
+              <a:lnTo>
+                <a:pt x="719773" y="0"/>
+              </a:lnTo>
+            </a:path>
+          </a:pathLst>
+        </a:custGeom>
+        <a:noFill/>
+        <a:ln w="25400" cap="flat" cmpd="sng" algn="ctr">
+          <a:solidFill>
+            <a:srgbClr val="00B0F0"/>
+          </a:solidFill>
+          <a:prstDash val="solid"/>
+        </a:ln>
+        <a:effectLst/>
+      </dsp:spPr>
+      <dsp:style>
+        <a:lnRef idx="2">
+          <a:scrgbClr r="0" g="0" b="0"/>
+        </a:lnRef>
+        <a:fillRef idx="0">
+          <a:scrgbClr r="0" g="0" b="0"/>
+        </a:fillRef>
+        <a:effectRef idx="0">
+          <a:scrgbClr r="0" g="0" b="0"/>
+        </a:effectRef>
+        <a:fontRef idx="minor"/>
+      </dsp:style>
+    </dsp:sp>
+    <dsp:sp modelId="{EEF398F6-2EF8-48AB-9AFF-6A7FD5CA2064}">
+      <dsp:nvSpPr>
+        <dsp:cNvPr id="0" name=""/>
+        <dsp:cNvSpPr/>
+      </dsp:nvSpPr>
+      <dsp:spPr>
+        <a:xfrm>
+          <a:off x="2513612" y="111220"/>
+          <a:ext cx="1703405" cy="508716"/>
+        </a:xfrm>
+        <a:prstGeom prst="roundRect">
+          <a:avLst/>
+        </a:prstGeom>
+        <a:solidFill>
+          <a:schemeClr val="bg1">
+            <a:lumMod val="95000"/>
+          </a:schemeClr>
+        </a:solidFill>
+        <a:ln w="25400" cap="flat" cmpd="sng" algn="ctr">
+          <a:solidFill>
+            <a:srgbClr val="00B0F0"/>
+          </a:solidFill>
+          <a:prstDash val="solid"/>
+        </a:ln>
+        <a:effectLst/>
+      </dsp:spPr>
+      <dsp:style>
+        <a:lnRef idx="2">
+          <a:scrgbClr r="0" g="0" b="0"/>
+        </a:lnRef>
+        <a:fillRef idx="1">
+          <a:scrgbClr r="0" g="0" b="0"/>
+        </a:fillRef>
+        <a:effectRef idx="0">
+          <a:scrgbClr r="0" g="0" b="0"/>
+        </a:effectRef>
+        <a:fontRef idx="minor">
+          <a:schemeClr val="lt1"/>
+        </a:fontRef>
+      </dsp:style>
+      <dsp:txBody>
+        <a:bodyPr spcFirstLastPara="0" vert="horz" wrap="square" lIns="540000" tIns="35560" rIns="35560" bIns="35560" numCol="1" spcCol="1270" anchor="ctr" anchorCtr="0">
+          <a:noAutofit/>
+        </a:bodyPr>
+        <a:lstStyle/>
+        <a:p>
+          <a:pPr lvl="0" algn="ctr" defTabSz="622300">
+            <a:lnSpc>
+              <a:spcPct val="90000"/>
+            </a:lnSpc>
+            <a:spcBef>
+              <a:spcPct val="0"/>
+            </a:spcBef>
+            <a:spcAft>
+              <a:spcPct val="35000"/>
+            </a:spcAft>
+          </a:pPr>
+          <a:r>
+            <a:rPr lang="en-US" sz="1400" b="0" i="0" kern="1200" dirty="0" smtClean="0">
+              <a:solidFill>
+                <a:srgbClr val="00B0F0"/>
+              </a:solidFill>
+            </a:rPr>
+            <a:t>Cloud Services</a:t>
+          </a:r>
+          <a:endParaRPr lang="ru-RU" sz="1400" kern="1200" dirty="0">
+            <a:solidFill>
+              <a:srgbClr val="00B0F0"/>
+            </a:solidFill>
+          </a:endParaRPr>
+        </a:p>
+      </dsp:txBody>
+      <dsp:txXfrm>
+        <a:off x="2538445" y="136053"/>
+        <a:ext cx="1653739" cy="459050"/>
+      </dsp:txXfrm>
+    </dsp:sp>
+    <dsp:sp modelId="{4B76F172-835F-47AA-A859-8A899CEE2510}">
+      <dsp:nvSpPr>
+        <dsp:cNvPr id="0" name=""/>
+        <dsp:cNvSpPr/>
+      </dsp:nvSpPr>
+      <dsp:spPr>
+        <a:xfrm rot="20600496">
+          <a:off x="2734080" y="1303787"/>
+          <a:ext cx="543120" cy="0"/>
+        </a:xfrm>
+        <a:custGeom>
+          <a:avLst/>
+          <a:gdLst/>
+          <a:ahLst/>
+          <a:cxnLst/>
+          <a:rect l="0" t="0" r="0" b="0"/>
+          <a:pathLst>
+            <a:path>
+              <a:moveTo>
+                <a:pt x="0" y="0"/>
+              </a:moveTo>
+              <a:lnTo>
+                <a:pt x="543120" y="0"/>
+              </a:lnTo>
+            </a:path>
+          </a:pathLst>
+        </a:custGeom>
+        <a:noFill/>
+        <a:ln w="25400" cap="flat" cmpd="sng" algn="ctr">
+          <a:solidFill>
+            <a:schemeClr val="accent1">
+              <a:shade val="60000"/>
+              <a:hueOff val="0"/>
+              <a:satOff val="0"/>
+              <a:lumOff val="0"/>
+              <a:alphaOff val="0"/>
+            </a:schemeClr>
+          </a:solidFill>
+          <a:prstDash val="solid"/>
+        </a:ln>
+        <a:effectLst/>
+      </dsp:spPr>
+      <dsp:style>
+        <a:lnRef idx="2">
+          <a:scrgbClr r="0" g="0" b="0"/>
+        </a:lnRef>
+        <a:fillRef idx="0">
+          <a:scrgbClr r="0" g="0" b="0"/>
+        </a:fillRef>
+        <a:effectRef idx="0">
+          <a:scrgbClr r="0" g="0" b="0"/>
+        </a:effectRef>
+        <a:fontRef idx="minor"/>
+      </dsp:style>
+    </dsp:sp>
+    <dsp:sp modelId="{2C989446-76CB-491D-A9E5-90C479CC1EB6}">
+      <dsp:nvSpPr>
+        <dsp:cNvPr id="0" name=""/>
+        <dsp:cNvSpPr/>
+      </dsp:nvSpPr>
+      <dsp:spPr>
+        <a:xfrm>
+          <a:off x="3264163" y="717224"/>
+          <a:ext cx="1703405" cy="508716"/>
+        </a:xfrm>
+        <a:prstGeom prst="roundRect">
+          <a:avLst/>
+        </a:prstGeom>
+        <a:solidFill>
+          <a:schemeClr val="bg1">
+            <a:lumMod val="95000"/>
+          </a:schemeClr>
+        </a:solidFill>
+        <a:ln w="25400" cap="flat" cmpd="sng" algn="ctr">
+          <a:solidFill>
+            <a:srgbClr val="00B0F0"/>
+          </a:solidFill>
+          <a:prstDash val="solid"/>
+        </a:ln>
+        <a:effectLst/>
+      </dsp:spPr>
+      <dsp:style>
+        <a:lnRef idx="2">
+          <a:scrgbClr r="0" g="0" b="0"/>
+        </a:lnRef>
+        <a:fillRef idx="1">
+          <a:scrgbClr r="0" g="0" b="0"/>
+        </a:fillRef>
+        <a:effectRef idx="0">
+          <a:scrgbClr r="0" g="0" b="0"/>
+        </a:effectRef>
+        <a:fontRef idx="minor">
+          <a:schemeClr val="lt1"/>
+        </a:fontRef>
+      </dsp:style>
+      <dsp:txBody>
+        <a:bodyPr spcFirstLastPara="0" vert="horz" wrap="square" lIns="540000" tIns="43180" rIns="43180" bIns="43180" numCol="1" spcCol="1270" anchor="ctr" anchorCtr="0">
+          <a:noAutofit/>
+        </a:bodyPr>
+        <a:lstStyle/>
+        <a:p>
+          <a:pPr lvl="0" algn="ctr" defTabSz="755650">
+            <a:lnSpc>
+              <a:spcPct val="90000"/>
+            </a:lnSpc>
+            <a:spcBef>
+              <a:spcPct val="0"/>
+            </a:spcBef>
+            <a:spcAft>
+              <a:spcPct val="35000"/>
+            </a:spcAft>
+          </a:pPr>
+          <a:r>
+            <a:rPr lang="en-US" sz="1700" kern="1200" dirty="0" smtClean="0">
+              <a:solidFill>
+                <a:srgbClr val="00B0F0"/>
+              </a:solidFill>
+            </a:rPr>
+            <a:t>SQL Azure</a:t>
+          </a:r>
+          <a:endParaRPr lang="ru-RU" sz="1700" kern="1200" dirty="0">
+            <a:solidFill>
+              <a:srgbClr val="00B0F0"/>
+            </a:solidFill>
+          </a:endParaRPr>
+        </a:p>
+      </dsp:txBody>
+      <dsp:txXfrm>
+        <a:off x="3288996" y="742057"/>
+        <a:ext cx="1653739" cy="459050"/>
+      </dsp:txXfrm>
+    </dsp:sp>
+    <dsp:sp modelId="{A1A7F2F7-8724-4320-8D3E-13A495501B45}">
+      <dsp:nvSpPr>
+        <dsp:cNvPr id="0" name=""/>
+        <dsp:cNvSpPr/>
+      </dsp:nvSpPr>
+      <dsp:spPr>
+        <a:xfrm rot="258212">
+          <a:off x="2744744" y="1499147"/>
+          <a:ext cx="520151" cy="0"/>
+        </a:xfrm>
+        <a:custGeom>
+          <a:avLst/>
+          <a:gdLst/>
+          <a:ahLst/>
+          <a:cxnLst/>
+          <a:rect l="0" t="0" r="0" b="0"/>
+          <a:pathLst>
+            <a:path>
+              <a:moveTo>
+                <a:pt x="0" y="0"/>
+              </a:moveTo>
+              <a:lnTo>
+                <a:pt x="520151" y="0"/>
+              </a:lnTo>
+            </a:path>
+          </a:pathLst>
+        </a:custGeom>
+        <a:noFill/>
+        <a:ln w="25400" cap="flat" cmpd="sng" algn="ctr">
+          <a:solidFill>
+            <a:schemeClr val="accent1">
+              <a:shade val="60000"/>
+              <a:hueOff val="0"/>
+              <a:satOff val="0"/>
+              <a:lumOff val="0"/>
+              <a:alphaOff val="0"/>
+            </a:schemeClr>
+          </a:solidFill>
+          <a:prstDash val="solid"/>
+        </a:ln>
+        <a:effectLst/>
+      </dsp:spPr>
+      <dsp:style>
+        <a:lnRef idx="2">
+          <a:scrgbClr r="0" g="0" b="0"/>
+        </a:lnRef>
+        <a:fillRef idx="0">
+          <a:scrgbClr r="0" g="0" b="0"/>
+        </a:fillRef>
+        <a:effectRef idx="0">
+          <a:scrgbClr r="0" g="0" b="0"/>
+        </a:effectRef>
+        <a:fontRef idx="minor"/>
+      </dsp:style>
+    </dsp:sp>
+    <dsp:sp modelId="{1C652A63-4612-4140-A184-53A0A081C97B}">
+      <dsp:nvSpPr>
+        <dsp:cNvPr id="0" name=""/>
+        <dsp:cNvSpPr/>
+      </dsp:nvSpPr>
+      <dsp:spPr>
+        <a:xfrm>
+          <a:off x="3264162" y="1328398"/>
+          <a:ext cx="1703405" cy="508716"/>
+        </a:xfrm>
+        <a:prstGeom prst="roundRect">
+          <a:avLst/>
+        </a:prstGeom>
+        <a:solidFill>
+          <a:schemeClr val="bg1">
+            <a:lumMod val="95000"/>
+          </a:schemeClr>
+        </a:solidFill>
+        <a:ln w="25400" cap="flat" cmpd="sng" algn="ctr">
+          <a:solidFill>
+            <a:srgbClr val="00B0F0"/>
+          </a:solidFill>
+          <a:prstDash val="solid"/>
+        </a:ln>
+        <a:effectLst/>
+      </dsp:spPr>
+      <dsp:style>
+        <a:lnRef idx="2">
+          <a:scrgbClr r="0" g="0" b="0"/>
+        </a:lnRef>
+        <a:fillRef idx="1">
+          <a:scrgbClr r="0" g="0" b="0"/>
+        </a:fillRef>
+        <a:effectRef idx="0">
+          <a:scrgbClr r="0" g="0" b="0"/>
+        </a:effectRef>
+        <a:fontRef idx="minor">
+          <a:schemeClr val="lt1"/>
+        </a:fontRef>
+      </dsp:style>
+      <dsp:txBody>
+        <a:bodyPr spcFirstLastPara="0" vert="horz" wrap="square" lIns="540000" tIns="35560" rIns="35560" bIns="35560" numCol="1" spcCol="1270" anchor="ctr" anchorCtr="0">
+          <a:noAutofit/>
+        </a:bodyPr>
+        <a:lstStyle/>
+        <a:p>
+          <a:pPr lvl="0" algn="ctr" defTabSz="622300">
+            <a:lnSpc>
+              <a:spcPct val="90000"/>
+            </a:lnSpc>
+            <a:spcBef>
+              <a:spcPct val="0"/>
+            </a:spcBef>
+            <a:spcAft>
+              <a:spcPct val="35000"/>
+            </a:spcAft>
+          </a:pPr>
+          <a:r>
+            <a:rPr lang="en-US" sz="1400" kern="1200" dirty="0" smtClean="0">
+              <a:solidFill>
+                <a:srgbClr val="00B0F0"/>
+              </a:solidFill>
+            </a:rPr>
+            <a:t>Storage Tables</a:t>
+          </a:r>
+          <a:endParaRPr lang="ru-RU" sz="1400" kern="1200" dirty="0">
+            <a:solidFill>
+              <a:srgbClr val="00B0F0"/>
+            </a:solidFill>
+          </a:endParaRPr>
+        </a:p>
+      </dsp:txBody>
+      <dsp:txXfrm>
+        <a:off x="3288995" y="1353231"/>
+        <a:ext cx="1653739" cy="459050"/>
+      </dsp:txXfrm>
+    </dsp:sp>
+    <dsp:sp modelId="{5727BF42-537E-40D5-B281-429A4AA75037}">
+      <dsp:nvSpPr>
+        <dsp:cNvPr id="0" name=""/>
+        <dsp:cNvSpPr/>
+      </dsp:nvSpPr>
+      <dsp:spPr>
+        <a:xfrm rot="2121630">
+          <a:off x="2698634" y="1792597"/>
+          <a:ext cx="507864" cy="0"/>
+        </a:xfrm>
+        <a:custGeom>
+          <a:avLst/>
+          <a:gdLst/>
+          <a:ahLst/>
+          <a:cxnLst/>
+          <a:rect l="0" t="0" r="0" b="0"/>
+          <a:pathLst>
+            <a:path>
+              <a:moveTo>
+                <a:pt x="0" y="0"/>
+              </a:moveTo>
+              <a:lnTo>
+                <a:pt x="507864" y="0"/>
+              </a:lnTo>
+            </a:path>
+          </a:pathLst>
+        </a:custGeom>
+        <a:noFill/>
+        <a:ln w="25400" cap="flat" cmpd="sng" algn="ctr">
+          <a:solidFill>
+            <a:schemeClr val="accent1">
+              <a:shade val="60000"/>
+              <a:hueOff val="0"/>
+              <a:satOff val="0"/>
+              <a:lumOff val="0"/>
+              <a:alphaOff val="0"/>
+            </a:schemeClr>
+          </a:solidFill>
+          <a:prstDash val="solid"/>
+        </a:ln>
+        <a:effectLst/>
+      </dsp:spPr>
+      <dsp:style>
+        <a:lnRef idx="2">
+          <a:scrgbClr r="0" g="0" b="0"/>
+        </a:lnRef>
+        <a:fillRef idx="0">
+          <a:scrgbClr r="0" g="0" b="0"/>
+        </a:fillRef>
+        <a:effectRef idx="0">
+          <a:scrgbClr r="0" g="0" b="0"/>
+        </a:effectRef>
+        <a:fontRef idx="minor"/>
+      </dsp:style>
+    </dsp:sp>
+    <dsp:sp modelId="{06CB251D-7874-46F5-B434-DFA2F5371EDF}">
+      <dsp:nvSpPr>
+        <dsp:cNvPr id="0" name=""/>
+        <dsp:cNvSpPr/>
+      </dsp:nvSpPr>
+      <dsp:spPr>
+        <a:xfrm>
+          <a:off x="2666392" y="1939552"/>
+          <a:ext cx="1703405" cy="508716"/>
+        </a:xfrm>
+        <a:prstGeom prst="roundRect">
+          <a:avLst/>
+        </a:prstGeom>
+        <a:solidFill>
+          <a:schemeClr val="bg1">
+            <a:lumMod val="95000"/>
+          </a:schemeClr>
+        </a:solidFill>
+        <a:ln w="25400" cap="flat" cmpd="sng" algn="ctr">
+          <a:solidFill>
+            <a:srgbClr val="00B0F0"/>
+          </a:solidFill>
+          <a:prstDash val="solid"/>
+        </a:ln>
+        <a:effectLst/>
+      </dsp:spPr>
+      <dsp:style>
+        <a:lnRef idx="2">
+          <a:scrgbClr r="0" g="0" b="0"/>
+        </a:lnRef>
+        <a:fillRef idx="1">
+          <a:scrgbClr r="0" g="0" b="0"/>
+        </a:fillRef>
+        <a:effectRef idx="0">
+          <a:scrgbClr r="0" g="0" b="0"/>
+        </a:effectRef>
+        <a:fontRef idx="minor">
+          <a:schemeClr val="lt1"/>
+        </a:fontRef>
+      </dsp:style>
+      <dsp:txBody>
+        <a:bodyPr spcFirstLastPara="0" vert="horz" wrap="square" lIns="540000" tIns="63500" rIns="63500" bIns="63500" numCol="1" spcCol="1270" anchor="ctr" anchorCtr="0">
+          <a:noAutofit/>
+        </a:bodyPr>
+        <a:lstStyle/>
+        <a:p>
+          <a:pPr lvl="0" algn="ctr" defTabSz="1111250">
+            <a:lnSpc>
+              <a:spcPct val="90000"/>
+            </a:lnSpc>
+            <a:spcBef>
+              <a:spcPct val="0"/>
+            </a:spcBef>
+            <a:spcAft>
+              <a:spcPct val="35000"/>
+            </a:spcAft>
+          </a:pPr>
+          <a:r>
+            <a:rPr lang="en-US" sz="2500" kern="1200" dirty="0" smtClean="0">
+              <a:solidFill>
+                <a:srgbClr val="00B0F0"/>
+              </a:solidFill>
+            </a:rPr>
+            <a:t>Cache</a:t>
+          </a:r>
+          <a:endParaRPr lang="ru-RU" sz="2500" kern="1200" dirty="0">
+            <a:solidFill>
+              <a:srgbClr val="00B0F0"/>
+            </a:solidFill>
+          </a:endParaRPr>
+        </a:p>
+      </dsp:txBody>
+      <dsp:txXfrm>
+        <a:off x="2691225" y="1964385"/>
+        <a:ext cx="1653739" cy="459050"/>
+      </dsp:txXfrm>
+    </dsp:sp>
+    <dsp:sp modelId="{C09D1272-4CF0-4360-A709-F658F12539F1}">
+      <dsp:nvSpPr>
+        <dsp:cNvPr id="0" name=""/>
+        <dsp:cNvSpPr/>
+      </dsp:nvSpPr>
+      <dsp:spPr>
+        <a:xfrm rot="8401647">
+          <a:off x="1864315" y="1809434"/>
+          <a:ext cx="405105" cy="0"/>
+        </a:xfrm>
+        <a:custGeom>
+          <a:avLst/>
+          <a:gdLst/>
+          <a:ahLst/>
+          <a:cxnLst/>
+          <a:rect l="0" t="0" r="0" b="0"/>
+          <a:pathLst>
+            <a:path>
+              <a:moveTo>
+                <a:pt x="0" y="0"/>
+              </a:moveTo>
+              <a:lnTo>
+                <a:pt x="405105" y="0"/>
+              </a:lnTo>
+            </a:path>
+          </a:pathLst>
+        </a:custGeom>
+        <a:noFill/>
+        <a:ln w="25400" cap="flat" cmpd="sng" algn="ctr">
+          <a:solidFill>
+            <a:schemeClr val="accent1">
+              <a:shade val="60000"/>
+              <a:hueOff val="0"/>
+              <a:satOff val="0"/>
+              <a:lumOff val="0"/>
+              <a:alphaOff val="0"/>
+            </a:schemeClr>
+          </a:solidFill>
+          <a:prstDash val="solid"/>
+        </a:ln>
+        <a:effectLst/>
+      </dsp:spPr>
+      <dsp:style>
+        <a:lnRef idx="2">
+          <a:scrgbClr r="0" g="0" b="0"/>
+        </a:lnRef>
+        <a:fillRef idx="0">
+          <a:scrgbClr r="0" g="0" b="0"/>
+        </a:fillRef>
+        <a:effectRef idx="0">
+          <a:scrgbClr r="0" g="0" b="0"/>
+        </a:effectRef>
+        <a:fontRef idx="minor"/>
+      </dsp:style>
+    </dsp:sp>
+    <dsp:sp modelId="{905EE044-8A93-48F4-B923-0A245442EAF2}">
+      <dsp:nvSpPr>
+        <dsp:cNvPr id="0" name=""/>
+        <dsp:cNvSpPr/>
+      </dsp:nvSpPr>
+      <dsp:spPr>
+        <a:xfrm>
+          <a:off x="756510" y="1939558"/>
+          <a:ext cx="1703405" cy="508716"/>
+        </a:xfrm>
+        <a:prstGeom prst="roundRect">
+          <a:avLst/>
+        </a:prstGeom>
+        <a:solidFill>
+          <a:schemeClr val="bg1">
+            <a:lumMod val="95000"/>
+          </a:schemeClr>
+        </a:solidFill>
+        <a:ln w="25400" cap="flat" cmpd="sng" algn="ctr">
+          <a:solidFill>
+            <a:srgbClr val="00B0F0"/>
+          </a:solidFill>
+          <a:prstDash val="solid"/>
+        </a:ln>
+        <a:effectLst/>
+      </dsp:spPr>
+      <dsp:style>
+        <a:lnRef idx="2">
+          <a:scrgbClr r="0" g="0" b="0"/>
+        </a:lnRef>
+        <a:fillRef idx="1">
+          <a:scrgbClr r="0" g="0" b="0"/>
+        </a:fillRef>
+        <a:effectRef idx="0">
+          <a:scrgbClr r="0" g="0" b="0"/>
+        </a:effectRef>
+        <a:fontRef idx="minor">
+          <a:schemeClr val="lt1"/>
+        </a:fontRef>
+      </dsp:style>
+      <dsp:txBody>
+        <a:bodyPr spcFirstLastPara="0" vert="horz" wrap="square" lIns="540000" tIns="35560" rIns="35560" bIns="35560" numCol="1" spcCol="1270" anchor="ctr" anchorCtr="0">
+          <a:noAutofit/>
+        </a:bodyPr>
+        <a:lstStyle/>
+        <a:p>
+          <a:pPr lvl="0" algn="ctr" defTabSz="622300">
+            <a:lnSpc>
+              <a:spcPct val="90000"/>
+            </a:lnSpc>
+            <a:spcBef>
+              <a:spcPct val="0"/>
+            </a:spcBef>
+            <a:spcAft>
+              <a:spcPct val="35000"/>
+            </a:spcAft>
+          </a:pPr>
+          <a:r>
+            <a:rPr lang="en-US" sz="1400" kern="1200" dirty="0" smtClean="0">
+              <a:solidFill>
+                <a:srgbClr val="00B0F0"/>
+              </a:solidFill>
+            </a:rPr>
+            <a:t>Mobile Services</a:t>
+          </a:r>
+          <a:endParaRPr lang="ru-RU" sz="1400" kern="1200" dirty="0">
+            <a:solidFill>
+              <a:srgbClr val="00B0F0"/>
+            </a:solidFill>
+          </a:endParaRPr>
+        </a:p>
+      </dsp:txBody>
+      <dsp:txXfrm>
+        <a:off x="781343" y="1964391"/>
+        <a:ext cx="1653739" cy="459050"/>
+      </dsp:txXfrm>
+    </dsp:sp>
+    <dsp:sp modelId="{92DF3097-6005-46D4-90E5-653438AEDECF}">
+      <dsp:nvSpPr>
+        <dsp:cNvPr id="0" name=""/>
+        <dsp:cNvSpPr/>
+      </dsp:nvSpPr>
+      <dsp:spPr>
+        <a:xfrm rot="11243038">
+          <a:off x="1923897" y="1406783"/>
+          <a:ext cx="299438" cy="0"/>
+        </a:xfrm>
+        <a:custGeom>
+          <a:avLst/>
+          <a:gdLst/>
+          <a:ahLst/>
+          <a:cxnLst/>
+          <a:rect l="0" t="0" r="0" b="0"/>
+          <a:pathLst>
+            <a:path>
+              <a:moveTo>
+                <a:pt x="0" y="0"/>
+              </a:moveTo>
+              <a:lnTo>
+                <a:pt x="299438" y="0"/>
+              </a:lnTo>
+            </a:path>
+          </a:pathLst>
+        </a:custGeom>
+        <a:noFill/>
+        <a:ln w="25400" cap="flat" cmpd="sng" algn="ctr">
+          <a:solidFill>
+            <a:schemeClr val="accent1">
+              <a:shade val="60000"/>
+              <a:hueOff val="0"/>
+              <a:satOff val="0"/>
+              <a:lumOff val="0"/>
+              <a:alphaOff val="0"/>
+            </a:schemeClr>
+          </a:solidFill>
+          <a:prstDash val="solid"/>
+        </a:ln>
+        <a:effectLst/>
+      </dsp:spPr>
+      <dsp:style>
+        <a:lnRef idx="2">
+          <a:scrgbClr r="0" g="0" b="0"/>
+        </a:lnRef>
+        <a:fillRef idx="0">
+          <a:scrgbClr r="0" g="0" b="0"/>
+        </a:fillRef>
+        <a:effectRef idx="0">
+          <a:scrgbClr r="0" g="0" b="0"/>
+        </a:effectRef>
+        <a:fontRef idx="minor"/>
+      </dsp:style>
+    </dsp:sp>
+    <dsp:sp modelId="{42C5E428-457C-4D2D-B9F7-8D88B989BAC4}">
+      <dsp:nvSpPr>
+        <dsp:cNvPr id="0" name=""/>
+        <dsp:cNvSpPr/>
+      </dsp:nvSpPr>
+      <dsp:spPr>
+        <a:xfrm>
+          <a:off x="221733" y="1022809"/>
+          <a:ext cx="1703405" cy="508716"/>
+        </a:xfrm>
+        <a:prstGeom prst="roundRect">
+          <a:avLst/>
+        </a:prstGeom>
+        <a:solidFill>
+          <a:schemeClr val="bg1">
+            <a:lumMod val="95000"/>
+          </a:schemeClr>
+        </a:solidFill>
+        <a:ln w="25400" cap="flat" cmpd="sng" algn="ctr">
+          <a:solidFill>
+            <a:srgbClr val="00B0F0"/>
+          </a:solidFill>
+          <a:prstDash val="solid"/>
+        </a:ln>
+        <a:effectLst/>
+      </dsp:spPr>
+      <dsp:style>
+        <a:lnRef idx="2">
+          <a:scrgbClr r="0" g="0" b="0"/>
+        </a:lnRef>
+        <a:fillRef idx="1">
+          <a:scrgbClr r="0" g="0" b="0"/>
+        </a:fillRef>
+        <a:effectRef idx="0">
+          <a:scrgbClr r="0" g="0" b="0"/>
+        </a:effectRef>
+        <a:fontRef idx="minor">
+          <a:schemeClr val="lt1"/>
+        </a:fontRef>
+      </dsp:style>
+      <dsp:txBody>
+        <a:bodyPr spcFirstLastPara="0" vert="horz" wrap="square" lIns="540000" tIns="35560" rIns="35560" bIns="35560" numCol="1" spcCol="1270" anchor="ctr" anchorCtr="0">
+          <a:noAutofit/>
+        </a:bodyPr>
+        <a:lstStyle/>
+        <a:p>
+          <a:pPr lvl="0" algn="ctr" defTabSz="622300">
+            <a:lnSpc>
+              <a:spcPct val="90000"/>
+            </a:lnSpc>
+            <a:spcBef>
+              <a:spcPct val="0"/>
+            </a:spcBef>
+            <a:spcAft>
+              <a:spcPct val="35000"/>
+            </a:spcAft>
+          </a:pPr>
+          <a:r>
+            <a:rPr lang="en-US" sz="1400" kern="1200" dirty="0" smtClean="0">
+              <a:solidFill>
+                <a:srgbClr val="00B0F0"/>
+              </a:solidFill>
+            </a:rPr>
+            <a:t>Traffic Manager</a:t>
+          </a:r>
+          <a:endParaRPr lang="ru-RU" sz="1400" kern="1200" dirty="0">
+            <a:solidFill>
+              <a:srgbClr val="00B0F0"/>
+            </a:solidFill>
+          </a:endParaRPr>
+        </a:p>
+      </dsp:txBody>
+      <dsp:txXfrm>
+        <a:off x="246566" y="1047642"/>
+        <a:ext cx="1653739" cy="459050"/>
+      </dsp:txXfrm>
+    </dsp:sp>
+    <dsp:sp modelId="{952B87BD-0B07-49BA-9E5C-A2E5FB19EB83}">
+      <dsp:nvSpPr>
+        <dsp:cNvPr id="0" name=""/>
+        <dsp:cNvSpPr/>
+      </dsp:nvSpPr>
+      <dsp:spPr>
+        <a:xfrm rot="13557237">
+          <a:off x="1550582" y="904662"/>
+          <a:ext cx="792234" cy="0"/>
+        </a:xfrm>
+        <a:custGeom>
+          <a:avLst/>
+          <a:gdLst/>
+          <a:ahLst/>
+          <a:cxnLst/>
+          <a:rect l="0" t="0" r="0" b="0"/>
+          <a:pathLst>
+            <a:path>
+              <a:moveTo>
+                <a:pt x="0" y="0"/>
+              </a:moveTo>
+              <a:lnTo>
+                <a:pt x="792234" y="0"/>
+              </a:lnTo>
+            </a:path>
+          </a:pathLst>
+        </a:custGeom>
+        <a:noFill/>
+        <a:ln w="25400" cap="flat" cmpd="sng" algn="ctr">
+          <a:solidFill>
+            <a:schemeClr val="accent1">
+              <a:shade val="60000"/>
+              <a:hueOff val="0"/>
+              <a:satOff val="0"/>
+              <a:lumOff val="0"/>
+              <a:alphaOff val="0"/>
+            </a:schemeClr>
+          </a:solidFill>
+          <a:prstDash val="solid"/>
+        </a:ln>
+        <a:effectLst/>
+      </dsp:spPr>
+      <dsp:style>
+        <a:lnRef idx="2">
+          <a:scrgbClr r="0" g="0" b="0"/>
+        </a:lnRef>
+        <a:fillRef idx="0">
+          <a:scrgbClr r="0" g="0" b="0"/>
+        </a:fillRef>
+        <a:effectRef idx="0">
+          <a:scrgbClr r="0" g="0" b="0"/>
+        </a:effectRef>
+        <a:fontRef idx="minor"/>
+      </dsp:style>
+    </dsp:sp>
+    <dsp:sp modelId="{A1DBB35B-359C-44C1-948D-F0C4AB873D98}">
+      <dsp:nvSpPr>
+        <dsp:cNvPr id="0" name=""/>
+        <dsp:cNvSpPr/>
+      </dsp:nvSpPr>
+      <dsp:spPr>
+        <a:xfrm>
+          <a:off x="573575" y="111224"/>
+          <a:ext cx="1703405" cy="508716"/>
+        </a:xfrm>
+        <a:prstGeom prst="roundRect">
+          <a:avLst/>
+        </a:prstGeom>
+        <a:solidFill>
+          <a:schemeClr val="bg1">
+            <a:lumMod val="95000"/>
+          </a:schemeClr>
+        </a:solidFill>
+        <a:ln w="25400" cap="flat" cmpd="sng" algn="ctr">
+          <a:solidFill>
+            <a:srgbClr val="00B0F0"/>
+          </a:solidFill>
+          <a:prstDash val="solid"/>
+        </a:ln>
+        <a:effectLst/>
+      </dsp:spPr>
+      <dsp:style>
+        <a:lnRef idx="2">
+          <a:scrgbClr r="0" g="0" b="0"/>
+        </a:lnRef>
+        <a:fillRef idx="1">
+          <a:scrgbClr r="0" g="0" b="0"/>
+        </a:fillRef>
+        <a:effectRef idx="0">
+          <a:scrgbClr r="0" g="0" b="0"/>
+        </a:effectRef>
+        <a:fontRef idx="minor">
+          <a:schemeClr val="lt1"/>
+        </a:fontRef>
+      </dsp:style>
+      <dsp:txBody>
+        <a:bodyPr spcFirstLastPara="0" vert="horz" wrap="square" lIns="540000" tIns="35560" rIns="35560" bIns="35560" numCol="1" spcCol="1270" anchor="ctr" anchorCtr="0">
+          <a:noAutofit/>
+        </a:bodyPr>
+        <a:lstStyle/>
+        <a:p>
+          <a:pPr lvl="0" algn="ctr" defTabSz="622300">
+            <a:lnSpc>
+              <a:spcPct val="90000"/>
+            </a:lnSpc>
+            <a:spcBef>
+              <a:spcPct val="0"/>
+            </a:spcBef>
+            <a:spcAft>
+              <a:spcPct val="35000"/>
+            </a:spcAft>
+          </a:pPr>
+          <a:r>
+            <a:rPr lang="en-US" sz="1400" kern="1200" smtClean="0">
+              <a:solidFill>
+                <a:srgbClr val="00B0F0"/>
+              </a:solidFill>
+            </a:rPr>
+            <a:t>Storage Blobs</a:t>
+          </a:r>
+          <a:endParaRPr lang="ru-RU" sz="1400" kern="1200" dirty="0">
+            <a:solidFill>
+              <a:srgbClr val="00B0F0"/>
+            </a:solidFill>
+          </a:endParaRPr>
+        </a:p>
+      </dsp:txBody>
+      <dsp:txXfrm>
+        <a:off x="598408" y="136057"/>
+        <a:ext cx="1653739" cy="459050"/>
+      </dsp:txXfrm>
+    </dsp:sp>
   </dsp:spTree>
 </dsp:drawing>
 </file>
@@ -18629,7 +20658,7 @@
             <a:fld id="{C3402240-18E8-4BA6-A53E-7A1792A59EEC}" type="datetimeFigureOut">
               <a:rPr lang="en-US" smtClean="0"/>
               <a:pPr/>
-              <a:t>6/12/2015</a:t>
+              <a:t>6/14/2015</a:t>
             </a:fld>
             <a:endParaRPr lang="en-US"/>
           </a:p>
@@ -19923,13 +21952,25 @@
           <a:p>
             <a:r>
               <a:rPr lang="en-US" dirty="0" smtClean="0"/>
-              <a:t>How could </a:t>
+              <a:t>How could be created</a:t>
             </a:r>
             <a:r>
-              <a:rPr lang="en-US" smtClean="0"/>
-              <a:t>be created?</a:t>
+              <a:rPr lang="en-US" dirty="0" smtClean="0"/>
+              <a:t>?</a:t>
             </a:r>
-            <a:endParaRPr lang="ru-RU"/>
+          </a:p>
+          <a:p>
+            <a:endParaRPr lang="en-US" dirty="0" smtClean="0"/>
+          </a:p>
+          <a:p>
+            <a:endParaRPr lang="en-US" dirty="0" smtClean="0"/>
+          </a:p>
+          <a:p>
+            <a:r>
+              <a:rPr lang="en-US" dirty="0" smtClean="0"/>
+              <a:t>http://stackoverflow.com/questions/7342597/how-do-you-comment-out-code-in-powershell</a:t>
+            </a:r>
+            <a:endParaRPr lang="ru-RU" dirty="0"/>
           </a:p>
         </p:txBody>
       </p:sp>
@@ -22167,7 +24208,7 @@
             <a:fld id="{5B106E36-FD25-4E2D-B0AA-010F637433A0}" type="datetimeFigureOut">
               <a:rPr lang="ru-RU" smtClean="0"/>
               <a:pPr/>
-              <a:t>12.06.2015</a:t>
+              <a:t>14.06.2015</a:t>
             </a:fld>
             <a:endParaRPr lang="ru-RU"/>
           </a:p>
@@ -22439,7 +24480,7 @@
             <a:fld id="{5B106E36-FD25-4E2D-B0AA-010F637433A0}" type="datetimeFigureOut">
               <a:rPr lang="ru-RU" smtClean="0"/>
               <a:pPr/>
-              <a:t>12.06.2015</a:t>
+              <a:t>14.06.2015</a:t>
             </a:fld>
             <a:endParaRPr lang="ru-RU"/>
           </a:p>
@@ -22632,7 +24673,7 @@
             <a:fld id="{5B106E36-FD25-4E2D-B0AA-010F637433A0}" type="datetimeFigureOut">
               <a:rPr lang="ru-RU" smtClean="0"/>
               <a:pPr/>
-              <a:t>12.06.2015</a:t>
+              <a:t>14.06.2015</a:t>
             </a:fld>
             <a:endParaRPr lang="ru-RU"/>
           </a:p>
@@ -23098,7 +25139,7 @@
             <a:fld id="{5B106E36-FD25-4E2D-B0AA-010F637433A0}" type="datetimeFigureOut">
               <a:rPr lang="ru-RU" smtClean="0"/>
               <a:pPr/>
-              <a:t>12.06.2015</a:t>
+              <a:t>14.06.2015</a:t>
             </a:fld>
             <a:endParaRPr lang="ru-RU"/>
           </a:p>
@@ -23389,7 +25430,7 @@
             <a:fld id="{5B106E36-FD25-4E2D-B0AA-010F637433A0}" type="datetimeFigureOut">
               <a:rPr lang="ru-RU" smtClean="0"/>
               <a:pPr/>
-              <a:t>12.06.2015</a:t>
+              <a:t>14.06.2015</a:t>
             </a:fld>
             <a:endParaRPr lang="ru-RU"/>
           </a:p>
@@ -23690,7 +25731,7 @@
             <a:fld id="{5B106E36-FD25-4E2D-B0AA-010F637433A0}" type="datetimeFigureOut">
               <a:rPr lang="ru-RU" smtClean="0"/>
               <a:pPr/>
-              <a:t>12.06.2015</a:t>
+              <a:t>14.06.2015</a:t>
             </a:fld>
             <a:endParaRPr lang="ru-RU"/>
           </a:p>
@@ -24125,7 +26166,7 @@
             <a:fld id="{5B106E36-FD25-4E2D-B0AA-010F637433A0}" type="datetimeFigureOut">
               <a:rPr lang="ru-RU" smtClean="0"/>
               <a:pPr/>
-              <a:t>12.06.2015</a:t>
+              <a:t>14.06.2015</a:t>
             </a:fld>
             <a:endParaRPr lang="ru-RU"/>
           </a:p>
@@ -24302,7 +26343,7 @@
             <a:fld id="{5B106E36-FD25-4E2D-B0AA-010F637433A0}" type="datetimeFigureOut">
               <a:rPr lang="ru-RU" smtClean="0"/>
               <a:pPr/>
-              <a:t>12.06.2015</a:t>
+              <a:t>14.06.2015</a:t>
             </a:fld>
             <a:endParaRPr lang="ru-RU"/>
           </a:p>
@@ -24442,7 +26483,7 @@
             <a:fld id="{5B106E36-FD25-4E2D-B0AA-010F637433A0}" type="datetimeFigureOut">
               <a:rPr lang="ru-RU" smtClean="0"/>
               <a:pPr/>
-              <a:t>12.06.2015</a:t>
+              <a:t>14.06.2015</a:t>
             </a:fld>
             <a:endParaRPr lang="ru-RU"/>
           </a:p>
@@ -24764,7 +26805,7 @@
             <a:fld id="{5B106E36-FD25-4E2D-B0AA-010F637433A0}" type="datetimeFigureOut">
               <a:rPr lang="ru-RU" smtClean="0"/>
               <a:pPr/>
-              <a:t>12.06.2015</a:t>
+              <a:t>14.06.2015</a:t>
             </a:fld>
             <a:endParaRPr lang="ru-RU"/>
           </a:p>
@@ -25025,7 +27066,7 @@
             <a:fld id="{5B106E36-FD25-4E2D-B0AA-010F637433A0}" type="datetimeFigureOut">
               <a:rPr lang="ru-RU" smtClean="0"/>
               <a:pPr/>
-              <a:t>12.06.2015</a:t>
+              <a:t>14.06.2015</a:t>
             </a:fld>
             <a:endParaRPr lang="ru-RU"/>
           </a:p>
@@ -25245,7 +27286,7 @@
             <a:fld id="{5B106E36-FD25-4E2D-B0AA-010F637433A0}" type="datetimeFigureOut">
               <a:rPr lang="ru-RU" smtClean="0"/>
               <a:pPr/>
-              <a:t>12.06.2015</a:t>
+              <a:t>14.06.2015</a:t>
             </a:fld>
             <a:endParaRPr lang="ru-RU"/>
           </a:p>
@@ -34284,7 +36325,7 @@
           <a:p>
             <a:r>
               <a:rPr lang="en-US" dirty="0" smtClean="0"/>
-              <a:t>Azure Subscription </a:t>
+              <a:t>How to Try (Free Trial)</a:t>
             </a:r>
             <a:endParaRPr lang="ru-RU" dirty="0"/>
           </a:p>
@@ -34305,7 +36346,7 @@
           <a:bodyPr/>
           <a:lstStyle/>
           <a:p>
-            <a:endParaRPr lang="ru-RU"/>
+            <a:endParaRPr lang="ru-RU" dirty="0"/>
           </a:p>
         </p:txBody>
       </p:sp>
@@ -34740,7 +36781,130 @@
   <p:timing>
     <p:tnLst>
       <p:par>
-        <p:cTn id="1" dur="indefinite" restart="never" nodeType="tmRoot"/>
+        <p:cTn id="1" dur="indefinite" restart="never" nodeType="tmRoot">
+          <p:childTnLst>
+            <p:seq concurrent="1" nextAc="seek">
+              <p:cTn id="2" dur="indefinite" nodeType="mainSeq">
+                <p:childTnLst>
+                  <p:par>
+                    <p:cTn id="3" fill="hold">
+                      <p:stCondLst>
+                        <p:cond delay="indefinite"/>
+                        <p:cond evt="onBegin" delay="0">
+                          <p:tn val="2"/>
+                        </p:cond>
+                      </p:stCondLst>
+                      <p:childTnLst>
+                        <p:par>
+                          <p:cTn id="4" fill="hold">
+                            <p:stCondLst>
+                              <p:cond delay="0"/>
+                            </p:stCondLst>
+                            <p:childTnLst>
+                              <p:par>
+                                <p:cTn id="5" presetID="22" presetClass="entr" presetSubtype="1" fill="hold" nodeType="afterEffect">
+                                  <p:stCondLst>
+                                    <p:cond delay="0"/>
+                                  </p:stCondLst>
+                                  <p:childTnLst>
+                                    <p:set>
+                                      <p:cBhvr>
+                                        <p:cTn id="6" dur="1" fill="hold">
+                                          <p:stCondLst>
+                                            <p:cond delay="0"/>
+                                          </p:stCondLst>
+                                        </p:cTn>
+                                        <p:tgtEl>
+                                          <p:spTgt spid="3"/>
+                                        </p:tgtEl>
+                                        <p:attrNameLst>
+                                          <p:attrName>style.visibility</p:attrName>
+                                        </p:attrNameLst>
+                                      </p:cBhvr>
+                                      <p:to>
+                                        <p:strVal val="visible"/>
+                                      </p:to>
+                                    </p:set>
+                                    <p:animEffect transition="in" filter="wipe(up)">
+                                      <p:cBhvr>
+                                        <p:cTn id="7" dur="500"/>
+                                        <p:tgtEl>
+                                          <p:spTgt spid="3"/>
+                                        </p:tgtEl>
+                                      </p:cBhvr>
+                                    </p:animEffect>
+                                  </p:childTnLst>
+                                </p:cTn>
+                              </p:par>
+                            </p:childTnLst>
+                          </p:cTn>
+                        </p:par>
+                        <p:par>
+                          <p:cTn id="8" fill="hold">
+                            <p:stCondLst>
+                              <p:cond delay="500"/>
+                            </p:stCondLst>
+                            <p:childTnLst>
+                              <p:par>
+                                <p:cTn id="9" presetID="22" presetClass="entr" presetSubtype="1" fill="hold" nodeType="afterEffect">
+                                  <p:stCondLst>
+                                    <p:cond delay="0"/>
+                                  </p:stCondLst>
+                                  <p:childTnLst>
+                                    <p:set>
+                                      <p:cBhvr>
+                                        <p:cTn id="10" dur="1" fill="hold">
+                                          <p:stCondLst>
+                                            <p:cond delay="0"/>
+                                          </p:stCondLst>
+                                        </p:cTn>
+                                        <p:tgtEl>
+                                          <p:spTgt spid="9"/>
+                                        </p:tgtEl>
+                                        <p:attrNameLst>
+                                          <p:attrName>style.visibility</p:attrName>
+                                        </p:attrNameLst>
+                                      </p:cBhvr>
+                                      <p:to>
+                                        <p:strVal val="visible"/>
+                                      </p:to>
+                                    </p:set>
+                                    <p:animEffect transition="in" filter="wipe(up)">
+                                      <p:cBhvr>
+                                        <p:cTn id="11" dur="500"/>
+                                        <p:tgtEl>
+                                          <p:spTgt spid="9"/>
+                                        </p:tgtEl>
+                                      </p:cBhvr>
+                                    </p:animEffect>
+                                  </p:childTnLst>
+                                </p:cTn>
+                              </p:par>
+                            </p:childTnLst>
+                          </p:cTn>
+                        </p:par>
+                      </p:childTnLst>
+                    </p:cTn>
+                  </p:par>
+                </p:childTnLst>
+              </p:cTn>
+              <p:prevCondLst>
+                <p:cond evt="onPrev" delay="0">
+                  <p:tgtEl>
+                    <p:sldTgt/>
+                  </p:tgtEl>
+                </p:cond>
+              </p:prevCondLst>
+              <p:nextCondLst>
+                <p:cond evt="onNext" delay="0">
+                  <p:tgtEl>
+                    <p:sldTgt/>
+                  </p:tgtEl>
+                </p:cond>
+              </p:nextCondLst>
+            </p:seq>
+          </p:childTnLst>
+        </p:cTn>
       </p:par>
     </p:tnLst>
   </p:timing>
@@ -34884,15 +37048,401 @@
             <p:ph idx="1"/>
           </p:nvPr>
         </p:nvSpPr>
-        <p:spPr/>
+        <p:spPr>
+          <a:xfrm>
+            <a:off x="2133600" y="1600203"/>
+            <a:ext cx="10696750" cy="7295619"/>
+          </a:xfrm>
+        </p:spPr>
         <p:txBody>
           <a:bodyPr/>
           <a:lstStyle/>
+          <a:p>
+            <a:pPr>
+              <a:lnSpc>
+                <a:spcPct val="150000"/>
+              </a:lnSpc>
+            </a:pPr>
+            <a:r>
+              <a:rPr lang="en-US" dirty="0" smtClean="0"/>
+              <a:t>From Management Portals</a:t>
+            </a:r>
+          </a:p>
+          <a:p>
+            <a:pPr>
+              <a:lnSpc>
+                <a:spcPct val="150000"/>
+              </a:lnSpc>
+            </a:pPr>
+            <a:endParaRPr lang="en-US" dirty="0"/>
+          </a:p>
+          <a:p>
+            <a:pPr>
+              <a:lnSpc>
+                <a:spcPct val="150000"/>
+              </a:lnSpc>
+            </a:pPr>
+            <a:endParaRPr lang="en-US" dirty="0" smtClean="0"/>
+          </a:p>
+          <a:p>
+            <a:r>
+              <a:rPr lang="en-US" dirty="0" smtClean="0"/>
+              <a:t>From Visual Studio Interface</a:t>
+            </a:r>
+          </a:p>
+          <a:p>
+            <a:endParaRPr lang="en-US" dirty="0"/>
+          </a:p>
+          <a:p>
+            <a:endParaRPr lang="en-US" dirty="0" smtClean="0"/>
+          </a:p>
+          <a:p>
+            <a:endParaRPr lang="en-US" dirty="0"/>
+          </a:p>
+          <a:p>
+            <a:endParaRPr lang="en-US" dirty="0" smtClean="0"/>
+          </a:p>
+          <a:p>
+            <a:r>
+              <a:rPr lang="en-US" dirty="0"/>
+              <a:t>Using PowerShell Console</a:t>
+            </a:r>
+            <a:endParaRPr lang="ru-RU" dirty="0"/>
+          </a:p>
+          <a:p>
+            <a:endParaRPr lang="en-US" dirty="0" smtClean="0"/>
+          </a:p>
           <a:p>
             <a:endParaRPr lang="ru-RU" dirty="0"/>
           </a:p>
         </p:txBody>
       </p:sp>
+      <p:grpSp>
+        <p:nvGrpSpPr>
+          <p:cNvPr id="2" name="Group 1"/>
+          <p:cNvGrpSpPr/>
+          <p:nvPr/>
+        </p:nvGrpSpPr>
+        <p:grpSpPr>
+          <a:xfrm>
+            <a:off x="6358273" y="1484784"/>
+            <a:ext cx="5688632" cy="1944216"/>
+            <a:chOff x="3863752" y="2564904"/>
+            <a:chExt cx="5688632" cy="1944216"/>
+          </a:xfrm>
+        </p:grpSpPr>
+        <p:grpSp>
+          <p:nvGrpSpPr>
+            <p:cNvPr id="6" name="Group 5"/>
+            <p:cNvGrpSpPr/>
+            <p:nvPr/>
+          </p:nvGrpSpPr>
+          <p:grpSpPr>
+            <a:xfrm>
+              <a:off x="3863752" y="2564904"/>
+              <a:ext cx="5688632" cy="1944216"/>
+              <a:chOff x="3719736" y="3273204"/>
+              <a:chExt cx="5688632" cy="1944216"/>
+            </a:xfrm>
+          </p:grpSpPr>
+          <p:sp>
+            <p:nvSpPr>
+              <p:cNvPr id="7" name="Rectangle 6"/>
+              <p:cNvSpPr/>
+              <p:nvPr/>
+            </p:nvSpPr>
+            <p:spPr>
+              <a:xfrm>
+                <a:off x="3719736" y="3538513"/>
+                <a:ext cx="5688632" cy="1678907"/>
+              </a:xfrm>
+              <a:prstGeom prst="rect">
+                <a:avLst/>
+              </a:prstGeom>
+              <a:solidFill>
+                <a:schemeClr val="bg1"/>
+              </a:solidFill>
+              <a:ln>
+                <a:solidFill>
+                  <a:srgbClr val="CC0000"/>
+                </a:solidFill>
+              </a:ln>
+            </p:spPr>
+            <p:style>
+              <a:lnRef idx="2">
+                <a:schemeClr val="accent1">
+                  <a:shade val="50000"/>
+                </a:schemeClr>
+              </a:lnRef>
+              <a:fillRef idx="1">
+                <a:schemeClr val="accent1"/>
+              </a:fillRef>
+              <a:effectRef idx="0">
+                <a:schemeClr val="accent1"/>
+              </a:effectRef>
+              <a:fontRef idx="minor">
+                <a:schemeClr val="lt1"/>
+              </a:fontRef>
+            </p:style>
+            <p:txBody>
+              <a:bodyPr rtlCol="0" anchor="ctr"/>
+              <a:lstStyle/>
+              <a:p>
+                <a:pPr algn="ctr"/>
+                <a:endParaRPr lang="ru-RU"/>
+              </a:p>
+            </p:txBody>
+          </p:sp>
+          <p:sp>
+            <p:nvSpPr>
+              <p:cNvPr id="8" name="Rectangle 7"/>
+              <p:cNvSpPr/>
+              <p:nvPr/>
+            </p:nvSpPr>
+            <p:spPr>
+              <a:xfrm>
+                <a:off x="7896200" y="3273204"/>
+                <a:ext cx="1512168" cy="389318"/>
+              </a:xfrm>
+              <a:prstGeom prst="rect">
+                <a:avLst/>
+              </a:prstGeom>
+            </p:spPr>
+            <p:style>
+              <a:lnRef idx="2">
+                <a:schemeClr val="accent2">
+                  <a:shade val="50000"/>
+                </a:schemeClr>
+              </a:lnRef>
+              <a:fillRef idx="1">
+                <a:schemeClr val="accent2"/>
+              </a:fillRef>
+              <a:effectRef idx="0">
+                <a:schemeClr val="accent2"/>
+              </a:effectRef>
+              <a:fontRef idx="minor">
+                <a:schemeClr val="lt1"/>
+              </a:fontRef>
+            </p:style>
+            <p:txBody>
+              <a:bodyPr rtlCol="0" anchor="ctr"/>
+              <a:lstStyle/>
+              <a:p>
+                <a:pPr algn="ctr"/>
+                <a:r>
+                  <a:rPr lang="en-US" dirty="0" smtClean="0"/>
+                  <a:t>Screenshot</a:t>
+                </a:r>
+                <a:endParaRPr lang="ru-RU" dirty="0"/>
+              </a:p>
+            </p:txBody>
+          </p:sp>
+        </p:grpSp>
+        <p:pic>
+          <p:nvPicPr>
+            <p:cNvPr id="11" name="Picture 2" descr="C:\Users\Ryabov\AppData\Local\Temp\SNAGHTMLa2391d2.PNG"/>
+            <p:cNvPicPr>
+              <a:picLocks noChangeAspect="1" noChangeArrowheads="1"/>
+            </p:cNvPicPr>
+            <p:nvPr/>
+          </p:nvPicPr>
+          <p:blipFill>
+            <a:blip r:embed="rId3">
+              <a:extLst>
+                <a:ext uri="{28A0092B-C50C-407E-A947-70E740481C1C}">
+                  <a14:useLocalDpi xmlns:a14="http://schemas.microsoft.com/office/drawing/2010/main" val="0"/>
+                </a:ext>
+              </a:extLst>
+            </a:blip>
+            <a:srcRect/>
+            <a:stretch>
+              <a:fillRect/>
+            </a:stretch>
+          </p:blipFill>
+          <p:spPr bwMode="auto">
+            <a:xfrm>
+              <a:off x="4331308" y="3049679"/>
+              <a:ext cx="4753520" cy="1363984"/>
+            </a:xfrm>
+            <a:prstGeom prst="rect">
+              <a:avLst/>
+            </a:prstGeom>
+            <a:noFill/>
+            <a:extLst>
+              <a:ext uri="{909E8E84-426E-40DD-AFC4-6F175D3DCCD1}">
+                <a14:hiddenFill xmlns:a14="http://schemas.microsoft.com/office/drawing/2010/main">
+                  <a:solidFill>
+                    <a:srgbClr val="FFFFFF"/>
+                  </a:solidFill>
+                </a14:hiddenFill>
+              </a:ext>
+            </a:extLst>
+          </p:spPr>
+        </p:pic>
+      </p:grpSp>
+      <p:grpSp>
+        <p:nvGrpSpPr>
+          <p:cNvPr id="3" name="Group 2"/>
+          <p:cNvGrpSpPr/>
+          <p:nvPr/>
+        </p:nvGrpSpPr>
+        <p:grpSpPr>
+          <a:xfrm>
+            <a:off x="6341535" y="3717032"/>
+            <a:ext cx="5688632" cy="1944216"/>
+            <a:chOff x="469776" y="2528900"/>
+            <a:chExt cx="5688632" cy="1944216"/>
+          </a:xfrm>
+        </p:grpSpPr>
+        <p:grpSp>
+          <p:nvGrpSpPr>
+            <p:cNvPr id="14" name="Group 13"/>
+            <p:cNvGrpSpPr/>
+            <p:nvPr/>
+          </p:nvGrpSpPr>
+          <p:grpSpPr>
+            <a:xfrm>
+              <a:off x="469776" y="2528900"/>
+              <a:ext cx="5688632" cy="1944216"/>
+              <a:chOff x="3719736" y="3273204"/>
+              <a:chExt cx="5688632" cy="1944216"/>
+            </a:xfrm>
+          </p:grpSpPr>
+          <p:sp>
+            <p:nvSpPr>
+              <p:cNvPr id="16" name="Rectangle 15"/>
+              <p:cNvSpPr/>
+              <p:nvPr/>
+            </p:nvSpPr>
+            <p:spPr>
+              <a:xfrm>
+                <a:off x="3719736" y="3538513"/>
+                <a:ext cx="5688632" cy="1678907"/>
+              </a:xfrm>
+              <a:prstGeom prst="rect">
+                <a:avLst/>
+              </a:prstGeom>
+              <a:solidFill>
+                <a:schemeClr val="bg1"/>
+              </a:solidFill>
+              <a:ln>
+                <a:solidFill>
+                  <a:srgbClr val="CC0000"/>
+                </a:solidFill>
+              </a:ln>
+            </p:spPr>
+            <p:style>
+              <a:lnRef idx="2">
+                <a:schemeClr val="accent1">
+                  <a:shade val="50000"/>
+                </a:schemeClr>
+              </a:lnRef>
+              <a:fillRef idx="1">
+                <a:schemeClr val="accent1"/>
+              </a:fillRef>
+              <a:effectRef idx="0">
+                <a:schemeClr val="accent1"/>
+              </a:effectRef>
+              <a:fontRef idx="minor">
+                <a:schemeClr val="lt1"/>
+              </a:fontRef>
+            </p:style>
+            <p:txBody>
+              <a:bodyPr rtlCol="0" anchor="ctr"/>
+              <a:lstStyle/>
+              <a:p>
+                <a:pPr algn="ctr"/>
+                <a:endParaRPr lang="ru-RU"/>
+              </a:p>
+            </p:txBody>
+          </p:sp>
+          <p:sp>
+            <p:nvSpPr>
+              <p:cNvPr id="17" name="Rectangle 16"/>
+              <p:cNvSpPr/>
+              <p:nvPr/>
+            </p:nvSpPr>
+            <p:spPr>
+              <a:xfrm>
+                <a:off x="7896200" y="3273204"/>
+                <a:ext cx="1512168" cy="389318"/>
+              </a:xfrm>
+              <a:prstGeom prst="rect">
+                <a:avLst/>
+              </a:prstGeom>
+            </p:spPr>
+            <p:style>
+              <a:lnRef idx="2">
+                <a:schemeClr val="accent2">
+                  <a:shade val="50000"/>
+                </a:schemeClr>
+              </a:lnRef>
+              <a:fillRef idx="1">
+                <a:schemeClr val="accent2"/>
+              </a:fillRef>
+              <a:effectRef idx="0">
+                <a:schemeClr val="accent2"/>
+              </a:effectRef>
+              <a:fontRef idx="minor">
+                <a:schemeClr val="lt1"/>
+              </a:fontRef>
+            </p:style>
+            <p:txBody>
+              <a:bodyPr rtlCol="0" anchor="ctr"/>
+              <a:lstStyle/>
+              <a:p>
+                <a:pPr algn="ctr"/>
+                <a:r>
+                  <a:rPr lang="en-US" dirty="0" smtClean="0"/>
+                  <a:t>Screenshot</a:t>
+                </a:r>
+                <a:endParaRPr lang="ru-RU" dirty="0"/>
+              </a:p>
+            </p:txBody>
+          </p:sp>
+        </p:grpSp>
+        <p:pic>
+          <p:nvPicPr>
+            <p:cNvPr id="18" name="Picture 4" descr="C:\Users\Ryabov\AppData\Local\Temp\SNAGHTMLa2b65e8.PNG"/>
+            <p:cNvPicPr>
+              <a:picLocks noChangeAspect="1" noChangeArrowheads="1"/>
+            </p:cNvPicPr>
+            <p:nvPr/>
+          </p:nvPicPr>
+          <p:blipFill>
+            <a:blip r:embed="rId4">
+              <a:extLst>
+                <a:ext uri="{28A0092B-C50C-407E-A947-70E740481C1C}">
+                  <a14:useLocalDpi xmlns:a14="http://schemas.microsoft.com/office/drawing/2010/main" val="0"/>
+                </a:ext>
+              </a:extLst>
+            </a:blip>
+            <a:srcRect/>
+            <a:stretch>
+              <a:fillRect/>
+            </a:stretch>
+          </p:blipFill>
+          <p:spPr bwMode="auto">
+            <a:xfrm>
+              <a:off x="1127448" y="3047593"/>
+              <a:ext cx="4521104" cy="1172138"/>
+            </a:xfrm>
+            <a:prstGeom prst="rect">
+              <a:avLst/>
+            </a:prstGeom>
+            <a:noFill/>
+            <a:extLst>
+              <a:ext uri="{909E8E84-426E-40DD-AFC4-6F175D3DCCD1}">
+                <a14:hiddenFill xmlns:a14="http://schemas.microsoft.com/office/drawing/2010/main">
+                  <a:solidFill>
+                    <a:srgbClr val="FFFFFF"/>
+                  </a:solidFill>
+                </a14:hiddenFill>
+              </a:ext>
+            </a:extLst>
+          </p:spPr>
+        </p:pic>
+      </p:grpSp>
     </p:spTree>
     <p:extLst>
       <p:ext uri="{BB962C8B-B14F-4D97-AF65-F5344CB8AC3E}">
@@ -34903,6 +37453,136 @@
   <p:clrMapOvr>
     <a:masterClrMapping/>
   </p:clrMapOvr>
+  <p:timing>
+    <p:tnLst>
+      <p:par>
+        <p:cTn id="1" dur="indefinite" restart="never" nodeType="tmRoot">
+          <p:childTnLst>
+            <p:seq concurrent="1" nextAc="seek">
+              <p:cTn id="2" dur="indefinite" nodeType="mainSeq">
+                <p:childTnLst>
+                  <p:par>
+                    <p:cTn id="3" fill="hold">
+                      <p:stCondLst>
+                        <p:cond delay="indefinite"/>
+                        <p:cond evt="onBegin" delay="0">
+                          <p:tn val="2"/>
+                        </p:cond>
+                      </p:stCondLst>
+                      <p:childTnLst>
+                        <p:par>
+                          <p:cTn id="4" fill="hold">
+                            <p:stCondLst>
+                              <p:cond delay="0"/>
+                            </p:stCondLst>
+                            <p:childTnLst>
+                              <p:par>
+                                <p:cTn id="5" presetID="22" presetClass="entr" presetSubtype="1" fill="hold" nodeType="afterEffect">
+                                  <p:stCondLst>
+                                    <p:cond delay="0"/>
+                                  </p:stCondLst>
+                                  <p:childTnLst>
+                                    <p:set>
+                                      <p:cBhvr>
+                                        <p:cTn id="6" dur="1" fill="hold">
+                                          <p:stCondLst>
+                                            <p:cond delay="0"/>
+                                          </p:stCondLst>
+                                        </p:cTn>
+                                        <p:tgtEl>
+                                          <p:spTgt spid="2"/>
+                                        </p:tgtEl>
+                                        <p:attrNameLst>
+                                          <p:attrName>style.visibility</p:attrName>
+                                        </p:attrNameLst>
+                                      </p:cBhvr>
+                                      <p:to>
+                                        <p:strVal val="visible"/>
+                                      </p:to>
+                                    </p:set>
+                                    <p:animEffect transition="in" filter="wipe(up)">
+                                      <p:cBhvr>
+                                        <p:cTn id="7" dur="500"/>
+                                        <p:tgtEl>
+                                          <p:spTgt spid="2"/>
+                                        </p:tgtEl>
+                                      </p:cBhvr>
+                                    </p:animEffect>
+                                  </p:childTnLst>
+                                </p:cTn>
+                              </p:par>
+                            </p:childTnLst>
+                          </p:cTn>
+                        </p:par>
+                        <p:par>
+                          <p:cTn id="8" fill="hold">
+                            <p:stCondLst>
+                              <p:cond delay="500"/>
+                            </p:stCondLst>
+                            <p:childTnLst>
+                              <p:par>
+                                <p:cTn id="9" presetID="22" presetClass="entr" presetSubtype="1" fill="hold" nodeType="afterEffect">
+                                  <p:stCondLst>
+                                    <p:cond delay="0"/>
+                                  </p:stCondLst>
+                                  <p:childTnLst>
+                                    <p:set>
+                                      <p:cBhvr>
+                                        <p:cTn id="10" dur="1" fill="hold">
+                                          <p:stCondLst>
+                                            <p:cond delay="0"/>
+                                          </p:stCondLst>
+                                        </p:cTn>
+                                        <p:tgtEl>
+                                          <p:spTgt spid="3"/>
+                                        </p:tgtEl>
+                                        <p:attrNameLst>
+                                          <p:attrName>style.visibility</p:attrName>
+                                        </p:attrNameLst>
+                                      </p:cBhvr>
+                                      <p:to>
+                                        <p:strVal val="visible"/>
+                                      </p:to>
+                                    </p:set>
+                                    <p:animEffect transition="in" filter="wipe(up)">
+                                      <p:cBhvr>
+                                        <p:cTn id="11" dur="500"/>
+                                        <p:tgtEl>
+                                          <p:spTgt spid="3"/>
+                                        </p:tgtEl>
+                                      </p:cBhvr>
+                                    </p:animEffect>
+                                  </p:childTnLst>
+                                </p:cTn>
+                              </p:par>
+                            </p:childTnLst>
+                          </p:cTn>
+                        </p:par>
+                      </p:childTnLst>
+                    </p:cTn>
+                  </p:par>
+                </p:childTnLst>
+              </p:cTn>
+              <p:prevCondLst>
+                <p:cond evt="onPrev" delay="0">
+                  <p:tgtEl>
+                    <p:sldTgt/>
+                  </p:tgtEl>
+                </p:cond>
+              </p:prevCondLst>
+              <p:nextCondLst>
+                <p:cond evt="onNext" delay="0">
+                  <p:tgtEl>
+                    <p:sldTgt/>
+                  </p:tgtEl>
+                </p:cond>
+              </p:nextCondLst>
+            </p:seq>
+          </p:childTnLst>
+        </p:cTn>
+      </p:par>
+    </p:tnLst>
+  </p:timing>
 </p:sld>
 </file>
 
@@ -35221,229 +37901,267 @@
           </a:p>
         </p:txBody>
       </p:sp>
-      <p:sp>
-        <p:nvSpPr>
-          <p:cNvPr id="6" name="Rounded Rectangle 5"/>
-          <p:cNvSpPr/>
+      <p:grpSp>
+        <p:nvGrpSpPr>
+          <p:cNvPr id="4" name="Group 3"/>
+          <p:cNvGrpSpPr/>
           <p:nvPr/>
-        </p:nvSpPr>
-        <p:spPr>
+        </p:nvGrpSpPr>
+        <p:grpSpPr>
           <a:xfrm>
-            <a:off x="1806784" y="1747370"/>
+            <a:off x="1806784" y="1412776"/>
             <a:ext cx="10009112" cy="1393597"/>
+            <a:chOff x="1806784" y="1747370"/>
+            <a:chExt cx="10009112" cy="1393597"/>
           </a:xfrm>
-          <a:prstGeom prst="roundRect">
-            <a:avLst/>
-          </a:prstGeom>
-          <a:solidFill>
-            <a:schemeClr val="bg1">
-              <a:lumMod val="95000"/>
-            </a:schemeClr>
-          </a:solidFill>
-          <a:ln>
+        </p:grpSpPr>
+        <p:sp>
+          <p:nvSpPr>
+            <p:cNvPr id="6" name="Rounded Rectangle 5"/>
+            <p:cNvSpPr/>
+            <p:nvPr/>
+          </p:nvSpPr>
+          <p:spPr>
+            <a:xfrm>
+              <a:off x="1806784" y="1747370"/>
+              <a:ext cx="10009112" cy="1393597"/>
+            </a:xfrm>
+            <a:prstGeom prst="roundRect">
+              <a:avLst/>
+            </a:prstGeom>
             <a:solidFill>
-              <a:srgbClr val="00B0F0"/>
+              <a:schemeClr val="bg1">
+                <a:lumMod val="95000"/>
+              </a:schemeClr>
             </a:solidFill>
-          </a:ln>
-        </p:spPr>
-        <p:style>
-          <a:lnRef idx="2">
-            <a:schemeClr val="accent1">
-              <a:shade val="50000"/>
-            </a:schemeClr>
-          </a:lnRef>
-          <a:fillRef idx="1">
-            <a:schemeClr val="accent1"/>
-          </a:fillRef>
-          <a:effectRef idx="0">
-            <a:schemeClr val="accent1"/>
-          </a:effectRef>
-          <a:fontRef idx="minor">
-            <a:schemeClr val="lt1"/>
-          </a:fontRef>
-        </p:style>
-        <p:txBody>
-          <a:bodyPr rtlCol="0" anchor="ctr"/>
-          <a:lstStyle/>
-          <a:p>
-            <a:pPr algn="ctr"/>
-            <a:endParaRPr lang="ru-RU"/>
-          </a:p>
-        </p:txBody>
-      </p:sp>
-      <p:sp>
-        <p:nvSpPr>
-          <p:cNvPr id="7" name="Rectangle 6"/>
-          <p:cNvSpPr/>
+            <a:ln>
+              <a:solidFill>
+                <a:srgbClr val="00B0F0"/>
+              </a:solidFill>
+            </a:ln>
+          </p:spPr>
+          <p:style>
+            <a:lnRef idx="2">
+              <a:schemeClr val="accent1">
+                <a:shade val="50000"/>
+              </a:schemeClr>
+            </a:lnRef>
+            <a:fillRef idx="1">
+              <a:schemeClr val="accent1"/>
+            </a:fillRef>
+            <a:effectRef idx="0">
+              <a:schemeClr val="accent1"/>
+            </a:effectRef>
+            <a:fontRef idx="minor">
+              <a:schemeClr val="lt1"/>
+            </a:fontRef>
+          </p:style>
+          <p:txBody>
+            <a:bodyPr rtlCol="0" anchor="ctr"/>
+            <a:lstStyle/>
+            <a:p>
+              <a:pPr algn="ctr"/>
+              <a:endParaRPr lang="ru-RU"/>
+            </a:p>
+          </p:txBody>
+        </p:sp>
+        <p:sp>
+          <p:nvSpPr>
+            <p:cNvPr id="7" name="Rectangle 6"/>
+            <p:cNvSpPr/>
+            <p:nvPr/>
+          </p:nvSpPr>
+          <p:spPr>
+            <a:xfrm>
+              <a:off x="1943100" y="2019378"/>
+              <a:ext cx="9728780" cy="830997"/>
+            </a:xfrm>
+            <a:prstGeom prst="rect">
+              <a:avLst/>
+            </a:prstGeom>
+          </p:spPr>
+          <p:txBody>
+            <a:bodyPr wrap="square">
+              <a:spAutoFit/>
+            </a:bodyPr>
+            <a:lstStyle/>
+            <a:p>
+              <a:r>
+                <a:rPr lang="en-US" sz="2400" dirty="0" smtClean="0"/>
+                <a:t>	</a:t>
+              </a:r>
+              <a:r>
+                <a:rPr lang="en-US" sz="2400" dirty="0" smtClean="0"/>
+                <a:t>Just create </a:t>
+              </a:r>
+              <a:r>
+                <a:rPr lang="en-US" sz="2400" dirty="0" smtClean="0"/>
+                <a:t>FTP credentials and use provided on Management Portal access </a:t>
+              </a:r>
+              <a:r>
+                <a:rPr lang="en-US" sz="2400" dirty="0" smtClean="0"/>
+                <a:t>points</a:t>
+              </a:r>
+              <a:endParaRPr lang="en-US" sz="2400" dirty="0"/>
+            </a:p>
+          </p:txBody>
+        </p:sp>
+      </p:grpSp>
+      <p:grpSp>
+        <p:nvGrpSpPr>
+          <p:cNvPr id="3" name="Group 2"/>
+          <p:cNvGrpSpPr/>
           <p:nvPr/>
-        </p:nvSpPr>
-        <p:spPr>
+        </p:nvGrpSpPr>
+        <p:grpSpPr>
           <a:xfrm>
-            <a:off x="1943100" y="2019378"/>
-            <a:ext cx="9728780" cy="830997"/>
+            <a:off x="3719736" y="2938610"/>
+            <a:ext cx="5688632" cy="3358215"/>
+            <a:chOff x="3719736" y="3273204"/>
+            <a:chExt cx="5688632" cy="3358215"/>
           </a:xfrm>
-          <a:prstGeom prst="rect">
-            <a:avLst/>
-          </a:prstGeom>
-        </p:spPr>
-        <p:txBody>
-          <a:bodyPr wrap="square">
-            <a:spAutoFit/>
-          </a:bodyPr>
-          <a:lstStyle/>
-          <a:p>
-            <a:r>
-              <a:rPr lang="en-US" sz="2400" dirty="0" smtClean="0"/>
-              <a:t>	</a:t>
-            </a:r>
-            <a:r>
-              <a:rPr lang="en-US" sz="2400" dirty="0" smtClean="0"/>
-              <a:t>Just create FTP credentials and use provided on Management Portal access points</a:t>
-            </a:r>
-            <a:endParaRPr lang="en-US" sz="2400" dirty="0"/>
-          </a:p>
-        </p:txBody>
-      </p:sp>
-      <p:sp>
-        <p:nvSpPr>
-          <p:cNvPr id="13" name="Rectangle 12"/>
-          <p:cNvSpPr/>
-          <p:nvPr/>
-        </p:nvSpPr>
-        <p:spPr>
-          <a:xfrm>
-            <a:off x="3719736" y="3538512"/>
-            <a:ext cx="5688632" cy="3092907"/>
-          </a:xfrm>
-          <a:prstGeom prst="rect">
-            <a:avLst/>
-          </a:prstGeom>
-          <a:solidFill>
-            <a:schemeClr val="bg1"/>
-          </a:solidFill>
-          <a:ln>
+        </p:grpSpPr>
+        <p:sp>
+          <p:nvSpPr>
+            <p:cNvPr id="13" name="Rectangle 12"/>
+            <p:cNvSpPr/>
+            <p:nvPr/>
+          </p:nvSpPr>
+          <p:spPr>
+            <a:xfrm>
+              <a:off x="3719736" y="3538512"/>
+              <a:ext cx="5688632" cy="3092907"/>
+            </a:xfrm>
+            <a:prstGeom prst="rect">
+              <a:avLst/>
+            </a:prstGeom>
             <a:solidFill>
-              <a:srgbClr val="CC0000"/>
+              <a:schemeClr val="bg1"/>
             </a:solidFill>
-          </a:ln>
-        </p:spPr>
-        <p:style>
-          <a:lnRef idx="2">
-            <a:schemeClr val="accent1">
-              <a:shade val="50000"/>
-            </a:schemeClr>
-          </a:lnRef>
-          <a:fillRef idx="1">
-            <a:schemeClr val="accent1"/>
-          </a:fillRef>
-          <a:effectRef idx="0">
-            <a:schemeClr val="accent1"/>
-          </a:effectRef>
-          <a:fontRef idx="minor">
-            <a:schemeClr val="lt1"/>
-          </a:fontRef>
-        </p:style>
-        <p:txBody>
-          <a:bodyPr rtlCol="0" anchor="ctr"/>
-          <a:lstStyle/>
-          <a:p>
-            <a:pPr algn="ctr"/>
-            <a:endParaRPr lang="ru-RU"/>
-          </a:p>
-        </p:txBody>
-      </p:sp>
-      <p:sp>
-        <p:nvSpPr>
-          <p:cNvPr id="15" name="Rectangle 14"/>
-          <p:cNvSpPr/>
-          <p:nvPr/>
-        </p:nvSpPr>
-        <p:spPr>
-          <a:xfrm>
-            <a:off x="7896200" y="3273204"/>
-            <a:ext cx="1512168" cy="389318"/>
-          </a:xfrm>
-          <a:prstGeom prst="rect">
-            <a:avLst/>
-          </a:prstGeom>
-        </p:spPr>
-        <p:style>
-          <a:lnRef idx="2">
-            <a:schemeClr val="accent2">
-              <a:shade val="50000"/>
-            </a:schemeClr>
-          </a:lnRef>
-          <a:fillRef idx="1">
-            <a:schemeClr val="accent2"/>
-          </a:fillRef>
-          <a:effectRef idx="0">
-            <a:schemeClr val="accent2"/>
-          </a:effectRef>
-          <a:fontRef idx="minor">
-            <a:schemeClr val="lt1"/>
-          </a:fontRef>
-        </p:style>
-        <p:txBody>
-          <a:bodyPr rtlCol="0" anchor="ctr"/>
-          <a:lstStyle/>
-          <a:p>
-            <a:pPr algn="ctr"/>
-            <a:r>
-              <a:rPr lang="en-US" dirty="0" smtClean="0"/>
-              <a:t>Screenshots</a:t>
-            </a:r>
-            <a:endParaRPr lang="ru-RU" dirty="0"/>
-          </a:p>
-        </p:txBody>
-      </p:sp>
-      <p:pic>
-        <p:nvPicPr>
-          <p:cNvPr id="9" name="Picture 8"/>
-          <p:cNvPicPr>
-            <a:picLocks noChangeAspect="1"/>
-          </p:cNvPicPr>
-          <p:nvPr/>
-        </p:nvPicPr>
-        <p:blipFill>
-          <a:blip r:embed="rId2"/>
-          <a:stretch>
-            <a:fillRect/>
-          </a:stretch>
-        </p:blipFill>
-        <p:spPr>
-          <a:xfrm>
-            <a:off x="4727848" y="3733519"/>
-            <a:ext cx="3866667" cy="533333"/>
-          </a:xfrm>
-          <a:prstGeom prst="rect">
-            <a:avLst/>
-          </a:prstGeom>
-        </p:spPr>
-      </p:pic>
-      <p:pic>
-        <p:nvPicPr>
-          <p:cNvPr id="10" name="Picture 9"/>
-          <p:cNvPicPr>
-            <a:picLocks noChangeAspect="1"/>
-          </p:cNvPicPr>
-          <p:nvPr/>
-        </p:nvPicPr>
-        <p:blipFill>
-          <a:blip r:embed="rId3"/>
-          <a:stretch>
-            <a:fillRect/>
-          </a:stretch>
-        </p:blipFill>
-        <p:spPr>
-          <a:xfrm>
-            <a:off x="4832609" y="4266852"/>
-            <a:ext cx="3657143" cy="2266667"/>
-          </a:xfrm>
-          <a:prstGeom prst="rect">
-            <a:avLst/>
-          </a:prstGeom>
-        </p:spPr>
-      </p:pic>
+            <a:ln>
+              <a:solidFill>
+                <a:srgbClr val="CC0000"/>
+              </a:solidFill>
+            </a:ln>
+          </p:spPr>
+          <p:style>
+            <a:lnRef idx="2">
+              <a:schemeClr val="accent1">
+                <a:shade val="50000"/>
+              </a:schemeClr>
+            </a:lnRef>
+            <a:fillRef idx="1">
+              <a:schemeClr val="accent1"/>
+            </a:fillRef>
+            <a:effectRef idx="0">
+              <a:schemeClr val="accent1"/>
+            </a:effectRef>
+            <a:fontRef idx="minor">
+              <a:schemeClr val="lt1"/>
+            </a:fontRef>
+          </p:style>
+          <p:txBody>
+            <a:bodyPr rtlCol="0" anchor="ctr"/>
+            <a:lstStyle/>
+            <a:p>
+              <a:pPr algn="ctr"/>
+              <a:endParaRPr lang="ru-RU"/>
+            </a:p>
+          </p:txBody>
+        </p:sp>
+        <p:sp>
+          <p:nvSpPr>
+            <p:cNvPr id="15" name="Rectangle 14"/>
+            <p:cNvSpPr/>
+            <p:nvPr/>
+          </p:nvSpPr>
+          <p:spPr>
+            <a:xfrm>
+              <a:off x="7896200" y="3273204"/>
+              <a:ext cx="1512168" cy="389318"/>
+            </a:xfrm>
+            <a:prstGeom prst="rect">
+              <a:avLst/>
+            </a:prstGeom>
+          </p:spPr>
+          <p:style>
+            <a:lnRef idx="2">
+              <a:schemeClr val="accent2">
+                <a:shade val="50000"/>
+              </a:schemeClr>
+            </a:lnRef>
+            <a:fillRef idx="1">
+              <a:schemeClr val="accent2"/>
+            </a:fillRef>
+            <a:effectRef idx="0">
+              <a:schemeClr val="accent2"/>
+            </a:effectRef>
+            <a:fontRef idx="minor">
+              <a:schemeClr val="lt1"/>
+            </a:fontRef>
+          </p:style>
+          <p:txBody>
+            <a:bodyPr rtlCol="0" anchor="ctr"/>
+            <a:lstStyle/>
+            <a:p>
+              <a:pPr algn="ctr"/>
+              <a:r>
+                <a:rPr lang="en-US" dirty="0" smtClean="0"/>
+                <a:t>Screenshots</a:t>
+              </a:r>
+              <a:endParaRPr lang="ru-RU" dirty="0"/>
+            </a:p>
+          </p:txBody>
+        </p:sp>
+        <p:pic>
+          <p:nvPicPr>
+            <p:cNvPr id="9" name="Picture 8"/>
+            <p:cNvPicPr>
+              <a:picLocks noChangeAspect="1"/>
+            </p:cNvPicPr>
+            <p:nvPr/>
+          </p:nvPicPr>
+          <p:blipFill>
+            <a:blip r:embed="rId2"/>
+            <a:stretch>
+              <a:fillRect/>
+            </a:stretch>
+          </p:blipFill>
+          <p:spPr>
+            <a:xfrm>
+              <a:off x="4727848" y="3733519"/>
+              <a:ext cx="3866667" cy="533333"/>
+            </a:xfrm>
+            <a:prstGeom prst="rect">
+              <a:avLst/>
+            </a:prstGeom>
+          </p:spPr>
+        </p:pic>
+        <p:pic>
+          <p:nvPicPr>
+            <p:cNvPr id="10" name="Picture 9"/>
+            <p:cNvPicPr>
+              <a:picLocks noChangeAspect="1"/>
+            </p:cNvPicPr>
+            <p:nvPr/>
+          </p:nvPicPr>
+          <p:blipFill>
+            <a:blip r:embed="rId3"/>
+            <a:stretch>
+              <a:fillRect/>
+            </a:stretch>
+          </p:blipFill>
+          <p:spPr>
+            <a:xfrm>
+              <a:off x="4832609" y="4266852"/>
+              <a:ext cx="3657143" cy="2266667"/>
+            </a:xfrm>
+            <a:prstGeom prst="rect">
+              <a:avLst/>
+            </a:prstGeom>
+          </p:spPr>
+        </p:pic>
+      </p:grpSp>
     </p:spTree>
     <p:extLst>
       <p:ext uri="{BB962C8B-B14F-4D97-AF65-F5344CB8AC3E}">

</xml_diff>

<commit_message>
Work with Presentation/2015 - Microsoft Azure.pptx
</commit_message>
<xml_diff>
--- a/Presentation/2015 - Microsoft Azure.pptx
+++ b/Presentation/2015 - Microsoft Azure.pptx
@@ -5,7 +5,7 @@
     <p:sldMasterId id="2147483660" r:id="rId1"/>
   </p:sldMasterIdLst>
   <p:notesMasterIdLst>
-    <p:notesMasterId r:id="rId36"/>
+    <p:notesMasterId r:id="rId38"/>
   </p:notesMasterIdLst>
   <p:sldIdLst>
     <p:sldId id="256" r:id="rId2"/>
@@ -32,16 +32,18 @@
     <p:sldId id="384" r:id="rId23"/>
     <p:sldId id="385" r:id="rId24"/>
     <p:sldId id="386" r:id="rId25"/>
-    <p:sldId id="390" r:id="rId26"/>
-    <p:sldId id="389" r:id="rId27"/>
-    <p:sldId id="379" r:id="rId28"/>
-    <p:sldId id="377" r:id="rId29"/>
-    <p:sldId id="375" r:id="rId30"/>
-    <p:sldId id="376" r:id="rId31"/>
-    <p:sldId id="382" r:id="rId32"/>
-    <p:sldId id="381" r:id="rId33"/>
-    <p:sldId id="374" r:id="rId34"/>
-    <p:sldId id="342" r:id="rId35"/>
+    <p:sldId id="389" r:id="rId26"/>
+    <p:sldId id="379" r:id="rId27"/>
+    <p:sldId id="391" r:id="rId28"/>
+    <p:sldId id="390" r:id="rId29"/>
+    <p:sldId id="392" r:id="rId30"/>
+    <p:sldId id="377" r:id="rId31"/>
+    <p:sldId id="375" r:id="rId32"/>
+    <p:sldId id="376" r:id="rId33"/>
+    <p:sldId id="382" r:id="rId34"/>
+    <p:sldId id="381" r:id="rId35"/>
+    <p:sldId id="374" r:id="rId36"/>
+    <p:sldId id="342" r:id="rId37"/>
   </p:sldIdLst>
   <p:sldSz cx="12192000" cy="6858000"/>
   <p:notesSz cx="6858000" cy="9144000"/>
@@ -169,9 +171,11 @@
             <p14:sldId id="384"/>
             <p14:sldId id="385"/>
             <p14:sldId id="386"/>
-            <p14:sldId id="390"/>
             <p14:sldId id="389"/>
             <p14:sldId id="379"/>
+            <p14:sldId id="391"/>
+            <p14:sldId id="390"/>
+            <p14:sldId id="392"/>
             <p14:sldId id="377"/>
             <p14:sldId id="375"/>
             <p14:sldId id="376"/>
@@ -340,7 +344,6 @@
             <c:showLeaderLines val="0"/>
             <c:extLst>
               <c:ext xmlns:c15="http://schemas.microsoft.com/office/drawing/2012/chart" uri="{CE6537A1-D6FC-4f65-9D91-7224C49458BB}">
-                <c15:layout/>
                 <c15:showLeaderLines val="1"/>
                 <c15:leaderLines>
                   <c:spPr>
@@ -484,7 +487,6 @@
             <c:showLeaderLines val="0"/>
             <c:extLst>
               <c:ext xmlns:c15="http://schemas.microsoft.com/office/drawing/2012/chart" uri="{CE6537A1-D6FC-4f65-9D91-7224C49458BB}">
-                <c15:layout/>
                 <c15:showLeaderLines val="1"/>
                 <c15:leaderLines>
                   <c:spPr>
@@ -628,7 +630,6 @@
             <c:showLeaderLines val="0"/>
             <c:extLst>
               <c:ext xmlns:c15="http://schemas.microsoft.com/office/drawing/2012/chart" uri="{CE6537A1-D6FC-4f65-9D91-7224C49458BB}">
-                <c15:layout/>
                 <c15:showLeaderLines val="1"/>
                 <c15:leaderLines>
                   <c:spPr>
@@ -717,12 +718,12 @@
         </c:dLbls>
         <c:gapWidth val="150"/>
         <c:shape val="box"/>
-        <c:axId val="79465680"/>
-        <c:axId val="79467856"/>
+        <c:axId val="231273024"/>
+        <c:axId val="231273568"/>
         <c:axId val="0"/>
       </c:bar3DChart>
       <c:catAx>
-        <c:axId val="79465680"/>
+        <c:axId val="231273024"/>
         <c:scaling>
           <c:orientation val="minMax"/>
         </c:scaling>
@@ -773,7 +774,7 @@
             <a:endParaRPr lang="ru-RU"/>
           </a:p>
         </c:txPr>
-        <c:crossAx val="79467856"/>
+        <c:crossAx val="231273568"/>
         <c:crosses val="autoZero"/>
         <c:auto val="1"/>
         <c:lblAlgn val="ctr"/>
@@ -781,7 +782,7 @@
         <c:noMultiLvlLbl val="0"/>
       </c:catAx>
       <c:valAx>
-        <c:axId val="79467856"/>
+        <c:axId val="231273568"/>
         <c:scaling>
           <c:orientation val="minMax"/>
           <c:max val="1"/>
@@ -835,7 +836,7 @@
             <a:endParaRPr lang="ru-RU"/>
           </a:p>
         </c:txPr>
-        <c:crossAx val="79465680"/>
+        <c:crossAx val="231273024"/>
         <c:crosses val="autoZero"/>
         <c:crossBetween val="between"/>
       </c:valAx>
@@ -1064,7 +1065,6 @@
             <c:showLeaderLines val="0"/>
             <c:extLst>
               <c:ext xmlns:c15="http://schemas.microsoft.com/office/drawing/2012/chart" uri="{CE6537A1-D6FC-4f65-9D91-7224C49458BB}">
-                <c15:layout/>
                 <c15:showLeaderLines val="1"/>
                 <c15:leaderLines>
                   <c:spPr>
@@ -1184,9 +1184,7 @@
               <c:showPercent val="0"/>
               <c:showBubbleSize val="0"/>
               <c:extLst>
-                <c:ext xmlns:c15="http://schemas.microsoft.com/office/drawing/2012/chart" uri="{CE6537A1-D6FC-4f65-9D91-7224C49458BB}">
-                  <c15:layout/>
-                </c:ext>
+                <c:ext xmlns:c15="http://schemas.microsoft.com/office/drawing/2012/chart" uri="{CE6537A1-D6FC-4f65-9D91-7224C49458BB}"/>
               </c:extLst>
             </c:dLbl>
             <c:dLbl>
@@ -1204,9 +1202,7 @@
               <c:showPercent val="0"/>
               <c:showBubbleSize val="0"/>
               <c:extLst>
-                <c:ext xmlns:c15="http://schemas.microsoft.com/office/drawing/2012/chart" uri="{CE6537A1-D6FC-4f65-9D91-7224C49458BB}">
-                  <c15:layout/>
-                </c:ext>
+                <c:ext xmlns:c15="http://schemas.microsoft.com/office/drawing/2012/chart" uri="{CE6537A1-D6FC-4f65-9D91-7224C49458BB}"/>
               </c:extLst>
             </c:dLbl>
             <c:dLbl>
@@ -1224,9 +1220,7 @@
               <c:showPercent val="0"/>
               <c:showBubbleSize val="0"/>
               <c:extLst>
-                <c:ext xmlns:c15="http://schemas.microsoft.com/office/drawing/2012/chart" uri="{CE6537A1-D6FC-4f65-9D91-7224C49458BB}">
-                  <c15:layout/>
-                </c:ext>
+                <c:ext xmlns:c15="http://schemas.microsoft.com/office/drawing/2012/chart" uri="{CE6537A1-D6FC-4f65-9D91-7224C49458BB}"/>
               </c:extLst>
             </c:dLbl>
             <c:dLbl>
@@ -1299,9 +1293,7 @@
               <c:showPercent val="0"/>
               <c:showBubbleSize val="0"/>
               <c:extLst>
-                <c:ext xmlns:c15="http://schemas.microsoft.com/office/drawing/2012/chart" uri="{CE6537A1-D6FC-4f65-9D91-7224C49458BB}">
-                  <c15:layout/>
-                </c:ext>
+                <c:ext xmlns:c15="http://schemas.microsoft.com/office/drawing/2012/chart" uri="{CE6537A1-D6FC-4f65-9D91-7224C49458BB}"/>
               </c:extLst>
             </c:dLbl>
             <c:dLbl>
@@ -1319,9 +1311,7 @@
               <c:showPercent val="0"/>
               <c:showBubbleSize val="0"/>
               <c:extLst>
-                <c:ext xmlns:c15="http://schemas.microsoft.com/office/drawing/2012/chart" uri="{CE6537A1-D6FC-4f65-9D91-7224C49458BB}">
-                  <c15:layout/>
-                </c:ext>
+                <c:ext xmlns:c15="http://schemas.microsoft.com/office/drawing/2012/chart" uri="{CE6537A1-D6FC-4f65-9D91-7224C49458BB}"/>
               </c:extLst>
             </c:dLbl>
             <c:dLbl>
@@ -1339,9 +1329,7 @@
               <c:showPercent val="0"/>
               <c:showBubbleSize val="0"/>
               <c:extLst>
-                <c:ext xmlns:c15="http://schemas.microsoft.com/office/drawing/2012/chart" uri="{CE6537A1-D6FC-4f65-9D91-7224C49458BB}">
-                  <c15:layout/>
-                </c:ext>
+                <c:ext xmlns:c15="http://schemas.microsoft.com/office/drawing/2012/chart" uri="{CE6537A1-D6FC-4f65-9D91-7224C49458BB}"/>
               </c:extLst>
             </c:dLbl>
             <c:numFmt formatCode="0%" sourceLinked="0"/>
@@ -1383,7 +1371,6 @@
             <c:showLeaderLines val="0"/>
             <c:extLst>
               <c:ext xmlns:c15="http://schemas.microsoft.com/office/drawing/2012/chart" uri="{CE6537A1-D6FC-4f65-9D91-7224C49458BB}">
-                <c15:layout/>
                 <c15:showLeaderLines val="1"/>
                 <c15:leaderLines>
                   <c:spPr>
@@ -1472,12 +1459,12 @@
         </c:dLbls>
         <c:gapWidth val="150"/>
         <c:shape val="box"/>
-        <c:axId val="386501600"/>
-        <c:axId val="386495072"/>
+        <c:axId val="231285536"/>
+        <c:axId val="231280640"/>
         <c:axId val="0"/>
       </c:bar3DChart>
       <c:catAx>
-        <c:axId val="386501600"/>
+        <c:axId val="231285536"/>
         <c:scaling>
           <c:orientation val="minMax"/>
         </c:scaling>
@@ -1528,7 +1515,7 @@
             <a:endParaRPr lang="ru-RU"/>
           </a:p>
         </c:txPr>
-        <c:crossAx val="386495072"/>
+        <c:crossAx val="231280640"/>
         <c:crosses val="autoZero"/>
         <c:auto val="1"/>
         <c:lblAlgn val="ctr"/>
@@ -1536,7 +1523,7 @@
         <c:noMultiLvlLbl val="0"/>
       </c:catAx>
       <c:valAx>
-        <c:axId val="386495072"/>
+        <c:axId val="231280640"/>
         <c:scaling>
           <c:orientation val="minMax"/>
           <c:max val="1"/>
@@ -1590,7 +1577,7 @@
             <a:endParaRPr lang="ru-RU"/>
           </a:p>
         </c:txPr>
-        <c:crossAx val="386501600"/>
+        <c:crossAx val="231285536"/>
         <c:crosses val="autoZero"/>
         <c:crossBetween val="between"/>
       </c:valAx>
@@ -1725,7 +1712,6 @@
           </a:p>
         </c:rich>
       </c:tx>
-      <c:layout/>
       <c:overlay val="0"/>
       <c:spPr>
         <a:noFill/>
@@ -1827,7 +1813,6 @@
             <c:showLeaderLines val="0"/>
             <c:extLst>
               <c:ext xmlns:c15="http://schemas.microsoft.com/office/drawing/2012/chart" uri="{CE6537A1-D6FC-4f65-9D91-7224C49458BB}">
-                <c15:layout/>
                 <c15:showLeaderLines val="1"/>
                 <c15:leaderLines>
                   <c:spPr>
@@ -1935,7 +1920,6 @@
             <c:showLeaderLines val="0"/>
             <c:extLst>
               <c:ext xmlns:c15="http://schemas.microsoft.com/office/drawing/2012/chart" uri="{CE6537A1-D6FC-4f65-9D91-7224C49458BB}">
-                <c15:layout/>
                 <c15:showLeaderLines val="1"/>
                 <c15:leaderLines>
                   <c:spPr>
@@ -2043,7 +2027,6 @@
             <c:showLeaderLines val="0"/>
             <c:extLst>
               <c:ext xmlns:c15="http://schemas.microsoft.com/office/drawing/2012/chart" uri="{CE6537A1-D6FC-4f65-9D91-7224C49458BB}">
-                <c15:layout/>
                 <c15:showLeaderLines val="1"/>
                 <c15:leaderLines>
                   <c:spPr>
@@ -2151,7 +2134,6 @@
             <c:showLeaderLines val="0"/>
             <c:extLst>
               <c:ext xmlns:c15="http://schemas.microsoft.com/office/drawing/2012/chart" uri="{CE6537A1-D6FC-4f65-9D91-7224C49458BB}">
-                <c15:layout/>
                 <c15:showLeaderLines val="1"/>
                 <c15:leaderLines>
                   <c:spPr>
@@ -2204,11 +2186,11 @@
         </c:dLbls>
         <c:gapWidth val="219"/>
         <c:overlap val="-27"/>
-        <c:axId val="79474384"/>
-        <c:axId val="79473296"/>
+        <c:axId val="231278464"/>
+        <c:axId val="231279008"/>
       </c:barChart>
       <c:catAx>
-        <c:axId val="79474384"/>
+        <c:axId val="231278464"/>
         <c:scaling>
           <c:orientation val="minMax"/>
         </c:scaling>
@@ -2251,7 +2233,7 @@
             <a:endParaRPr lang="ru-RU"/>
           </a:p>
         </c:txPr>
-        <c:crossAx val="79473296"/>
+        <c:crossAx val="231279008"/>
         <c:crosses val="autoZero"/>
         <c:auto val="1"/>
         <c:lblAlgn val="ctr"/>
@@ -2259,7 +2241,7 @@
         <c:noMultiLvlLbl val="0"/>
       </c:catAx>
       <c:valAx>
-        <c:axId val="79473296"/>
+        <c:axId val="231279008"/>
         <c:scaling>
           <c:orientation val="minMax"/>
         </c:scaling>
@@ -2310,7 +2292,7 @@
             <a:endParaRPr lang="ru-RU"/>
           </a:p>
         </c:txPr>
-        <c:crossAx val="79474384"/>
+        <c:crossAx val="231278464"/>
         <c:crosses val="autoZero"/>
         <c:crossBetween val="between"/>
         <c:majorUnit val="1"/>
@@ -2325,7 +2307,6 @@
     </c:plotArea>
     <c:legend>
       <c:legendPos val="b"/>
-      <c:layout/>
       <c:overlay val="0"/>
       <c:spPr>
         <a:noFill/>
@@ -2427,7 +2408,6 @@
           </a:p>
         </c:rich>
       </c:tx>
-      <c:layout/>
       <c:overlay val="0"/>
       <c:spPr>
         <a:noFill/>
@@ -2529,7 +2509,6 @@
             <c:showLeaderLines val="0"/>
             <c:extLst>
               <c:ext xmlns:c15="http://schemas.microsoft.com/office/drawing/2012/chart" uri="{CE6537A1-D6FC-4f65-9D91-7224C49458BB}">
-                <c15:layout/>
                 <c15:showLeaderLines val="1"/>
                 <c15:leaderLines>
                   <c:spPr>
@@ -2637,7 +2616,6 @@
             <c:showLeaderLines val="0"/>
             <c:extLst>
               <c:ext xmlns:c15="http://schemas.microsoft.com/office/drawing/2012/chart" uri="{CE6537A1-D6FC-4f65-9D91-7224C49458BB}">
-                <c15:layout/>
                 <c15:showLeaderLines val="1"/>
                 <c15:leaderLines>
                   <c:spPr>
@@ -2745,7 +2723,6 @@
             <c:showLeaderLines val="0"/>
             <c:extLst>
               <c:ext xmlns:c15="http://schemas.microsoft.com/office/drawing/2012/chart" uri="{CE6537A1-D6FC-4f65-9D91-7224C49458BB}">
-                <c15:layout/>
                 <c15:showLeaderLines val="1"/>
                 <c15:leaderLines>
                   <c:spPr>
@@ -2853,7 +2830,6 @@
             <c:showLeaderLines val="0"/>
             <c:extLst>
               <c:ext xmlns:c15="http://schemas.microsoft.com/office/drawing/2012/chart" uri="{CE6537A1-D6FC-4f65-9D91-7224C49458BB}">
-                <c15:layout/>
                 <c15:showLeaderLines val="1"/>
                 <c15:leaderLines>
                   <c:spPr>
@@ -2906,11 +2882,11 @@
         </c:dLbls>
         <c:gapWidth val="219"/>
         <c:overlap val="-27"/>
-        <c:axId val="79472208"/>
-        <c:axId val="79464048"/>
+        <c:axId val="231281728"/>
+        <c:axId val="231286080"/>
       </c:barChart>
       <c:catAx>
-        <c:axId val="79472208"/>
+        <c:axId val="231281728"/>
         <c:scaling>
           <c:orientation val="minMax"/>
         </c:scaling>
@@ -2953,7 +2929,7 @@
             <a:endParaRPr lang="ru-RU"/>
           </a:p>
         </c:txPr>
-        <c:crossAx val="79464048"/>
+        <c:crossAx val="231286080"/>
         <c:crosses val="autoZero"/>
         <c:auto val="1"/>
         <c:lblAlgn val="ctr"/>
@@ -2961,7 +2937,7 @@
         <c:noMultiLvlLbl val="0"/>
       </c:catAx>
       <c:valAx>
-        <c:axId val="79464048"/>
+        <c:axId val="231286080"/>
         <c:scaling>
           <c:orientation val="minMax"/>
         </c:scaling>
@@ -3012,7 +2988,7 @@
             <a:endParaRPr lang="ru-RU"/>
           </a:p>
         </c:txPr>
-        <c:crossAx val="79472208"/>
+        <c:crossAx val="231281728"/>
         <c:crosses val="autoZero"/>
         <c:crossBetween val="between"/>
       </c:valAx>
@@ -3026,7 +3002,6 @@
     </c:plotArea>
     <c:legend>
       <c:legendPos val="b"/>
-      <c:layout/>
       <c:overlay val="0"/>
       <c:spPr>
         <a:noFill/>
@@ -3129,7 +3104,6 @@
           </a:p>
         </c:rich>
       </c:tx>
-      <c:layout/>
       <c:overlay val="0"/>
       <c:spPr>
         <a:noFill/>
@@ -3325,7 +3299,6 @@
           <c:dLbls>
             <c:dLbl>
               <c:idx val="0"/>
-              <c:layout/>
               <c:numFmt formatCode="0%" sourceLinked="0"/>
               <c:spPr>
                 <a:solidFill>
@@ -3376,14 +3349,11 @@
               <c:showPercent val="0"/>
               <c:showBubbleSize val="0"/>
               <c:extLst>
-                <c:ext xmlns:c15="http://schemas.microsoft.com/office/drawing/2012/chart" uri="{CE6537A1-D6FC-4f65-9D91-7224C49458BB}">
-                  <c15:layout/>
-                </c:ext>
+                <c:ext xmlns:c15="http://schemas.microsoft.com/office/drawing/2012/chart" uri="{CE6537A1-D6FC-4f65-9D91-7224C49458BB}"/>
               </c:extLst>
             </c:dLbl>
             <c:dLbl>
               <c:idx val="1"/>
-              <c:layout/>
               <c:numFmt formatCode="0%" sourceLinked="0"/>
               <c:spPr>
                 <a:solidFill>
@@ -3434,14 +3404,11 @@
               <c:showPercent val="0"/>
               <c:showBubbleSize val="0"/>
               <c:extLst>
-                <c:ext xmlns:c15="http://schemas.microsoft.com/office/drawing/2012/chart" uri="{CE6537A1-D6FC-4f65-9D91-7224C49458BB}">
-                  <c15:layout/>
-                </c:ext>
+                <c:ext xmlns:c15="http://schemas.microsoft.com/office/drawing/2012/chart" uri="{CE6537A1-D6FC-4f65-9D91-7224C49458BB}"/>
               </c:extLst>
             </c:dLbl>
             <c:dLbl>
               <c:idx val="2"/>
-              <c:layout/>
               <c:numFmt formatCode="0%" sourceLinked="0"/>
               <c:spPr>
                 <a:solidFill>
@@ -3492,9 +3459,7 @@
               <c:showPercent val="0"/>
               <c:showBubbleSize val="0"/>
               <c:extLst>
-                <c:ext xmlns:c15="http://schemas.microsoft.com/office/drawing/2012/chart" uri="{CE6537A1-D6FC-4f65-9D91-7224C49458BB}">
-                  <c15:layout/>
-                </c:ext>
+                <c:ext xmlns:c15="http://schemas.microsoft.com/office/drawing/2012/chart" uri="{CE6537A1-D6FC-4f65-9D91-7224C49458BB}"/>
               </c:extLst>
             </c:dLbl>
             <c:numFmt formatCode="0%" sourceLinked="0"/>
@@ -10147,8 +10112,8 @@
     <dgm:cxn modelId="{575B3600-AE0C-420F-8794-BCB16D1F06E9}" type="presOf" srcId="{A9FF98FB-0436-4A21-80D5-98984A5D7DEF}" destId="{2C989446-76CB-491D-A9E5-90C479CC1EB6}" srcOrd="0" destOrd="0" presId="urn:microsoft.com/office/officeart/2008/layout/RadialCluster"/>
     <dgm:cxn modelId="{25BE697C-FF0A-419D-B6D0-97D1FD6CF3AD}" type="presOf" srcId="{D723C67C-B8EF-4E8B-B78C-64AF01B8DE70}" destId="{42C5E428-457C-4D2D-B9F7-8D88B989BAC4}" srcOrd="0" destOrd="0" presId="urn:microsoft.com/office/officeart/2008/layout/RadialCluster"/>
     <dgm:cxn modelId="{A1C3788A-9CBD-4238-9560-BF12EBE8E844}" srcId="{318EB9F8-A3B4-4FA7-9997-4937EB56EAEC}" destId="{E401A207-D970-4540-A7D8-1D2DE637C704}" srcOrd="0" destOrd="0" parTransId="{663A62C9-9B3D-48E0-A3FC-618886457E72}" sibTransId="{6DFC798E-040C-44FF-A79A-A674AC8D6016}"/>
+    <dgm:cxn modelId="{3E39D600-3319-414C-AC04-E60BBD6480B0}" type="presOf" srcId="{1CA18002-A7AB-4BC8-AE26-63D7D0F48C28}" destId="{905EE044-8A93-48F4-B923-0A245442EAF2}" srcOrd="0" destOrd="0" presId="urn:microsoft.com/office/officeart/2008/layout/RadialCluster"/>
     <dgm:cxn modelId="{CCE361DE-2928-429E-AB70-57B21A35219B}" srcId="{E401A207-D970-4540-A7D8-1D2DE637C704}" destId="{CF41F630-8275-45B3-9FEF-10BF54F25AE4}" srcOrd="2" destOrd="0" parTransId="{5D132AE9-BFD6-4DFD-8F8E-F3F27B48509E}" sibTransId="{291DC6B3-14F8-4F12-8666-49622576D9A8}"/>
-    <dgm:cxn modelId="{3E39D600-3319-414C-AC04-E60BBD6480B0}" type="presOf" srcId="{1CA18002-A7AB-4BC8-AE26-63D7D0F48C28}" destId="{905EE044-8A93-48F4-B923-0A245442EAF2}" srcOrd="0" destOrd="0" presId="urn:microsoft.com/office/officeart/2008/layout/RadialCluster"/>
     <dgm:cxn modelId="{56F9A2B6-4CD9-4FAB-891D-7372F6270179}" type="presOf" srcId="{0D4F7F9C-13D9-41A2-91CB-B4D407DADAF8}" destId="{A1DBB35B-359C-44C1-948D-F0C4AB873D98}" srcOrd="0" destOrd="0" presId="urn:microsoft.com/office/officeart/2008/layout/RadialCluster"/>
     <dgm:cxn modelId="{5B482096-7B1A-4610-B289-1382C4FDA82F}" type="presParOf" srcId="{E837BDE3-383E-40B2-A6FC-7B4752AEE84C}" destId="{5447C531-E157-4A38-8E15-D58CFDE83DDB}" srcOrd="0" destOrd="0" presId="urn:microsoft.com/office/officeart/2008/layout/RadialCluster"/>
     <dgm:cxn modelId="{44A70410-ABF5-4E70-804C-59ECD011A6F3}" type="presParOf" srcId="{5447C531-E157-4A38-8E15-D58CFDE83DDB}" destId="{25056C25-FD7A-454A-BD80-5797A854A1C9}" srcOrd="0" destOrd="0" presId="urn:microsoft.com/office/officeart/2008/layout/RadialCluster"/>
@@ -10185,800 +10150,6 @@
       <dsp:cNvGrpSpPr/>
     </dsp:nvGrpSpPr>
     <dsp:grpSpPr/>
-    <dsp:sp modelId="{506CC8FD-2E26-4AE7-B13D-71BBCE420E2C}">
-      <dsp:nvSpPr>
-        <dsp:cNvPr id="0" name=""/>
-        <dsp:cNvSpPr/>
-      </dsp:nvSpPr>
-      <dsp:spPr>
-        <a:xfrm>
-          <a:off x="1724949" y="1204142"/>
-          <a:ext cx="915812" cy="915812"/>
-        </a:xfrm>
-        <a:prstGeom prst="ellipse">
-          <a:avLst/>
-        </a:prstGeom>
-        <a:solidFill>
-          <a:srgbClr val="92D050"/>
-        </a:solidFill>
-        <a:ln w="25400" cap="flat" cmpd="sng" algn="ctr">
-          <a:solidFill>
-            <a:schemeClr val="accent3">
-              <a:lumMod val="75000"/>
-            </a:schemeClr>
-          </a:solidFill>
-          <a:prstDash val="solid"/>
-        </a:ln>
-        <a:effectLst/>
-      </dsp:spPr>
-      <dsp:style>
-        <a:lnRef idx="2">
-          <a:scrgbClr r="0" g="0" b="0"/>
-        </a:lnRef>
-        <a:fillRef idx="1">
-          <a:scrgbClr r="0" g="0" b="0"/>
-        </a:fillRef>
-        <a:effectRef idx="0">
-          <a:scrgbClr r="0" g="0" b="0"/>
-        </a:effectRef>
-        <a:fontRef idx="minor">
-          <a:schemeClr val="lt1"/>
-        </a:fontRef>
-      </dsp:style>
-      <dsp:txBody>
-        <a:bodyPr spcFirstLastPara="0" vert="horz" wrap="square" lIns="12700" tIns="12700" rIns="12700" bIns="12700" numCol="1" spcCol="1270" anchor="ctr" anchorCtr="0">
-          <a:noAutofit/>
-        </a:bodyPr>
-        <a:lstStyle/>
-        <a:p>
-          <a:pPr lvl="0" algn="ctr" defTabSz="889000">
-            <a:lnSpc>
-              <a:spcPct val="90000"/>
-            </a:lnSpc>
-            <a:spcBef>
-              <a:spcPct val="0"/>
-            </a:spcBef>
-            <a:spcAft>
-              <a:spcPct val="35000"/>
-            </a:spcAft>
-          </a:pPr>
-          <a:r>
-            <a:rPr lang="en-US" sz="2000" kern="1200" dirty="0" smtClean="0"/>
-            <a:t>SaaS</a:t>
-          </a:r>
-          <a:endParaRPr lang="ru-RU" sz="2000" kern="1200" dirty="0"/>
-        </a:p>
-      </dsp:txBody>
-      <dsp:txXfrm>
-        <a:off x="1859067" y="1338260"/>
-        <a:ext cx="647576" cy="647576"/>
-      </dsp:txXfrm>
-    </dsp:sp>
-    <dsp:sp modelId="{BD3E845E-4D7C-4CE3-83BC-20831ED88AEC}">
-      <dsp:nvSpPr>
-        <dsp:cNvPr id="0" name=""/>
-        <dsp:cNvSpPr/>
-      </dsp:nvSpPr>
-      <dsp:spPr>
-        <a:xfrm rot="16200000">
-          <a:off x="2044493" y="1046901"/>
-          <a:ext cx="276723" cy="37759"/>
-        </a:xfrm>
-        <a:custGeom>
-          <a:avLst/>
-          <a:gdLst/>
-          <a:ahLst/>
-          <a:cxnLst/>
-          <a:rect l="0" t="0" r="0" b="0"/>
-          <a:pathLst>
-            <a:path>
-              <a:moveTo>
-                <a:pt x="0" y="18879"/>
-              </a:moveTo>
-              <a:lnTo>
-                <a:pt x="276723" y="18879"/>
-              </a:lnTo>
-            </a:path>
-          </a:pathLst>
-        </a:custGeom>
-        <a:noFill/>
-        <a:ln w="25400" cap="flat" cmpd="sng" algn="ctr">
-          <a:solidFill>
-            <a:schemeClr val="accent1">
-              <a:shade val="60000"/>
-              <a:hueOff val="0"/>
-              <a:satOff val="0"/>
-              <a:lumOff val="0"/>
-              <a:alphaOff val="0"/>
-            </a:schemeClr>
-          </a:solidFill>
-          <a:prstDash val="solid"/>
-        </a:ln>
-        <a:effectLst/>
-      </dsp:spPr>
-      <dsp:style>
-        <a:lnRef idx="2">
-          <a:scrgbClr r="0" g="0" b="0"/>
-        </a:lnRef>
-        <a:fillRef idx="0">
-          <a:scrgbClr r="0" g="0" b="0"/>
-        </a:fillRef>
-        <a:effectRef idx="0">
-          <a:scrgbClr r="0" g="0" b="0"/>
-        </a:effectRef>
-        <a:fontRef idx="minor"/>
-      </dsp:style>
-      <dsp:txBody>
-        <a:bodyPr spcFirstLastPara="0" vert="horz" wrap="square" lIns="12700" tIns="0" rIns="12700" bIns="0" numCol="1" spcCol="1270" anchor="ctr" anchorCtr="0">
-          <a:noAutofit/>
-        </a:bodyPr>
-        <a:lstStyle/>
-        <a:p>
-          <a:pPr lvl="0" algn="ctr" defTabSz="222250">
-            <a:lnSpc>
-              <a:spcPct val="90000"/>
-            </a:lnSpc>
-            <a:spcBef>
-              <a:spcPct val="0"/>
-            </a:spcBef>
-            <a:spcAft>
-              <a:spcPct val="35000"/>
-            </a:spcAft>
-          </a:pPr>
-          <a:endParaRPr lang="ru-RU" sz="500" kern="1200"/>
-        </a:p>
-      </dsp:txBody>
-      <dsp:txXfrm>
-        <a:off x="2175937" y="1058862"/>
-        <a:ext cx="13836" cy="13836"/>
-      </dsp:txXfrm>
-    </dsp:sp>
-    <dsp:sp modelId="{19A07A34-1010-48C6-A801-BD8D5D256EA9}">
-      <dsp:nvSpPr>
-        <dsp:cNvPr id="0" name=""/>
-        <dsp:cNvSpPr/>
-      </dsp:nvSpPr>
-      <dsp:spPr>
-        <a:xfrm>
-          <a:off x="1724949" y="11606"/>
-          <a:ext cx="915812" cy="915812"/>
-        </a:xfrm>
-        <a:prstGeom prst="ellipse">
-          <a:avLst/>
-        </a:prstGeom>
-        <a:solidFill>
-          <a:srgbClr val="00B0F0"/>
-        </a:solidFill>
-        <a:ln w="25400" cap="flat" cmpd="sng" algn="ctr">
-          <a:solidFill>
-            <a:schemeClr val="tx2">
-              <a:lumMod val="60000"/>
-              <a:lumOff val="40000"/>
-            </a:schemeClr>
-          </a:solidFill>
-          <a:prstDash val="solid"/>
-        </a:ln>
-        <a:effectLst/>
-      </dsp:spPr>
-      <dsp:style>
-        <a:lnRef idx="2">
-          <a:scrgbClr r="0" g="0" b="0"/>
-        </a:lnRef>
-        <a:fillRef idx="1">
-          <a:scrgbClr r="0" g="0" b="0"/>
-        </a:fillRef>
-        <a:effectRef idx="0">
-          <a:scrgbClr r="0" g="0" b="0"/>
-        </a:effectRef>
-        <a:fontRef idx="minor">
-          <a:schemeClr val="lt1"/>
-        </a:fontRef>
-      </dsp:style>
-      <dsp:txBody>
-        <a:bodyPr spcFirstLastPara="0" vert="horz" wrap="square" lIns="12700" tIns="12700" rIns="12700" bIns="12700" numCol="1" spcCol="1270" anchor="ctr" anchorCtr="0">
-          <a:noAutofit/>
-        </a:bodyPr>
-        <a:lstStyle/>
-        <a:p>
-          <a:pPr lvl="0" algn="ctr" defTabSz="889000">
-            <a:lnSpc>
-              <a:spcPct val="90000"/>
-            </a:lnSpc>
-            <a:spcBef>
-              <a:spcPct val="0"/>
-            </a:spcBef>
-            <a:spcAft>
-              <a:spcPct val="35000"/>
-            </a:spcAft>
-          </a:pPr>
-          <a:endParaRPr lang="ru-RU" sz="2000" kern="1200"/>
-        </a:p>
-      </dsp:txBody>
-      <dsp:txXfrm>
-        <a:off x="1859067" y="145724"/>
-        <a:ext cx="647576" cy="647576"/>
-      </dsp:txXfrm>
-    </dsp:sp>
-    <dsp:sp modelId="{A40744F3-8F59-4D61-9DF6-A37D24278559}">
-      <dsp:nvSpPr>
-        <dsp:cNvPr id="0" name=""/>
-        <dsp:cNvSpPr/>
-      </dsp:nvSpPr>
-      <dsp:spPr>
-        <a:xfrm rot="20520000">
-          <a:off x="2611578" y="1458912"/>
-          <a:ext cx="276723" cy="37759"/>
-        </a:xfrm>
-        <a:custGeom>
-          <a:avLst/>
-          <a:gdLst/>
-          <a:ahLst/>
-          <a:cxnLst/>
-          <a:rect l="0" t="0" r="0" b="0"/>
-          <a:pathLst>
-            <a:path>
-              <a:moveTo>
-                <a:pt x="0" y="18879"/>
-              </a:moveTo>
-              <a:lnTo>
-                <a:pt x="276723" y="18879"/>
-              </a:lnTo>
-            </a:path>
-          </a:pathLst>
-        </a:custGeom>
-        <a:noFill/>
-        <a:ln w="25400" cap="flat" cmpd="sng" algn="ctr">
-          <a:solidFill>
-            <a:schemeClr val="accent1">
-              <a:shade val="60000"/>
-              <a:hueOff val="0"/>
-              <a:satOff val="0"/>
-              <a:lumOff val="0"/>
-              <a:alphaOff val="0"/>
-            </a:schemeClr>
-          </a:solidFill>
-          <a:prstDash val="solid"/>
-        </a:ln>
-        <a:effectLst/>
-      </dsp:spPr>
-      <dsp:style>
-        <a:lnRef idx="2">
-          <a:scrgbClr r="0" g="0" b="0"/>
-        </a:lnRef>
-        <a:fillRef idx="0">
-          <a:scrgbClr r="0" g="0" b="0"/>
-        </a:fillRef>
-        <a:effectRef idx="0">
-          <a:scrgbClr r="0" g="0" b="0"/>
-        </a:effectRef>
-        <a:fontRef idx="minor"/>
-      </dsp:style>
-      <dsp:txBody>
-        <a:bodyPr spcFirstLastPara="0" vert="horz" wrap="square" lIns="12700" tIns="0" rIns="12700" bIns="0" numCol="1" spcCol="1270" anchor="ctr" anchorCtr="0">
-          <a:noAutofit/>
-        </a:bodyPr>
-        <a:lstStyle/>
-        <a:p>
-          <a:pPr lvl="0" algn="ctr" defTabSz="222250">
-            <a:lnSpc>
-              <a:spcPct val="90000"/>
-            </a:lnSpc>
-            <a:spcBef>
-              <a:spcPct val="0"/>
-            </a:spcBef>
-            <a:spcAft>
-              <a:spcPct val="35000"/>
-            </a:spcAft>
-          </a:pPr>
-          <a:endParaRPr lang="ru-RU" sz="500" kern="1200"/>
-        </a:p>
-      </dsp:txBody>
-      <dsp:txXfrm>
-        <a:off x="2743022" y="1470874"/>
-        <a:ext cx="13836" cy="13836"/>
-      </dsp:txXfrm>
-    </dsp:sp>
-    <dsp:sp modelId="{16A90822-693B-4AAA-A690-D1B7BBE713D3}">
-      <dsp:nvSpPr>
-        <dsp:cNvPr id="0" name=""/>
-        <dsp:cNvSpPr/>
-      </dsp:nvSpPr>
-      <dsp:spPr>
-        <a:xfrm>
-          <a:off x="2859118" y="835628"/>
-          <a:ext cx="915812" cy="915812"/>
-        </a:xfrm>
-        <a:prstGeom prst="ellipse">
-          <a:avLst/>
-        </a:prstGeom>
-        <a:solidFill>
-          <a:srgbClr val="00B0F0"/>
-        </a:solidFill>
-        <a:ln w="25400" cap="flat" cmpd="sng" algn="ctr">
-          <a:solidFill>
-            <a:schemeClr val="tx2">
-              <a:lumMod val="60000"/>
-              <a:lumOff val="40000"/>
-            </a:schemeClr>
-          </a:solidFill>
-          <a:prstDash val="solid"/>
-        </a:ln>
-        <a:effectLst/>
-      </dsp:spPr>
-      <dsp:style>
-        <a:lnRef idx="2">
-          <a:scrgbClr r="0" g="0" b="0"/>
-        </a:lnRef>
-        <a:fillRef idx="1">
-          <a:scrgbClr r="0" g="0" b="0"/>
-        </a:fillRef>
-        <a:effectRef idx="0">
-          <a:scrgbClr r="0" g="0" b="0"/>
-        </a:effectRef>
-        <a:fontRef idx="minor">
-          <a:schemeClr val="lt1"/>
-        </a:fontRef>
-      </dsp:style>
-      <dsp:txBody>
-        <a:bodyPr spcFirstLastPara="0" vert="horz" wrap="square" lIns="12700" tIns="12700" rIns="12700" bIns="12700" numCol="1" spcCol="1270" anchor="ctr" anchorCtr="0">
-          <a:noAutofit/>
-        </a:bodyPr>
-        <a:lstStyle/>
-        <a:p>
-          <a:pPr lvl="0" algn="ctr" defTabSz="889000">
-            <a:lnSpc>
-              <a:spcPct val="90000"/>
-            </a:lnSpc>
-            <a:spcBef>
-              <a:spcPct val="0"/>
-            </a:spcBef>
-            <a:spcAft>
-              <a:spcPct val="35000"/>
-            </a:spcAft>
-          </a:pPr>
-          <a:endParaRPr lang="ru-RU" sz="2000" kern="1200" dirty="0"/>
-        </a:p>
-      </dsp:txBody>
-      <dsp:txXfrm>
-        <a:off x="2993236" y="969746"/>
-        <a:ext cx="647576" cy="647576"/>
-      </dsp:txXfrm>
-    </dsp:sp>
-    <dsp:sp modelId="{0B2CB517-7DD7-48E1-8259-4393B3E0C3EC}">
-      <dsp:nvSpPr>
-        <dsp:cNvPr id="0" name=""/>
-        <dsp:cNvSpPr/>
-      </dsp:nvSpPr>
-      <dsp:spPr>
-        <a:xfrm rot="3240000">
-          <a:off x="2394971" y="2125560"/>
-          <a:ext cx="276723" cy="37759"/>
-        </a:xfrm>
-        <a:custGeom>
-          <a:avLst/>
-          <a:gdLst/>
-          <a:ahLst/>
-          <a:cxnLst/>
-          <a:rect l="0" t="0" r="0" b="0"/>
-          <a:pathLst>
-            <a:path>
-              <a:moveTo>
-                <a:pt x="0" y="18879"/>
-              </a:moveTo>
-              <a:lnTo>
-                <a:pt x="276723" y="18879"/>
-              </a:lnTo>
-            </a:path>
-          </a:pathLst>
-        </a:custGeom>
-        <a:noFill/>
-        <a:ln w="25400" cap="flat" cmpd="sng" algn="ctr">
-          <a:solidFill>
-            <a:schemeClr val="accent1">
-              <a:shade val="60000"/>
-              <a:hueOff val="0"/>
-              <a:satOff val="0"/>
-              <a:lumOff val="0"/>
-              <a:alphaOff val="0"/>
-            </a:schemeClr>
-          </a:solidFill>
-          <a:prstDash val="solid"/>
-        </a:ln>
-        <a:effectLst/>
-      </dsp:spPr>
-      <dsp:style>
-        <a:lnRef idx="2">
-          <a:scrgbClr r="0" g="0" b="0"/>
-        </a:lnRef>
-        <a:fillRef idx="0">
-          <a:scrgbClr r="0" g="0" b="0"/>
-        </a:fillRef>
-        <a:effectRef idx="0">
-          <a:scrgbClr r="0" g="0" b="0"/>
-        </a:effectRef>
-        <a:fontRef idx="minor"/>
-      </dsp:style>
-      <dsp:txBody>
-        <a:bodyPr spcFirstLastPara="0" vert="horz" wrap="square" lIns="12700" tIns="0" rIns="12700" bIns="0" numCol="1" spcCol="1270" anchor="ctr" anchorCtr="0">
-          <a:noAutofit/>
-        </a:bodyPr>
-        <a:lstStyle/>
-        <a:p>
-          <a:pPr lvl="0" algn="ctr" defTabSz="222250">
-            <a:lnSpc>
-              <a:spcPct val="90000"/>
-            </a:lnSpc>
-            <a:spcBef>
-              <a:spcPct val="0"/>
-            </a:spcBef>
-            <a:spcAft>
-              <a:spcPct val="35000"/>
-            </a:spcAft>
-          </a:pPr>
-          <a:endParaRPr lang="ru-RU" sz="500" kern="1200"/>
-        </a:p>
-      </dsp:txBody>
-      <dsp:txXfrm>
-        <a:off x="2526415" y="2137522"/>
-        <a:ext cx="13836" cy="13836"/>
-      </dsp:txXfrm>
-    </dsp:sp>
-    <dsp:sp modelId="{8F6D8065-965B-4A4F-B6F8-BDB592D2B4BF}">
-      <dsp:nvSpPr>
-        <dsp:cNvPr id="0" name=""/>
-        <dsp:cNvSpPr/>
-      </dsp:nvSpPr>
-      <dsp:spPr>
-        <a:xfrm>
-          <a:off x="2425904" y="2168924"/>
-          <a:ext cx="915812" cy="915812"/>
-        </a:xfrm>
-        <a:prstGeom prst="ellipse">
-          <a:avLst/>
-        </a:prstGeom>
-        <a:solidFill>
-          <a:srgbClr val="00B0F0"/>
-        </a:solidFill>
-        <a:ln w="25400" cap="flat" cmpd="sng" algn="ctr">
-          <a:solidFill>
-            <a:schemeClr val="tx2">
-              <a:lumMod val="60000"/>
-              <a:lumOff val="40000"/>
-            </a:schemeClr>
-          </a:solidFill>
-          <a:prstDash val="solid"/>
-        </a:ln>
-        <a:effectLst/>
-      </dsp:spPr>
-      <dsp:style>
-        <a:lnRef idx="2">
-          <a:scrgbClr r="0" g="0" b="0"/>
-        </a:lnRef>
-        <a:fillRef idx="1">
-          <a:scrgbClr r="0" g="0" b="0"/>
-        </a:fillRef>
-        <a:effectRef idx="0">
-          <a:scrgbClr r="0" g="0" b="0"/>
-        </a:effectRef>
-        <a:fontRef idx="minor">
-          <a:schemeClr val="lt1"/>
-        </a:fontRef>
-      </dsp:style>
-      <dsp:txBody>
-        <a:bodyPr spcFirstLastPara="0" vert="horz" wrap="square" lIns="12700" tIns="12700" rIns="12700" bIns="12700" numCol="1" spcCol="1270" anchor="ctr" anchorCtr="0">
-          <a:noAutofit/>
-        </a:bodyPr>
-        <a:lstStyle/>
-        <a:p>
-          <a:pPr lvl="0" algn="ctr" defTabSz="889000">
-            <a:lnSpc>
-              <a:spcPct val="90000"/>
-            </a:lnSpc>
-            <a:spcBef>
-              <a:spcPct val="0"/>
-            </a:spcBef>
-            <a:spcAft>
-              <a:spcPct val="35000"/>
-            </a:spcAft>
-          </a:pPr>
-          <a:endParaRPr lang="ru-RU" sz="2000" kern="1200"/>
-        </a:p>
-      </dsp:txBody>
-      <dsp:txXfrm>
-        <a:off x="2560022" y="2303042"/>
-        <a:ext cx="647576" cy="647576"/>
-      </dsp:txXfrm>
-    </dsp:sp>
-    <dsp:sp modelId="{9036BBB6-75F0-4F69-9249-B49C871EAD6A}">
-      <dsp:nvSpPr>
-        <dsp:cNvPr id="0" name=""/>
-        <dsp:cNvSpPr/>
-      </dsp:nvSpPr>
-      <dsp:spPr>
-        <a:xfrm rot="7560000">
-          <a:off x="1694016" y="2125560"/>
-          <a:ext cx="276723" cy="37759"/>
-        </a:xfrm>
-        <a:custGeom>
-          <a:avLst/>
-          <a:gdLst/>
-          <a:ahLst/>
-          <a:cxnLst/>
-          <a:rect l="0" t="0" r="0" b="0"/>
-          <a:pathLst>
-            <a:path>
-              <a:moveTo>
-                <a:pt x="0" y="18879"/>
-              </a:moveTo>
-              <a:lnTo>
-                <a:pt x="276723" y="18879"/>
-              </a:lnTo>
-            </a:path>
-          </a:pathLst>
-        </a:custGeom>
-        <a:noFill/>
-        <a:ln w="25400" cap="flat" cmpd="sng" algn="ctr">
-          <a:solidFill>
-            <a:schemeClr val="accent1">
-              <a:shade val="60000"/>
-              <a:hueOff val="0"/>
-              <a:satOff val="0"/>
-              <a:lumOff val="0"/>
-              <a:alphaOff val="0"/>
-            </a:schemeClr>
-          </a:solidFill>
-          <a:prstDash val="solid"/>
-        </a:ln>
-        <a:effectLst/>
-      </dsp:spPr>
-      <dsp:style>
-        <a:lnRef idx="2">
-          <a:scrgbClr r="0" g="0" b="0"/>
-        </a:lnRef>
-        <a:fillRef idx="0">
-          <a:scrgbClr r="0" g="0" b="0"/>
-        </a:fillRef>
-        <a:effectRef idx="0">
-          <a:scrgbClr r="0" g="0" b="0"/>
-        </a:effectRef>
-        <a:fontRef idx="minor"/>
-      </dsp:style>
-      <dsp:txBody>
-        <a:bodyPr spcFirstLastPara="0" vert="horz" wrap="square" lIns="12700" tIns="0" rIns="12700" bIns="0" numCol="1" spcCol="1270" anchor="ctr" anchorCtr="0">
-          <a:noAutofit/>
-        </a:bodyPr>
-        <a:lstStyle/>
-        <a:p>
-          <a:pPr lvl="0" algn="ctr" defTabSz="222250">
-            <a:lnSpc>
-              <a:spcPct val="90000"/>
-            </a:lnSpc>
-            <a:spcBef>
-              <a:spcPct val="0"/>
-            </a:spcBef>
-            <a:spcAft>
-              <a:spcPct val="35000"/>
-            </a:spcAft>
-          </a:pPr>
-          <a:endParaRPr lang="ru-RU" sz="500" kern="1200"/>
-        </a:p>
-      </dsp:txBody>
-      <dsp:txXfrm rot="10800000">
-        <a:off x="1825459" y="2137522"/>
-        <a:ext cx="13836" cy="13836"/>
-      </dsp:txXfrm>
-    </dsp:sp>
-    <dsp:sp modelId="{935A1F96-8C6B-4CB8-B151-B31C97F5597D}">
-      <dsp:nvSpPr>
-        <dsp:cNvPr id="0" name=""/>
-        <dsp:cNvSpPr/>
-      </dsp:nvSpPr>
-      <dsp:spPr>
-        <a:xfrm>
-          <a:off x="1023993" y="2168924"/>
-          <a:ext cx="915812" cy="915812"/>
-        </a:xfrm>
-        <a:prstGeom prst="ellipse">
-          <a:avLst/>
-        </a:prstGeom>
-        <a:solidFill>
-          <a:srgbClr val="00B0F0"/>
-        </a:solidFill>
-        <a:ln w="25400" cap="flat" cmpd="sng" algn="ctr">
-          <a:solidFill>
-            <a:schemeClr val="tx2">
-              <a:lumMod val="60000"/>
-              <a:lumOff val="40000"/>
-            </a:schemeClr>
-          </a:solidFill>
-          <a:prstDash val="solid"/>
-        </a:ln>
-        <a:effectLst/>
-      </dsp:spPr>
-      <dsp:style>
-        <a:lnRef idx="2">
-          <a:scrgbClr r="0" g="0" b="0"/>
-        </a:lnRef>
-        <a:fillRef idx="1">
-          <a:scrgbClr r="0" g="0" b="0"/>
-        </a:fillRef>
-        <a:effectRef idx="0">
-          <a:scrgbClr r="0" g="0" b="0"/>
-        </a:effectRef>
-        <a:fontRef idx="minor">
-          <a:schemeClr val="lt1"/>
-        </a:fontRef>
-      </dsp:style>
-      <dsp:txBody>
-        <a:bodyPr spcFirstLastPara="0" vert="horz" wrap="square" lIns="12700" tIns="12700" rIns="12700" bIns="12700" numCol="1" spcCol="1270" anchor="ctr" anchorCtr="0">
-          <a:noAutofit/>
-        </a:bodyPr>
-        <a:lstStyle/>
-        <a:p>
-          <a:pPr lvl="0" algn="ctr" defTabSz="889000">
-            <a:lnSpc>
-              <a:spcPct val="90000"/>
-            </a:lnSpc>
-            <a:spcBef>
-              <a:spcPct val="0"/>
-            </a:spcBef>
-            <a:spcAft>
-              <a:spcPct val="35000"/>
-            </a:spcAft>
-          </a:pPr>
-          <a:endParaRPr lang="ru-RU" sz="2000" kern="1200"/>
-        </a:p>
-      </dsp:txBody>
-      <dsp:txXfrm>
-        <a:off x="1158111" y="2303042"/>
-        <a:ext cx="647576" cy="647576"/>
-      </dsp:txXfrm>
-    </dsp:sp>
-    <dsp:sp modelId="{4DE8A120-1BCB-4D6E-B1F9-4BDCEC7C5779}">
-      <dsp:nvSpPr>
-        <dsp:cNvPr id="0" name=""/>
-        <dsp:cNvSpPr/>
-      </dsp:nvSpPr>
-      <dsp:spPr>
-        <a:xfrm rot="11880000">
-          <a:off x="1477409" y="1458912"/>
-          <a:ext cx="276723" cy="37759"/>
-        </a:xfrm>
-        <a:custGeom>
-          <a:avLst/>
-          <a:gdLst/>
-          <a:ahLst/>
-          <a:cxnLst/>
-          <a:rect l="0" t="0" r="0" b="0"/>
-          <a:pathLst>
-            <a:path>
-              <a:moveTo>
-                <a:pt x="0" y="18879"/>
-              </a:moveTo>
-              <a:lnTo>
-                <a:pt x="276723" y="18879"/>
-              </a:lnTo>
-            </a:path>
-          </a:pathLst>
-        </a:custGeom>
-        <a:noFill/>
-        <a:ln w="25400" cap="flat" cmpd="sng" algn="ctr">
-          <a:solidFill>
-            <a:schemeClr val="accent1">
-              <a:shade val="60000"/>
-              <a:hueOff val="0"/>
-              <a:satOff val="0"/>
-              <a:lumOff val="0"/>
-              <a:alphaOff val="0"/>
-            </a:schemeClr>
-          </a:solidFill>
-          <a:prstDash val="solid"/>
-        </a:ln>
-        <a:effectLst/>
-      </dsp:spPr>
-      <dsp:style>
-        <a:lnRef idx="2">
-          <a:scrgbClr r="0" g="0" b="0"/>
-        </a:lnRef>
-        <a:fillRef idx="0">
-          <a:scrgbClr r="0" g="0" b="0"/>
-        </a:fillRef>
-        <a:effectRef idx="0">
-          <a:scrgbClr r="0" g="0" b="0"/>
-        </a:effectRef>
-        <a:fontRef idx="minor"/>
-      </dsp:style>
-      <dsp:txBody>
-        <a:bodyPr spcFirstLastPara="0" vert="horz" wrap="square" lIns="12700" tIns="0" rIns="12700" bIns="0" numCol="1" spcCol="1270" anchor="ctr" anchorCtr="0">
-          <a:noAutofit/>
-        </a:bodyPr>
-        <a:lstStyle/>
-        <a:p>
-          <a:pPr lvl="0" algn="ctr" defTabSz="222250">
-            <a:lnSpc>
-              <a:spcPct val="90000"/>
-            </a:lnSpc>
-            <a:spcBef>
-              <a:spcPct val="0"/>
-            </a:spcBef>
-            <a:spcAft>
-              <a:spcPct val="35000"/>
-            </a:spcAft>
-          </a:pPr>
-          <a:endParaRPr lang="ru-RU" sz="500" kern="1200"/>
-        </a:p>
-      </dsp:txBody>
-      <dsp:txXfrm rot="10800000">
-        <a:off x="1608852" y="1470874"/>
-        <a:ext cx="13836" cy="13836"/>
-      </dsp:txXfrm>
-    </dsp:sp>
-    <dsp:sp modelId="{95A2D75F-3C3F-4653-A5FC-8BF0D4D6EEFE}">
-      <dsp:nvSpPr>
-        <dsp:cNvPr id="0" name=""/>
-        <dsp:cNvSpPr/>
-      </dsp:nvSpPr>
-      <dsp:spPr>
-        <a:xfrm>
-          <a:off x="590779" y="835628"/>
-          <a:ext cx="915812" cy="915812"/>
-        </a:xfrm>
-        <a:prstGeom prst="ellipse">
-          <a:avLst/>
-        </a:prstGeom>
-        <a:solidFill>
-          <a:srgbClr val="00B0F0"/>
-        </a:solidFill>
-        <a:ln w="25400" cap="flat" cmpd="sng" algn="ctr">
-          <a:solidFill>
-            <a:schemeClr val="tx2">
-              <a:lumMod val="60000"/>
-              <a:lumOff val="40000"/>
-            </a:schemeClr>
-          </a:solidFill>
-          <a:prstDash val="solid"/>
-        </a:ln>
-        <a:effectLst/>
-      </dsp:spPr>
-      <dsp:style>
-        <a:lnRef idx="2">
-          <a:scrgbClr r="0" g="0" b="0"/>
-        </a:lnRef>
-        <a:fillRef idx="1">
-          <a:scrgbClr r="0" g="0" b="0"/>
-        </a:fillRef>
-        <a:effectRef idx="0">
-          <a:scrgbClr r="0" g="0" b="0"/>
-        </a:effectRef>
-        <a:fontRef idx="minor">
-          <a:schemeClr val="lt1"/>
-        </a:fontRef>
-      </dsp:style>
-      <dsp:txBody>
-        <a:bodyPr spcFirstLastPara="0" vert="horz" wrap="square" lIns="12700" tIns="12700" rIns="12700" bIns="12700" numCol="1" spcCol="1270" anchor="ctr" anchorCtr="0">
-          <a:noAutofit/>
-        </a:bodyPr>
-        <a:lstStyle/>
-        <a:p>
-          <a:pPr lvl="0" algn="ctr" defTabSz="889000">
-            <a:lnSpc>
-              <a:spcPct val="90000"/>
-            </a:lnSpc>
-            <a:spcBef>
-              <a:spcPct val="0"/>
-            </a:spcBef>
-            <a:spcAft>
-              <a:spcPct val="35000"/>
-            </a:spcAft>
-          </a:pPr>
-          <a:endParaRPr lang="ru-RU" sz="2000" kern="1200"/>
-        </a:p>
-      </dsp:txBody>
-      <dsp:txXfrm>
-        <a:off x="724897" y="969746"/>
-        <a:ext cx="647576" cy="647576"/>
-      </dsp:txXfrm>
-    </dsp:sp>
   </dsp:spTree>
 </dsp:drawing>
 </file>
@@ -10991,215 +10162,6 @@
       <dsp:cNvGrpSpPr/>
     </dsp:nvGrpSpPr>
     <dsp:grpSpPr/>
-    <dsp:sp modelId="{25056C25-FD7A-454A-BD80-5797A854A1C9}">
-      <dsp:nvSpPr>
-        <dsp:cNvPr id="0" name=""/>
-        <dsp:cNvSpPr/>
-      </dsp:nvSpPr>
-      <dsp:spPr>
-        <a:xfrm>
-          <a:off x="898173" y="782679"/>
-          <a:ext cx="822207" cy="878051"/>
-        </a:xfrm>
-        <a:prstGeom prst="roundRect">
-          <a:avLst/>
-        </a:prstGeom>
-        <a:solidFill>
-          <a:schemeClr val="bg1">
-            <a:lumMod val="95000"/>
-          </a:schemeClr>
-        </a:solidFill>
-        <a:ln w="25400" cap="flat" cmpd="sng" algn="ctr">
-          <a:solidFill>
-            <a:srgbClr val="92D050"/>
-          </a:solidFill>
-          <a:prstDash val="solid"/>
-        </a:ln>
-        <a:effectLst/>
-      </dsp:spPr>
-      <dsp:style>
-        <a:lnRef idx="2">
-          <a:scrgbClr r="0" g="0" b="0"/>
-        </a:lnRef>
-        <a:fillRef idx="1">
-          <a:scrgbClr r="0" g="0" b="0"/>
-        </a:fillRef>
-        <a:effectRef idx="0">
-          <a:scrgbClr r="0" g="0" b="0"/>
-        </a:effectRef>
-        <a:fontRef idx="minor">
-          <a:schemeClr val="lt1"/>
-        </a:fontRef>
-      </dsp:style>
-      <dsp:txBody>
-        <a:bodyPr spcFirstLastPara="0" vert="horz" wrap="square" lIns="58420" tIns="58420" rIns="58420" bIns="58420" numCol="1" spcCol="1270" anchor="ctr" anchorCtr="0">
-          <a:noAutofit/>
-        </a:bodyPr>
-        <a:lstStyle/>
-        <a:p>
-          <a:pPr lvl="0" algn="ctr" defTabSz="1022350">
-            <a:lnSpc>
-              <a:spcPct val="90000"/>
-            </a:lnSpc>
-            <a:spcBef>
-              <a:spcPct val="0"/>
-            </a:spcBef>
-            <a:spcAft>
-              <a:spcPct val="35000"/>
-            </a:spcAft>
-          </a:pPr>
-          <a:r>
-            <a:rPr lang="en-US" sz="2300" kern="1200" dirty="0" err="1" smtClean="0">
-              <a:ln>
-                <a:noFill/>
-              </a:ln>
-              <a:solidFill>
-                <a:srgbClr val="92D050"/>
-              </a:solidFill>
-            </a:rPr>
-            <a:t>IaaS</a:t>
-          </a:r>
-          <a:endParaRPr lang="ru-RU" sz="2300" kern="1200" dirty="0">
-            <a:ln>
-              <a:noFill/>
-            </a:ln>
-            <a:solidFill>
-              <a:srgbClr val="92D050"/>
-            </a:solidFill>
-          </a:endParaRPr>
-        </a:p>
-      </dsp:txBody>
-      <dsp:txXfrm>
-        <a:off x="938310" y="822816"/>
-        <a:ext cx="741933" cy="797777"/>
-      </dsp:txXfrm>
-    </dsp:sp>
-    <dsp:sp modelId="{40765CB4-C294-459A-8862-FC5E44F7FB91}">
-      <dsp:nvSpPr>
-        <dsp:cNvPr id="0" name=""/>
-        <dsp:cNvSpPr/>
-      </dsp:nvSpPr>
-      <dsp:spPr>
-        <a:xfrm rot="21564252">
-          <a:off x="1720370" y="1215414"/>
-          <a:ext cx="387672" cy="0"/>
-        </a:xfrm>
-        <a:custGeom>
-          <a:avLst/>
-          <a:gdLst/>
-          <a:ahLst/>
-          <a:cxnLst/>
-          <a:rect l="0" t="0" r="0" b="0"/>
-          <a:pathLst>
-            <a:path>
-              <a:moveTo>
-                <a:pt x="0" y="0"/>
-              </a:moveTo>
-              <a:lnTo>
-                <a:pt x="387672" y="0"/>
-              </a:lnTo>
-            </a:path>
-          </a:pathLst>
-        </a:custGeom>
-        <a:noFill/>
-        <a:ln w="25400" cap="flat" cmpd="sng" algn="ctr">
-          <a:solidFill>
-            <a:srgbClr val="00B0F0"/>
-          </a:solidFill>
-          <a:prstDash val="solid"/>
-        </a:ln>
-        <a:effectLst/>
-      </dsp:spPr>
-      <dsp:style>
-        <a:lnRef idx="2">
-          <a:scrgbClr r="0" g="0" b="0"/>
-        </a:lnRef>
-        <a:fillRef idx="0">
-          <a:scrgbClr r="0" g="0" b="0"/>
-        </a:fillRef>
-        <a:effectRef idx="0">
-          <a:scrgbClr r="0" g="0" b="0"/>
-        </a:effectRef>
-        <a:fontRef idx="minor"/>
-      </dsp:style>
-    </dsp:sp>
-    <dsp:sp modelId="{EEF398F6-2EF8-48AB-9AFF-6A7FD5CA2064}">
-      <dsp:nvSpPr>
-        <dsp:cNvPr id="0" name=""/>
-        <dsp:cNvSpPr/>
-      </dsp:nvSpPr>
-      <dsp:spPr>
-        <a:xfrm>
-          <a:off x="2108032" y="799901"/>
-          <a:ext cx="2675962" cy="799167"/>
-        </a:xfrm>
-        <a:prstGeom prst="roundRect">
-          <a:avLst/>
-        </a:prstGeom>
-        <a:solidFill>
-          <a:schemeClr val="bg1">
-            <a:lumMod val="95000"/>
-          </a:schemeClr>
-        </a:solidFill>
-        <a:ln w="25400" cap="flat" cmpd="sng" algn="ctr">
-          <a:solidFill>
-            <a:srgbClr val="00B0F0"/>
-          </a:solidFill>
-          <a:prstDash val="solid"/>
-        </a:ln>
-        <a:effectLst/>
-      </dsp:spPr>
-      <dsp:style>
-        <a:lnRef idx="2">
-          <a:scrgbClr r="0" g="0" b="0"/>
-        </a:lnRef>
-        <a:fillRef idx="1">
-          <a:scrgbClr r="0" g="0" b="0"/>
-        </a:fillRef>
-        <a:effectRef idx="0">
-          <a:scrgbClr r="0" g="0" b="0"/>
-        </a:effectRef>
-        <a:fontRef idx="minor">
-          <a:schemeClr val="lt1"/>
-        </a:fontRef>
-      </dsp:style>
-      <dsp:txBody>
-        <a:bodyPr spcFirstLastPara="0" vert="horz" wrap="square" lIns="540000" tIns="55880" rIns="55880" bIns="55880" numCol="1" spcCol="1270" anchor="ctr" anchorCtr="0">
-          <a:noAutofit/>
-        </a:bodyPr>
-        <a:lstStyle/>
-        <a:p>
-          <a:pPr lvl="0" algn="ctr" defTabSz="977900">
-            <a:lnSpc>
-              <a:spcPct val="90000"/>
-            </a:lnSpc>
-            <a:spcBef>
-              <a:spcPct val="0"/>
-            </a:spcBef>
-            <a:spcAft>
-              <a:spcPct val="35000"/>
-            </a:spcAft>
-          </a:pPr>
-          <a:r>
-            <a:rPr lang="en-US" sz="2200" b="0" i="0" kern="1200" dirty="0" smtClean="0">
-              <a:solidFill>
-                <a:srgbClr val="00B0F0"/>
-              </a:solidFill>
-            </a:rPr>
-            <a:t>Virtual Machines</a:t>
-          </a:r>
-          <a:endParaRPr lang="ru-RU" sz="2200" kern="1200" dirty="0">
-            <a:solidFill>
-              <a:srgbClr val="00B0F0"/>
-            </a:solidFill>
-          </a:endParaRPr>
-        </a:p>
-      </dsp:txBody>
-      <dsp:txXfrm>
-        <a:off x="2147044" y="838913"/>
-        <a:ext cx="2597938" cy="721143"/>
-      </dsp:txXfrm>
-    </dsp:sp>
   </dsp:spTree>
 </dsp:drawing>
 </file>
@@ -11212,1007 +10174,6 @@
       <dsp:cNvGrpSpPr/>
     </dsp:nvGrpSpPr>
     <dsp:grpSpPr/>
-    <dsp:sp modelId="{25056C25-FD7A-454A-BD80-5797A854A1C9}">
-      <dsp:nvSpPr>
-        <dsp:cNvPr id="0" name=""/>
-        <dsp:cNvSpPr/>
-      </dsp:nvSpPr>
-      <dsp:spPr>
-        <a:xfrm>
-          <a:off x="2222095" y="1180473"/>
-          <a:ext cx="523382" cy="558930"/>
-        </a:xfrm>
-        <a:prstGeom prst="roundRect">
-          <a:avLst/>
-        </a:prstGeom>
-        <a:solidFill>
-          <a:schemeClr val="bg1">
-            <a:lumMod val="95000"/>
-          </a:schemeClr>
-        </a:solidFill>
-        <a:ln w="25400" cap="flat" cmpd="sng" algn="ctr">
-          <a:solidFill>
-            <a:srgbClr val="92D050"/>
-          </a:solidFill>
-          <a:prstDash val="solid"/>
-        </a:ln>
-        <a:effectLst/>
-      </dsp:spPr>
-      <dsp:style>
-        <a:lnRef idx="2">
-          <a:scrgbClr r="0" g="0" b="0"/>
-        </a:lnRef>
-        <a:fillRef idx="1">
-          <a:scrgbClr r="0" g="0" b="0"/>
-        </a:fillRef>
-        <a:effectRef idx="0">
-          <a:scrgbClr r="0" g="0" b="0"/>
-        </a:effectRef>
-        <a:fontRef idx="minor">
-          <a:schemeClr val="lt1"/>
-        </a:fontRef>
-      </dsp:style>
-      <dsp:txBody>
-        <a:bodyPr spcFirstLastPara="0" vert="horz" wrap="square" lIns="33020" tIns="33020" rIns="33020" bIns="33020" numCol="1" spcCol="1270" anchor="ctr" anchorCtr="0">
-          <a:noAutofit/>
-        </a:bodyPr>
-        <a:lstStyle/>
-        <a:p>
-          <a:pPr lvl="0" algn="ctr" defTabSz="577850">
-            <a:lnSpc>
-              <a:spcPct val="90000"/>
-            </a:lnSpc>
-            <a:spcBef>
-              <a:spcPct val="0"/>
-            </a:spcBef>
-            <a:spcAft>
-              <a:spcPct val="35000"/>
-            </a:spcAft>
-          </a:pPr>
-          <a:r>
-            <a:rPr lang="en-US" sz="1300" kern="1200" dirty="0" err="1" smtClean="0">
-              <a:ln>
-                <a:noFill/>
-              </a:ln>
-              <a:solidFill>
-                <a:srgbClr val="92D050"/>
-              </a:solidFill>
-            </a:rPr>
-            <a:t>PaaS</a:t>
-          </a:r>
-          <a:endParaRPr lang="ru-RU" sz="1300" kern="1200" dirty="0">
-            <a:ln>
-              <a:noFill/>
-            </a:ln>
-            <a:solidFill>
-              <a:srgbClr val="92D050"/>
-            </a:solidFill>
-          </a:endParaRPr>
-        </a:p>
-      </dsp:txBody>
-      <dsp:txXfrm>
-        <a:off x="2247644" y="1206022"/>
-        <a:ext cx="472284" cy="507832"/>
-      </dsp:txXfrm>
-    </dsp:sp>
-    <dsp:sp modelId="{40765CB4-C294-459A-8862-FC5E44F7FB91}">
-      <dsp:nvSpPr>
-        <dsp:cNvPr id="0" name=""/>
-        <dsp:cNvSpPr/>
-      </dsp:nvSpPr>
-      <dsp:spPr>
-        <a:xfrm rot="18531129">
-          <a:off x="2574776" y="900204"/>
-          <a:ext cx="719773" cy="0"/>
-        </a:xfrm>
-        <a:custGeom>
-          <a:avLst/>
-          <a:gdLst/>
-          <a:ahLst/>
-          <a:cxnLst/>
-          <a:rect l="0" t="0" r="0" b="0"/>
-          <a:pathLst>
-            <a:path>
-              <a:moveTo>
-                <a:pt x="0" y="0"/>
-              </a:moveTo>
-              <a:lnTo>
-                <a:pt x="719773" y="0"/>
-              </a:lnTo>
-            </a:path>
-          </a:pathLst>
-        </a:custGeom>
-        <a:noFill/>
-        <a:ln w="25400" cap="flat" cmpd="sng" algn="ctr">
-          <a:solidFill>
-            <a:srgbClr val="00B0F0"/>
-          </a:solidFill>
-          <a:prstDash val="solid"/>
-        </a:ln>
-        <a:effectLst/>
-      </dsp:spPr>
-      <dsp:style>
-        <a:lnRef idx="2">
-          <a:scrgbClr r="0" g="0" b="0"/>
-        </a:lnRef>
-        <a:fillRef idx="0">
-          <a:scrgbClr r="0" g="0" b="0"/>
-        </a:fillRef>
-        <a:effectRef idx="0">
-          <a:scrgbClr r="0" g="0" b="0"/>
-        </a:effectRef>
-        <a:fontRef idx="minor"/>
-      </dsp:style>
-    </dsp:sp>
-    <dsp:sp modelId="{EEF398F6-2EF8-48AB-9AFF-6A7FD5CA2064}">
-      <dsp:nvSpPr>
-        <dsp:cNvPr id="0" name=""/>
-        <dsp:cNvSpPr/>
-      </dsp:nvSpPr>
-      <dsp:spPr>
-        <a:xfrm>
-          <a:off x="2513612" y="111220"/>
-          <a:ext cx="1703405" cy="508716"/>
-        </a:xfrm>
-        <a:prstGeom prst="roundRect">
-          <a:avLst/>
-        </a:prstGeom>
-        <a:solidFill>
-          <a:schemeClr val="bg1">
-            <a:lumMod val="95000"/>
-          </a:schemeClr>
-        </a:solidFill>
-        <a:ln w="25400" cap="flat" cmpd="sng" algn="ctr">
-          <a:solidFill>
-            <a:srgbClr val="00B0F0"/>
-          </a:solidFill>
-          <a:prstDash val="solid"/>
-        </a:ln>
-        <a:effectLst/>
-      </dsp:spPr>
-      <dsp:style>
-        <a:lnRef idx="2">
-          <a:scrgbClr r="0" g="0" b="0"/>
-        </a:lnRef>
-        <a:fillRef idx="1">
-          <a:scrgbClr r="0" g="0" b="0"/>
-        </a:fillRef>
-        <a:effectRef idx="0">
-          <a:scrgbClr r="0" g="0" b="0"/>
-        </a:effectRef>
-        <a:fontRef idx="minor">
-          <a:schemeClr val="lt1"/>
-        </a:fontRef>
-      </dsp:style>
-      <dsp:txBody>
-        <a:bodyPr spcFirstLastPara="0" vert="horz" wrap="square" lIns="540000" tIns="35560" rIns="35560" bIns="35560" numCol="1" spcCol="1270" anchor="ctr" anchorCtr="0">
-          <a:noAutofit/>
-        </a:bodyPr>
-        <a:lstStyle/>
-        <a:p>
-          <a:pPr lvl="0" algn="ctr" defTabSz="622300">
-            <a:lnSpc>
-              <a:spcPct val="90000"/>
-            </a:lnSpc>
-            <a:spcBef>
-              <a:spcPct val="0"/>
-            </a:spcBef>
-            <a:spcAft>
-              <a:spcPct val="35000"/>
-            </a:spcAft>
-          </a:pPr>
-          <a:r>
-            <a:rPr lang="en-US" sz="1400" b="0" i="0" kern="1200" dirty="0" smtClean="0">
-              <a:solidFill>
-                <a:srgbClr val="00B0F0"/>
-              </a:solidFill>
-            </a:rPr>
-            <a:t>Cloud Services</a:t>
-          </a:r>
-          <a:endParaRPr lang="ru-RU" sz="1400" kern="1200" dirty="0">
-            <a:solidFill>
-              <a:srgbClr val="00B0F0"/>
-            </a:solidFill>
-          </a:endParaRPr>
-        </a:p>
-      </dsp:txBody>
-      <dsp:txXfrm>
-        <a:off x="2538445" y="136053"/>
-        <a:ext cx="1653739" cy="459050"/>
-      </dsp:txXfrm>
-    </dsp:sp>
-    <dsp:sp modelId="{4B76F172-835F-47AA-A859-8A899CEE2510}">
-      <dsp:nvSpPr>
-        <dsp:cNvPr id="0" name=""/>
-        <dsp:cNvSpPr/>
-      </dsp:nvSpPr>
-      <dsp:spPr>
-        <a:xfrm rot="20600496">
-          <a:off x="2734080" y="1303787"/>
-          <a:ext cx="543120" cy="0"/>
-        </a:xfrm>
-        <a:custGeom>
-          <a:avLst/>
-          <a:gdLst/>
-          <a:ahLst/>
-          <a:cxnLst/>
-          <a:rect l="0" t="0" r="0" b="0"/>
-          <a:pathLst>
-            <a:path>
-              <a:moveTo>
-                <a:pt x="0" y="0"/>
-              </a:moveTo>
-              <a:lnTo>
-                <a:pt x="543120" y="0"/>
-              </a:lnTo>
-            </a:path>
-          </a:pathLst>
-        </a:custGeom>
-        <a:noFill/>
-        <a:ln w="25400" cap="flat" cmpd="sng" algn="ctr">
-          <a:solidFill>
-            <a:schemeClr val="accent1">
-              <a:shade val="60000"/>
-              <a:hueOff val="0"/>
-              <a:satOff val="0"/>
-              <a:lumOff val="0"/>
-              <a:alphaOff val="0"/>
-            </a:schemeClr>
-          </a:solidFill>
-          <a:prstDash val="solid"/>
-        </a:ln>
-        <a:effectLst/>
-      </dsp:spPr>
-      <dsp:style>
-        <a:lnRef idx="2">
-          <a:scrgbClr r="0" g="0" b="0"/>
-        </a:lnRef>
-        <a:fillRef idx="0">
-          <a:scrgbClr r="0" g="0" b="0"/>
-        </a:fillRef>
-        <a:effectRef idx="0">
-          <a:scrgbClr r="0" g="0" b="0"/>
-        </a:effectRef>
-        <a:fontRef idx="minor"/>
-      </dsp:style>
-    </dsp:sp>
-    <dsp:sp modelId="{2C989446-76CB-491D-A9E5-90C479CC1EB6}">
-      <dsp:nvSpPr>
-        <dsp:cNvPr id="0" name=""/>
-        <dsp:cNvSpPr/>
-      </dsp:nvSpPr>
-      <dsp:spPr>
-        <a:xfrm>
-          <a:off x="3264163" y="717224"/>
-          <a:ext cx="1703405" cy="508716"/>
-        </a:xfrm>
-        <a:prstGeom prst="roundRect">
-          <a:avLst/>
-        </a:prstGeom>
-        <a:solidFill>
-          <a:schemeClr val="bg1">
-            <a:lumMod val="95000"/>
-          </a:schemeClr>
-        </a:solidFill>
-        <a:ln w="25400" cap="flat" cmpd="sng" algn="ctr">
-          <a:solidFill>
-            <a:srgbClr val="00B0F0"/>
-          </a:solidFill>
-          <a:prstDash val="solid"/>
-        </a:ln>
-        <a:effectLst/>
-      </dsp:spPr>
-      <dsp:style>
-        <a:lnRef idx="2">
-          <a:scrgbClr r="0" g="0" b="0"/>
-        </a:lnRef>
-        <a:fillRef idx="1">
-          <a:scrgbClr r="0" g="0" b="0"/>
-        </a:fillRef>
-        <a:effectRef idx="0">
-          <a:scrgbClr r="0" g="0" b="0"/>
-        </a:effectRef>
-        <a:fontRef idx="minor">
-          <a:schemeClr val="lt1"/>
-        </a:fontRef>
-      </dsp:style>
-      <dsp:txBody>
-        <a:bodyPr spcFirstLastPara="0" vert="horz" wrap="square" lIns="540000" tIns="43180" rIns="43180" bIns="43180" numCol="1" spcCol="1270" anchor="ctr" anchorCtr="0">
-          <a:noAutofit/>
-        </a:bodyPr>
-        <a:lstStyle/>
-        <a:p>
-          <a:pPr lvl="0" algn="ctr" defTabSz="755650">
-            <a:lnSpc>
-              <a:spcPct val="90000"/>
-            </a:lnSpc>
-            <a:spcBef>
-              <a:spcPct val="0"/>
-            </a:spcBef>
-            <a:spcAft>
-              <a:spcPct val="35000"/>
-            </a:spcAft>
-          </a:pPr>
-          <a:r>
-            <a:rPr lang="en-US" sz="1700" kern="1200" dirty="0" smtClean="0">
-              <a:solidFill>
-                <a:srgbClr val="00B0F0"/>
-              </a:solidFill>
-            </a:rPr>
-            <a:t>SQL Azure</a:t>
-          </a:r>
-          <a:endParaRPr lang="ru-RU" sz="1700" kern="1200" dirty="0">
-            <a:solidFill>
-              <a:srgbClr val="00B0F0"/>
-            </a:solidFill>
-          </a:endParaRPr>
-        </a:p>
-      </dsp:txBody>
-      <dsp:txXfrm>
-        <a:off x="3288996" y="742057"/>
-        <a:ext cx="1653739" cy="459050"/>
-      </dsp:txXfrm>
-    </dsp:sp>
-    <dsp:sp modelId="{A1A7F2F7-8724-4320-8D3E-13A495501B45}">
-      <dsp:nvSpPr>
-        <dsp:cNvPr id="0" name=""/>
-        <dsp:cNvSpPr/>
-      </dsp:nvSpPr>
-      <dsp:spPr>
-        <a:xfrm rot="258212">
-          <a:off x="2744744" y="1499147"/>
-          <a:ext cx="520151" cy="0"/>
-        </a:xfrm>
-        <a:custGeom>
-          <a:avLst/>
-          <a:gdLst/>
-          <a:ahLst/>
-          <a:cxnLst/>
-          <a:rect l="0" t="0" r="0" b="0"/>
-          <a:pathLst>
-            <a:path>
-              <a:moveTo>
-                <a:pt x="0" y="0"/>
-              </a:moveTo>
-              <a:lnTo>
-                <a:pt x="520151" y="0"/>
-              </a:lnTo>
-            </a:path>
-          </a:pathLst>
-        </a:custGeom>
-        <a:noFill/>
-        <a:ln w="25400" cap="flat" cmpd="sng" algn="ctr">
-          <a:solidFill>
-            <a:schemeClr val="accent1">
-              <a:shade val="60000"/>
-              <a:hueOff val="0"/>
-              <a:satOff val="0"/>
-              <a:lumOff val="0"/>
-              <a:alphaOff val="0"/>
-            </a:schemeClr>
-          </a:solidFill>
-          <a:prstDash val="solid"/>
-        </a:ln>
-        <a:effectLst/>
-      </dsp:spPr>
-      <dsp:style>
-        <a:lnRef idx="2">
-          <a:scrgbClr r="0" g="0" b="0"/>
-        </a:lnRef>
-        <a:fillRef idx="0">
-          <a:scrgbClr r="0" g="0" b="0"/>
-        </a:fillRef>
-        <a:effectRef idx="0">
-          <a:scrgbClr r="0" g="0" b="0"/>
-        </a:effectRef>
-        <a:fontRef idx="minor"/>
-      </dsp:style>
-    </dsp:sp>
-    <dsp:sp modelId="{1C652A63-4612-4140-A184-53A0A081C97B}">
-      <dsp:nvSpPr>
-        <dsp:cNvPr id="0" name=""/>
-        <dsp:cNvSpPr/>
-      </dsp:nvSpPr>
-      <dsp:spPr>
-        <a:xfrm>
-          <a:off x="3264162" y="1328398"/>
-          <a:ext cx="1703405" cy="508716"/>
-        </a:xfrm>
-        <a:prstGeom prst="roundRect">
-          <a:avLst/>
-        </a:prstGeom>
-        <a:solidFill>
-          <a:schemeClr val="bg1">
-            <a:lumMod val="95000"/>
-          </a:schemeClr>
-        </a:solidFill>
-        <a:ln w="25400" cap="flat" cmpd="sng" algn="ctr">
-          <a:solidFill>
-            <a:srgbClr val="00B0F0"/>
-          </a:solidFill>
-          <a:prstDash val="solid"/>
-        </a:ln>
-        <a:effectLst/>
-      </dsp:spPr>
-      <dsp:style>
-        <a:lnRef idx="2">
-          <a:scrgbClr r="0" g="0" b="0"/>
-        </a:lnRef>
-        <a:fillRef idx="1">
-          <a:scrgbClr r="0" g="0" b="0"/>
-        </a:fillRef>
-        <a:effectRef idx="0">
-          <a:scrgbClr r="0" g="0" b="0"/>
-        </a:effectRef>
-        <a:fontRef idx="minor">
-          <a:schemeClr val="lt1"/>
-        </a:fontRef>
-      </dsp:style>
-      <dsp:txBody>
-        <a:bodyPr spcFirstLastPara="0" vert="horz" wrap="square" lIns="540000" tIns="35560" rIns="35560" bIns="35560" numCol="1" spcCol="1270" anchor="ctr" anchorCtr="0">
-          <a:noAutofit/>
-        </a:bodyPr>
-        <a:lstStyle/>
-        <a:p>
-          <a:pPr lvl="0" algn="ctr" defTabSz="622300">
-            <a:lnSpc>
-              <a:spcPct val="90000"/>
-            </a:lnSpc>
-            <a:spcBef>
-              <a:spcPct val="0"/>
-            </a:spcBef>
-            <a:spcAft>
-              <a:spcPct val="35000"/>
-            </a:spcAft>
-          </a:pPr>
-          <a:r>
-            <a:rPr lang="en-US" sz="1400" kern="1200" dirty="0" smtClean="0">
-              <a:solidFill>
-                <a:srgbClr val="00B0F0"/>
-              </a:solidFill>
-            </a:rPr>
-            <a:t>Storage Tables</a:t>
-          </a:r>
-          <a:endParaRPr lang="ru-RU" sz="1400" kern="1200" dirty="0">
-            <a:solidFill>
-              <a:srgbClr val="00B0F0"/>
-            </a:solidFill>
-          </a:endParaRPr>
-        </a:p>
-      </dsp:txBody>
-      <dsp:txXfrm>
-        <a:off x="3288995" y="1353231"/>
-        <a:ext cx="1653739" cy="459050"/>
-      </dsp:txXfrm>
-    </dsp:sp>
-    <dsp:sp modelId="{5727BF42-537E-40D5-B281-429A4AA75037}">
-      <dsp:nvSpPr>
-        <dsp:cNvPr id="0" name=""/>
-        <dsp:cNvSpPr/>
-      </dsp:nvSpPr>
-      <dsp:spPr>
-        <a:xfrm rot="2121630">
-          <a:off x="2698634" y="1792597"/>
-          <a:ext cx="507864" cy="0"/>
-        </a:xfrm>
-        <a:custGeom>
-          <a:avLst/>
-          <a:gdLst/>
-          <a:ahLst/>
-          <a:cxnLst/>
-          <a:rect l="0" t="0" r="0" b="0"/>
-          <a:pathLst>
-            <a:path>
-              <a:moveTo>
-                <a:pt x="0" y="0"/>
-              </a:moveTo>
-              <a:lnTo>
-                <a:pt x="507864" y="0"/>
-              </a:lnTo>
-            </a:path>
-          </a:pathLst>
-        </a:custGeom>
-        <a:noFill/>
-        <a:ln w="25400" cap="flat" cmpd="sng" algn="ctr">
-          <a:solidFill>
-            <a:schemeClr val="accent1">
-              <a:shade val="60000"/>
-              <a:hueOff val="0"/>
-              <a:satOff val="0"/>
-              <a:lumOff val="0"/>
-              <a:alphaOff val="0"/>
-            </a:schemeClr>
-          </a:solidFill>
-          <a:prstDash val="solid"/>
-        </a:ln>
-        <a:effectLst/>
-      </dsp:spPr>
-      <dsp:style>
-        <a:lnRef idx="2">
-          <a:scrgbClr r="0" g="0" b="0"/>
-        </a:lnRef>
-        <a:fillRef idx="0">
-          <a:scrgbClr r="0" g="0" b="0"/>
-        </a:fillRef>
-        <a:effectRef idx="0">
-          <a:scrgbClr r="0" g="0" b="0"/>
-        </a:effectRef>
-        <a:fontRef idx="minor"/>
-      </dsp:style>
-    </dsp:sp>
-    <dsp:sp modelId="{06CB251D-7874-46F5-B434-DFA2F5371EDF}">
-      <dsp:nvSpPr>
-        <dsp:cNvPr id="0" name=""/>
-        <dsp:cNvSpPr/>
-      </dsp:nvSpPr>
-      <dsp:spPr>
-        <a:xfrm>
-          <a:off x="2666392" y="1939552"/>
-          <a:ext cx="1703405" cy="508716"/>
-        </a:xfrm>
-        <a:prstGeom prst="roundRect">
-          <a:avLst/>
-        </a:prstGeom>
-        <a:solidFill>
-          <a:schemeClr val="bg1">
-            <a:lumMod val="95000"/>
-          </a:schemeClr>
-        </a:solidFill>
-        <a:ln w="25400" cap="flat" cmpd="sng" algn="ctr">
-          <a:solidFill>
-            <a:srgbClr val="00B0F0"/>
-          </a:solidFill>
-          <a:prstDash val="solid"/>
-        </a:ln>
-        <a:effectLst/>
-      </dsp:spPr>
-      <dsp:style>
-        <a:lnRef idx="2">
-          <a:scrgbClr r="0" g="0" b="0"/>
-        </a:lnRef>
-        <a:fillRef idx="1">
-          <a:scrgbClr r="0" g="0" b="0"/>
-        </a:fillRef>
-        <a:effectRef idx="0">
-          <a:scrgbClr r="0" g="0" b="0"/>
-        </a:effectRef>
-        <a:fontRef idx="minor">
-          <a:schemeClr val="lt1"/>
-        </a:fontRef>
-      </dsp:style>
-      <dsp:txBody>
-        <a:bodyPr spcFirstLastPara="0" vert="horz" wrap="square" lIns="540000" tIns="63500" rIns="63500" bIns="63500" numCol="1" spcCol="1270" anchor="ctr" anchorCtr="0">
-          <a:noAutofit/>
-        </a:bodyPr>
-        <a:lstStyle/>
-        <a:p>
-          <a:pPr lvl="0" algn="ctr" defTabSz="1111250">
-            <a:lnSpc>
-              <a:spcPct val="90000"/>
-            </a:lnSpc>
-            <a:spcBef>
-              <a:spcPct val="0"/>
-            </a:spcBef>
-            <a:spcAft>
-              <a:spcPct val="35000"/>
-            </a:spcAft>
-          </a:pPr>
-          <a:r>
-            <a:rPr lang="en-US" sz="2500" kern="1200" dirty="0" smtClean="0">
-              <a:solidFill>
-                <a:srgbClr val="00B0F0"/>
-              </a:solidFill>
-            </a:rPr>
-            <a:t>Cache</a:t>
-          </a:r>
-          <a:endParaRPr lang="ru-RU" sz="2500" kern="1200" dirty="0">
-            <a:solidFill>
-              <a:srgbClr val="00B0F0"/>
-            </a:solidFill>
-          </a:endParaRPr>
-        </a:p>
-      </dsp:txBody>
-      <dsp:txXfrm>
-        <a:off x="2691225" y="1964385"/>
-        <a:ext cx="1653739" cy="459050"/>
-      </dsp:txXfrm>
-    </dsp:sp>
-    <dsp:sp modelId="{C09D1272-4CF0-4360-A709-F658F12539F1}">
-      <dsp:nvSpPr>
-        <dsp:cNvPr id="0" name=""/>
-        <dsp:cNvSpPr/>
-      </dsp:nvSpPr>
-      <dsp:spPr>
-        <a:xfrm rot="8401647">
-          <a:off x="1864315" y="1809434"/>
-          <a:ext cx="405105" cy="0"/>
-        </a:xfrm>
-        <a:custGeom>
-          <a:avLst/>
-          <a:gdLst/>
-          <a:ahLst/>
-          <a:cxnLst/>
-          <a:rect l="0" t="0" r="0" b="0"/>
-          <a:pathLst>
-            <a:path>
-              <a:moveTo>
-                <a:pt x="0" y="0"/>
-              </a:moveTo>
-              <a:lnTo>
-                <a:pt x="405105" y="0"/>
-              </a:lnTo>
-            </a:path>
-          </a:pathLst>
-        </a:custGeom>
-        <a:noFill/>
-        <a:ln w="25400" cap="flat" cmpd="sng" algn="ctr">
-          <a:solidFill>
-            <a:schemeClr val="accent1">
-              <a:shade val="60000"/>
-              <a:hueOff val="0"/>
-              <a:satOff val="0"/>
-              <a:lumOff val="0"/>
-              <a:alphaOff val="0"/>
-            </a:schemeClr>
-          </a:solidFill>
-          <a:prstDash val="solid"/>
-        </a:ln>
-        <a:effectLst/>
-      </dsp:spPr>
-      <dsp:style>
-        <a:lnRef idx="2">
-          <a:scrgbClr r="0" g="0" b="0"/>
-        </a:lnRef>
-        <a:fillRef idx="0">
-          <a:scrgbClr r="0" g="0" b="0"/>
-        </a:fillRef>
-        <a:effectRef idx="0">
-          <a:scrgbClr r="0" g="0" b="0"/>
-        </a:effectRef>
-        <a:fontRef idx="minor"/>
-      </dsp:style>
-    </dsp:sp>
-    <dsp:sp modelId="{905EE044-8A93-48F4-B923-0A245442EAF2}">
-      <dsp:nvSpPr>
-        <dsp:cNvPr id="0" name=""/>
-        <dsp:cNvSpPr/>
-      </dsp:nvSpPr>
-      <dsp:spPr>
-        <a:xfrm>
-          <a:off x="756510" y="1939558"/>
-          <a:ext cx="1703405" cy="508716"/>
-        </a:xfrm>
-        <a:prstGeom prst="roundRect">
-          <a:avLst/>
-        </a:prstGeom>
-        <a:solidFill>
-          <a:schemeClr val="bg1">
-            <a:lumMod val="95000"/>
-          </a:schemeClr>
-        </a:solidFill>
-        <a:ln w="25400" cap="flat" cmpd="sng" algn="ctr">
-          <a:solidFill>
-            <a:srgbClr val="00B0F0"/>
-          </a:solidFill>
-          <a:prstDash val="solid"/>
-        </a:ln>
-        <a:effectLst/>
-      </dsp:spPr>
-      <dsp:style>
-        <a:lnRef idx="2">
-          <a:scrgbClr r="0" g="0" b="0"/>
-        </a:lnRef>
-        <a:fillRef idx="1">
-          <a:scrgbClr r="0" g="0" b="0"/>
-        </a:fillRef>
-        <a:effectRef idx="0">
-          <a:scrgbClr r="0" g="0" b="0"/>
-        </a:effectRef>
-        <a:fontRef idx="minor">
-          <a:schemeClr val="lt1"/>
-        </a:fontRef>
-      </dsp:style>
-      <dsp:txBody>
-        <a:bodyPr spcFirstLastPara="0" vert="horz" wrap="square" lIns="540000" tIns="35560" rIns="35560" bIns="35560" numCol="1" spcCol="1270" anchor="ctr" anchorCtr="0">
-          <a:noAutofit/>
-        </a:bodyPr>
-        <a:lstStyle/>
-        <a:p>
-          <a:pPr lvl="0" algn="ctr" defTabSz="622300">
-            <a:lnSpc>
-              <a:spcPct val="90000"/>
-            </a:lnSpc>
-            <a:spcBef>
-              <a:spcPct val="0"/>
-            </a:spcBef>
-            <a:spcAft>
-              <a:spcPct val="35000"/>
-            </a:spcAft>
-          </a:pPr>
-          <a:r>
-            <a:rPr lang="en-US" sz="1400" kern="1200" dirty="0" smtClean="0">
-              <a:solidFill>
-                <a:srgbClr val="00B0F0"/>
-              </a:solidFill>
-            </a:rPr>
-            <a:t>Mobile Services</a:t>
-          </a:r>
-          <a:endParaRPr lang="ru-RU" sz="1400" kern="1200" dirty="0">
-            <a:solidFill>
-              <a:srgbClr val="00B0F0"/>
-            </a:solidFill>
-          </a:endParaRPr>
-        </a:p>
-      </dsp:txBody>
-      <dsp:txXfrm>
-        <a:off x="781343" y="1964391"/>
-        <a:ext cx="1653739" cy="459050"/>
-      </dsp:txXfrm>
-    </dsp:sp>
-    <dsp:sp modelId="{92DF3097-6005-46D4-90E5-653438AEDECF}">
-      <dsp:nvSpPr>
-        <dsp:cNvPr id="0" name=""/>
-        <dsp:cNvSpPr/>
-      </dsp:nvSpPr>
-      <dsp:spPr>
-        <a:xfrm rot="11243038">
-          <a:off x="1923897" y="1406783"/>
-          <a:ext cx="299438" cy="0"/>
-        </a:xfrm>
-        <a:custGeom>
-          <a:avLst/>
-          <a:gdLst/>
-          <a:ahLst/>
-          <a:cxnLst/>
-          <a:rect l="0" t="0" r="0" b="0"/>
-          <a:pathLst>
-            <a:path>
-              <a:moveTo>
-                <a:pt x="0" y="0"/>
-              </a:moveTo>
-              <a:lnTo>
-                <a:pt x="299438" y="0"/>
-              </a:lnTo>
-            </a:path>
-          </a:pathLst>
-        </a:custGeom>
-        <a:noFill/>
-        <a:ln w="25400" cap="flat" cmpd="sng" algn="ctr">
-          <a:solidFill>
-            <a:schemeClr val="accent1">
-              <a:shade val="60000"/>
-              <a:hueOff val="0"/>
-              <a:satOff val="0"/>
-              <a:lumOff val="0"/>
-              <a:alphaOff val="0"/>
-            </a:schemeClr>
-          </a:solidFill>
-          <a:prstDash val="solid"/>
-        </a:ln>
-        <a:effectLst/>
-      </dsp:spPr>
-      <dsp:style>
-        <a:lnRef idx="2">
-          <a:scrgbClr r="0" g="0" b="0"/>
-        </a:lnRef>
-        <a:fillRef idx="0">
-          <a:scrgbClr r="0" g="0" b="0"/>
-        </a:fillRef>
-        <a:effectRef idx="0">
-          <a:scrgbClr r="0" g="0" b="0"/>
-        </a:effectRef>
-        <a:fontRef idx="minor"/>
-      </dsp:style>
-    </dsp:sp>
-    <dsp:sp modelId="{42C5E428-457C-4D2D-B9F7-8D88B989BAC4}">
-      <dsp:nvSpPr>
-        <dsp:cNvPr id="0" name=""/>
-        <dsp:cNvSpPr/>
-      </dsp:nvSpPr>
-      <dsp:spPr>
-        <a:xfrm>
-          <a:off x="221733" y="1022809"/>
-          <a:ext cx="1703405" cy="508716"/>
-        </a:xfrm>
-        <a:prstGeom prst="roundRect">
-          <a:avLst/>
-        </a:prstGeom>
-        <a:solidFill>
-          <a:schemeClr val="bg1">
-            <a:lumMod val="95000"/>
-          </a:schemeClr>
-        </a:solidFill>
-        <a:ln w="25400" cap="flat" cmpd="sng" algn="ctr">
-          <a:solidFill>
-            <a:srgbClr val="00B0F0"/>
-          </a:solidFill>
-          <a:prstDash val="solid"/>
-        </a:ln>
-        <a:effectLst/>
-      </dsp:spPr>
-      <dsp:style>
-        <a:lnRef idx="2">
-          <a:scrgbClr r="0" g="0" b="0"/>
-        </a:lnRef>
-        <a:fillRef idx="1">
-          <a:scrgbClr r="0" g="0" b="0"/>
-        </a:fillRef>
-        <a:effectRef idx="0">
-          <a:scrgbClr r="0" g="0" b="0"/>
-        </a:effectRef>
-        <a:fontRef idx="minor">
-          <a:schemeClr val="lt1"/>
-        </a:fontRef>
-      </dsp:style>
-      <dsp:txBody>
-        <a:bodyPr spcFirstLastPara="0" vert="horz" wrap="square" lIns="540000" tIns="35560" rIns="35560" bIns="35560" numCol="1" spcCol="1270" anchor="ctr" anchorCtr="0">
-          <a:noAutofit/>
-        </a:bodyPr>
-        <a:lstStyle/>
-        <a:p>
-          <a:pPr lvl="0" algn="ctr" defTabSz="622300">
-            <a:lnSpc>
-              <a:spcPct val="90000"/>
-            </a:lnSpc>
-            <a:spcBef>
-              <a:spcPct val="0"/>
-            </a:spcBef>
-            <a:spcAft>
-              <a:spcPct val="35000"/>
-            </a:spcAft>
-          </a:pPr>
-          <a:r>
-            <a:rPr lang="en-US" sz="1400" kern="1200" dirty="0" smtClean="0">
-              <a:solidFill>
-                <a:srgbClr val="00B0F0"/>
-              </a:solidFill>
-            </a:rPr>
-            <a:t>Traffic Manager</a:t>
-          </a:r>
-          <a:endParaRPr lang="ru-RU" sz="1400" kern="1200" dirty="0">
-            <a:solidFill>
-              <a:srgbClr val="00B0F0"/>
-            </a:solidFill>
-          </a:endParaRPr>
-        </a:p>
-      </dsp:txBody>
-      <dsp:txXfrm>
-        <a:off x="246566" y="1047642"/>
-        <a:ext cx="1653739" cy="459050"/>
-      </dsp:txXfrm>
-    </dsp:sp>
-    <dsp:sp modelId="{952B87BD-0B07-49BA-9E5C-A2E5FB19EB83}">
-      <dsp:nvSpPr>
-        <dsp:cNvPr id="0" name=""/>
-        <dsp:cNvSpPr/>
-      </dsp:nvSpPr>
-      <dsp:spPr>
-        <a:xfrm rot="13557237">
-          <a:off x="1550582" y="904662"/>
-          <a:ext cx="792234" cy="0"/>
-        </a:xfrm>
-        <a:custGeom>
-          <a:avLst/>
-          <a:gdLst/>
-          <a:ahLst/>
-          <a:cxnLst/>
-          <a:rect l="0" t="0" r="0" b="0"/>
-          <a:pathLst>
-            <a:path>
-              <a:moveTo>
-                <a:pt x="0" y="0"/>
-              </a:moveTo>
-              <a:lnTo>
-                <a:pt x="792234" y="0"/>
-              </a:lnTo>
-            </a:path>
-          </a:pathLst>
-        </a:custGeom>
-        <a:noFill/>
-        <a:ln w="25400" cap="flat" cmpd="sng" algn="ctr">
-          <a:solidFill>
-            <a:schemeClr val="accent1">
-              <a:shade val="60000"/>
-              <a:hueOff val="0"/>
-              <a:satOff val="0"/>
-              <a:lumOff val="0"/>
-              <a:alphaOff val="0"/>
-            </a:schemeClr>
-          </a:solidFill>
-          <a:prstDash val="solid"/>
-        </a:ln>
-        <a:effectLst/>
-      </dsp:spPr>
-      <dsp:style>
-        <a:lnRef idx="2">
-          <a:scrgbClr r="0" g="0" b="0"/>
-        </a:lnRef>
-        <a:fillRef idx="0">
-          <a:scrgbClr r="0" g="0" b="0"/>
-        </a:fillRef>
-        <a:effectRef idx="0">
-          <a:scrgbClr r="0" g="0" b="0"/>
-        </a:effectRef>
-        <a:fontRef idx="minor"/>
-      </dsp:style>
-    </dsp:sp>
-    <dsp:sp modelId="{A1DBB35B-359C-44C1-948D-F0C4AB873D98}">
-      <dsp:nvSpPr>
-        <dsp:cNvPr id="0" name=""/>
-        <dsp:cNvSpPr/>
-      </dsp:nvSpPr>
-      <dsp:spPr>
-        <a:xfrm>
-          <a:off x="573575" y="111224"/>
-          <a:ext cx="1703405" cy="508716"/>
-        </a:xfrm>
-        <a:prstGeom prst="roundRect">
-          <a:avLst/>
-        </a:prstGeom>
-        <a:solidFill>
-          <a:schemeClr val="bg1">
-            <a:lumMod val="95000"/>
-          </a:schemeClr>
-        </a:solidFill>
-        <a:ln w="25400" cap="flat" cmpd="sng" algn="ctr">
-          <a:solidFill>
-            <a:srgbClr val="00B0F0"/>
-          </a:solidFill>
-          <a:prstDash val="solid"/>
-        </a:ln>
-        <a:effectLst/>
-      </dsp:spPr>
-      <dsp:style>
-        <a:lnRef idx="2">
-          <a:scrgbClr r="0" g="0" b="0"/>
-        </a:lnRef>
-        <a:fillRef idx="1">
-          <a:scrgbClr r="0" g="0" b="0"/>
-        </a:fillRef>
-        <a:effectRef idx="0">
-          <a:scrgbClr r="0" g="0" b="0"/>
-        </a:effectRef>
-        <a:fontRef idx="minor">
-          <a:schemeClr val="lt1"/>
-        </a:fontRef>
-      </dsp:style>
-      <dsp:txBody>
-        <a:bodyPr spcFirstLastPara="0" vert="horz" wrap="square" lIns="540000" tIns="35560" rIns="35560" bIns="35560" numCol="1" spcCol="1270" anchor="ctr" anchorCtr="0">
-          <a:noAutofit/>
-        </a:bodyPr>
-        <a:lstStyle/>
-        <a:p>
-          <a:pPr lvl="0" algn="ctr" defTabSz="622300">
-            <a:lnSpc>
-              <a:spcPct val="90000"/>
-            </a:lnSpc>
-            <a:spcBef>
-              <a:spcPct val="0"/>
-            </a:spcBef>
-            <a:spcAft>
-              <a:spcPct val="35000"/>
-            </a:spcAft>
-          </a:pPr>
-          <a:r>
-            <a:rPr lang="en-US" sz="1400" kern="1200" smtClean="0">
-              <a:solidFill>
-                <a:srgbClr val="00B0F0"/>
-              </a:solidFill>
-            </a:rPr>
-            <a:t>Storage Blobs</a:t>
-          </a:r>
-          <a:endParaRPr lang="ru-RU" sz="1400" kern="1200" dirty="0">
-            <a:solidFill>
-              <a:srgbClr val="00B0F0"/>
-            </a:solidFill>
-          </a:endParaRPr>
-        </a:p>
-      </dsp:txBody>
-      <dsp:txXfrm>
-        <a:off x="598408" y="136057"/>
-        <a:ext cx="1653739" cy="459050"/>
-      </dsp:txXfrm>
-    </dsp:sp>
   </dsp:spTree>
 </dsp:drawing>
 </file>
@@ -21955,7 +19916,7 @@
             <a:fld id="{C3402240-18E8-4BA6-A53E-7A1792A59EEC}" type="datetimeFigureOut">
               <a:rPr lang="en-US" smtClean="0"/>
               <a:pPr/>
-              <a:t>6/15/2015</a:t>
+              <a:t>6/16/2015</a:t>
             </a:fld>
             <a:endParaRPr lang="en-US"/>
           </a:p>
@@ -23875,11 +21836,7 @@
           <a:p>
             <a:r>
               <a:rPr lang="en-US" dirty="0" smtClean="0"/>
-              <a:t>http://</a:t>
-            </a:r>
-            <a:r>
-              <a:rPr lang="en-US" dirty="0" smtClean="0"/>
-              <a:t>blogs.msdn.com/b/devfish/archive/2015/02/12/get-azurevm-your-azure-credentials-have-not-been-set-up-or-have-expired-please-run-add-azureaccount-to-set-up-your-azure-credentials.aspx</a:t>
+              <a:t>http://blogs.msdn.com/b/devfish/archive/2015/02/12/get-azurevm-your-azure-credentials-have-not-been-set-up-or-have-expired-please-run-add-azureaccount-to-set-up-your-azure-credentials.aspx</a:t>
             </a:r>
           </a:p>
           <a:p>
@@ -24406,29 +22363,13 @@
                 <a:ea typeface="+mn-ea"/>
                 <a:cs typeface="+mn-cs"/>
               </a:rPr>
-              <a:t>Secure </a:t>
-            </a:r>
-            <a:r>
-              <a:rPr lang="en-US" sz="1200" b="1" i="0" kern="1200" dirty="0" smtClean="0">
-                <a:solidFill>
-                  <a:schemeClr val="tx1"/>
-                </a:solidFill>
-                <a:effectLst/>
-                <a:latin typeface="+mn-lt"/>
-                <a:ea typeface="+mn-ea"/>
-                <a:cs typeface="+mn-cs"/>
-              </a:rPr>
-              <a:t>a web app in Azure App Service</a:t>
+              <a:t>Secure a web app in Azure App Service</a:t>
             </a:r>
           </a:p>
           <a:p>
             <a:r>
               <a:rPr lang="en-US" dirty="0" smtClean="0"/>
-              <a:t>https://azure.microsoft.com/en-us/documentation/articles/web-sites-security</a:t>
-            </a:r>
-            <a:r>
-              <a:rPr lang="en-US" dirty="0" smtClean="0"/>
-              <a:t>/</a:t>
+              <a:t>https://azure.microsoft.com/en-us/documentation/articles/web-sites-security/</a:t>
             </a:r>
           </a:p>
           <a:p>
@@ -24891,7 +22832,7 @@
             <a:fld id="{4D78249E-5ACD-4E52-A408-9BB999BD2D41}" type="slidenum">
               <a:rPr lang="en-US" smtClean="0"/>
               <a:pPr/>
-              <a:t>26</a:t>
+              <a:t>25</a:t>
             </a:fld>
             <a:endParaRPr lang="en-US"/>
           </a:p>
@@ -24911,6 +22852,126 @@
 </file>
 
 <file path=ppt/notesSlides/notesSlide23.xml><?xml version="1.0" encoding="utf-8"?>
+<p:notes xmlns:a="http://schemas.openxmlformats.org/drawingml/2006/main" xmlns:r="http://schemas.openxmlformats.org/officeDocument/2006/relationships" xmlns:p="http://schemas.openxmlformats.org/presentationml/2006/main">
+  <p:cSld>
+    <p:spTree>
+      <p:nvGrpSpPr>
+        <p:cNvPr id="1" name=""/>
+        <p:cNvGrpSpPr/>
+        <p:nvPr/>
+      </p:nvGrpSpPr>
+      <p:grpSpPr>
+        <a:xfrm>
+          <a:off x="0" y="0"/>
+          <a:ext cx="0" cy="0"/>
+          <a:chOff x="0" y="0"/>
+          <a:chExt cx="0" cy="0"/>
+        </a:xfrm>
+      </p:grpSpPr>
+      <p:sp>
+        <p:nvSpPr>
+          <p:cNvPr id="2" name="Slide Image Placeholder 1"/>
+          <p:cNvSpPr>
+            <a:spLocks noGrp="1" noRot="1" noChangeAspect="1"/>
+          </p:cNvSpPr>
+          <p:nvPr>
+            <p:ph type="sldImg"/>
+          </p:nvPr>
+        </p:nvSpPr>
+        <p:spPr/>
+      </p:sp>
+      <p:sp>
+        <p:nvSpPr>
+          <p:cNvPr id="3" name="Notes Placeholder 2"/>
+          <p:cNvSpPr>
+            <a:spLocks noGrp="1"/>
+          </p:cNvSpPr>
+          <p:nvPr>
+            <p:ph type="body" idx="1"/>
+          </p:nvPr>
+        </p:nvSpPr>
+        <p:spPr/>
+        <p:txBody>
+          <a:bodyPr/>
+          <a:lstStyle/>
+          <a:p>
+            <a:pPr marL="0" marR="0" indent="0" algn="l" defTabSz="914400" rtl="0" eaLnBrk="1" fontAlgn="auto" latinLnBrk="0" hangingPunct="1">
+              <a:lnSpc>
+                <a:spcPct val="100000"/>
+              </a:lnSpc>
+              <a:spcBef>
+                <a:spcPts val="0"/>
+              </a:spcBef>
+              <a:spcAft>
+                <a:spcPts val="0"/>
+              </a:spcAft>
+              <a:buClrTx/>
+              <a:buSzTx/>
+              <a:buFontTx/>
+              <a:buNone/>
+              <a:tabLst/>
+              <a:defRPr/>
+            </a:pPr>
+            <a:r>
+              <a:rPr lang="en-US" sz="1200" b="1" i="0" kern="1200" dirty="0" smtClean="0">
+                <a:solidFill>
+                  <a:schemeClr val="tx1"/>
+                </a:solidFill>
+                <a:effectLst/>
+                <a:latin typeface="+mn-lt"/>
+                <a:ea typeface="+mn-ea"/>
+                <a:cs typeface="+mn-cs"/>
+              </a:rPr>
+              <a:t>Traffic Manager Overview</a:t>
+            </a:r>
+          </a:p>
+          <a:p>
+            <a:r>
+              <a:rPr lang="en-US" dirty="0" smtClean="0"/>
+              <a:t>https://azure.microsoft.com/en-us/documentation/articles/traffic-manager-overview/</a:t>
+            </a:r>
+            <a:endParaRPr lang="ru-RU" dirty="0"/>
+          </a:p>
+        </p:txBody>
+      </p:sp>
+      <p:sp>
+        <p:nvSpPr>
+          <p:cNvPr id="4" name="Slide Number Placeholder 3"/>
+          <p:cNvSpPr>
+            <a:spLocks noGrp="1"/>
+          </p:cNvSpPr>
+          <p:nvPr>
+            <p:ph type="sldNum" sz="quarter" idx="10"/>
+          </p:nvPr>
+        </p:nvSpPr>
+        <p:spPr/>
+        <p:txBody>
+          <a:bodyPr/>
+          <a:lstStyle/>
+          <a:p>
+            <a:fld id="{4D78249E-5ACD-4E52-A408-9BB999BD2D41}" type="slidenum">
+              <a:rPr lang="en-US" smtClean="0"/>
+              <a:pPr/>
+              <a:t>28</a:t>
+            </a:fld>
+            <a:endParaRPr lang="en-US"/>
+          </a:p>
+        </p:txBody>
+      </p:sp>
+    </p:spTree>
+    <p:extLst>
+      <p:ext uri="{BB962C8B-B14F-4D97-AF65-F5344CB8AC3E}">
+        <p14:creationId xmlns:p14="http://schemas.microsoft.com/office/powerpoint/2010/main" val="234760166"/>
+      </p:ext>
+    </p:extLst>
+  </p:cSld>
+  <p:clrMapOvr>
+    <a:masterClrMapping/>
+  </p:clrMapOvr>
+</p:notes>
+</file>
+
+<file path=ppt/notesSlides/notesSlide24.xml><?xml version="1.0" encoding="utf-8"?>
 <p:notes xmlns:a="http://schemas.openxmlformats.org/drawingml/2006/main" xmlns:r="http://schemas.openxmlformats.org/officeDocument/2006/relationships" xmlns:p="http://schemas.openxmlformats.org/presentationml/2006/main">
   <p:cSld>
     <p:spTree>
@@ -25247,7 +23308,7 @@
             <a:fld id="{4D78249E-5ACD-4E52-A408-9BB999BD2D41}" type="slidenum">
               <a:rPr lang="en-US" smtClean="0"/>
               <a:pPr/>
-              <a:t>29</a:t>
+              <a:t>31</a:t>
             </a:fld>
             <a:endParaRPr lang="en-US"/>
           </a:p>
@@ -25266,7 +23327,7 @@
 </p:notes>
 </file>
 
-<file path=ppt/notesSlides/notesSlide24.xml><?xml version="1.0" encoding="utf-8"?>
+<file path=ppt/notesSlides/notesSlide25.xml><?xml version="1.0" encoding="utf-8"?>
 <p:notes xmlns:a="http://schemas.openxmlformats.org/drawingml/2006/main" xmlns:r="http://schemas.openxmlformats.org/officeDocument/2006/relationships" xmlns:p="http://schemas.openxmlformats.org/presentationml/2006/main">
   <p:cSld>
     <p:spTree>
@@ -25342,7 +23403,7 @@
             <a:fld id="{4D78249E-5ACD-4E52-A408-9BB999BD2D41}" type="slidenum">
               <a:rPr lang="en-US" smtClean="0"/>
               <a:pPr/>
-              <a:t>30</a:t>
+              <a:t>32</a:t>
             </a:fld>
             <a:endParaRPr lang="en-US"/>
           </a:p>
@@ -25361,7 +23422,7 @@
 </p:notes>
 </file>
 
-<file path=ppt/notesSlides/notesSlide25.xml><?xml version="1.0" encoding="utf-8"?>
+<file path=ppt/notesSlides/notesSlide26.xml><?xml version="1.0" encoding="utf-8"?>
 <p:notes xmlns:a="http://schemas.openxmlformats.org/drawingml/2006/main" xmlns:r="http://schemas.openxmlformats.org/officeDocument/2006/relationships" xmlns:p="http://schemas.openxmlformats.org/presentationml/2006/main">
   <p:cSld>
     <p:spTree>
@@ -25427,7 +23488,7 @@
             <a:fld id="{8B263312-38AA-4E1E-B2B5-0F8F122B24FE}" type="slidenum">
               <a:rPr lang="en-US" smtClean="0"/>
               <a:pPr/>
-              <a:t>33</a:t>
+              <a:t>35</a:t>
             </a:fld>
             <a:endParaRPr lang="en-US" dirty="0"/>
           </a:p>
@@ -25849,11 +23910,7 @@
           <a:p>
             <a:r>
               <a:rPr lang="en-US" dirty="0" smtClean="0"/>
-              <a:t>http://</a:t>
-            </a:r>
-            <a:r>
-              <a:rPr lang="en-US" dirty="0" smtClean="0"/>
-              <a:t>www.rightscale.com/blog/cloud-industry-insights/cloud-computing-trends-2015-state-cloud-survey</a:t>
+              <a:t>http://www.rightscale.com/blog/cloud-industry-insights/cloud-computing-trends-2015-state-cloud-survey</a:t>
             </a:r>
           </a:p>
           <a:p>
@@ -26011,7 +24068,6 @@
               <a:rPr lang="en-US" b="1" dirty="0" smtClean="0"/>
               <a:t>In private cloud leading VMware</a:t>
             </a:r>
-            <a:endParaRPr lang="en-US" b="1" dirty="0" smtClean="0"/>
           </a:p>
         </p:txBody>
       </p:sp>
@@ -26665,7 +24721,7 @@
             <a:fld id="{5B106E36-FD25-4E2D-B0AA-010F637433A0}" type="datetimeFigureOut">
               <a:rPr lang="ru-RU" smtClean="0"/>
               <a:pPr/>
-              <a:t>15.06.2015</a:t>
+              <a:t>16.06.2015</a:t>
             </a:fld>
             <a:endParaRPr lang="ru-RU"/>
           </a:p>
@@ -26937,7 +24993,7 @@
             <a:fld id="{5B106E36-FD25-4E2D-B0AA-010F637433A0}" type="datetimeFigureOut">
               <a:rPr lang="ru-RU" smtClean="0"/>
               <a:pPr/>
-              <a:t>15.06.2015</a:t>
+              <a:t>16.06.2015</a:t>
             </a:fld>
             <a:endParaRPr lang="ru-RU"/>
           </a:p>
@@ -27130,7 +25186,7 @@
             <a:fld id="{5B106E36-FD25-4E2D-B0AA-010F637433A0}" type="datetimeFigureOut">
               <a:rPr lang="ru-RU" smtClean="0"/>
               <a:pPr/>
-              <a:t>15.06.2015</a:t>
+              <a:t>16.06.2015</a:t>
             </a:fld>
             <a:endParaRPr lang="ru-RU"/>
           </a:p>
@@ -27596,7 +25652,7 @@
             <a:fld id="{5B106E36-FD25-4E2D-B0AA-010F637433A0}" type="datetimeFigureOut">
               <a:rPr lang="ru-RU" smtClean="0"/>
               <a:pPr/>
-              <a:t>15.06.2015</a:t>
+              <a:t>16.06.2015</a:t>
             </a:fld>
             <a:endParaRPr lang="ru-RU"/>
           </a:p>
@@ -27887,7 +25943,7 @@
             <a:fld id="{5B106E36-FD25-4E2D-B0AA-010F637433A0}" type="datetimeFigureOut">
               <a:rPr lang="ru-RU" smtClean="0"/>
               <a:pPr/>
-              <a:t>15.06.2015</a:t>
+              <a:t>16.06.2015</a:t>
             </a:fld>
             <a:endParaRPr lang="ru-RU"/>
           </a:p>
@@ -28188,7 +26244,7 @@
             <a:fld id="{5B106E36-FD25-4E2D-B0AA-010F637433A0}" type="datetimeFigureOut">
               <a:rPr lang="ru-RU" smtClean="0"/>
               <a:pPr/>
-              <a:t>15.06.2015</a:t>
+              <a:t>16.06.2015</a:t>
             </a:fld>
             <a:endParaRPr lang="ru-RU"/>
           </a:p>
@@ -28623,7 +26679,7 @@
             <a:fld id="{5B106E36-FD25-4E2D-B0AA-010F637433A0}" type="datetimeFigureOut">
               <a:rPr lang="ru-RU" smtClean="0"/>
               <a:pPr/>
-              <a:t>15.06.2015</a:t>
+              <a:t>16.06.2015</a:t>
             </a:fld>
             <a:endParaRPr lang="ru-RU"/>
           </a:p>
@@ -28800,7 +26856,7 @@
             <a:fld id="{5B106E36-FD25-4E2D-B0AA-010F637433A0}" type="datetimeFigureOut">
               <a:rPr lang="ru-RU" smtClean="0"/>
               <a:pPr/>
-              <a:t>15.06.2015</a:t>
+              <a:t>16.06.2015</a:t>
             </a:fld>
             <a:endParaRPr lang="ru-RU"/>
           </a:p>
@@ -28940,7 +26996,7 @@
             <a:fld id="{5B106E36-FD25-4E2D-B0AA-010F637433A0}" type="datetimeFigureOut">
               <a:rPr lang="ru-RU" smtClean="0"/>
               <a:pPr/>
-              <a:t>15.06.2015</a:t>
+              <a:t>16.06.2015</a:t>
             </a:fld>
             <a:endParaRPr lang="ru-RU"/>
           </a:p>
@@ -29262,7 +27318,7 @@
             <a:fld id="{5B106E36-FD25-4E2D-B0AA-010F637433A0}" type="datetimeFigureOut">
               <a:rPr lang="ru-RU" smtClean="0"/>
               <a:pPr/>
-              <a:t>15.06.2015</a:t>
+              <a:t>16.06.2015</a:t>
             </a:fld>
             <a:endParaRPr lang="ru-RU"/>
           </a:p>
@@ -29523,7 +27579,7 @@
             <a:fld id="{5B106E36-FD25-4E2D-B0AA-010F637433A0}" type="datetimeFigureOut">
               <a:rPr lang="ru-RU" smtClean="0"/>
               <a:pPr/>
-              <a:t>15.06.2015</a:t>
+              <a:t>16.06.2015</a:t>
             </a:fld>
             <a:endParaRPr lang="ru-RU"/>
           </a:p>
@@ -29743,7 +27799,7 @@
             <a:fld id="{5B106E36-FD25-4E2D-B0AA-010F637433A0}" type="datetimeFigureOut">
               <a:rPr lang="ru-RU" smtClean="0"/>
               <a:pPr/>
-              <a:t>15.06.2015</a:t>
+              <a:t>16.06.2015</a:t>
             </a:fld>
             <a:endParaRPr lang="ru-RU"/>
           </a:p>
@@ -42330,85 +40386,6 @@
           <a:p>
             <a:r>
               <a:rPr lang="en-US" dirty="0" smtClean="0"/>
-              <a:t>Traffic Manager</a:t>
-            </a:r>
-            <a:endParaRPr lang="ru-RU" dirty="0"/>
-          </a:p>
-        </p:txBody>
-      </p:sp>
-      <p:sp>
-        <p:nvSpPr>
-          <p:cNvPr id="3" name="Content Placeholder 2"/>
-          <p:cNvSpPr>
-            <a:spLocks noGrp="1"/>
-          </p:cNvSpPr>
-          <p:nvPr>
-            <p:ph idx="1"/>
-          </p:nvPr>
-        </p:nvSpPr>
-        <p:spPr/>
-        <p:txBody>
-          <a:bodyPr/>
-          <a:lstStyle/>
-          <a:p>
-            <a:endParaRPr lang="ru-RU"/>
-          </a:p>
-        </p:txBody>
-      </p:sp>
-    </p:spTree>
-    <p:extLst>
-      <p:ext uri="{BB962C8B-B14F-4D97-AF65-F5344CB8AC3E}">
-        <p14:creationId xmlns:p14="http://schemas.microsoft.com/office/powerpoint/2010/main" val="3205957728"/>
-      </p:ext>
-    </p:extLst>
-  </p:cSld>
-  <p:clrMapOvr>
-    <a:masterClrMapping/>
-  </p:clrMapOvr>
-  <p:timing>
-    <p:tnLst>
-      <p:par>
-        <p:cTn id="1" dur="indefinite" restart="never" nodeType="tmRoot"/>
-      </p:par>
-    </p:tnLst>
-  </p:timing>
-</p:sld>
-</file>
-
-<file path=ppt/slides/slide26.xml><?xml version="1.0" encoding="utf-8"?>
-<p:sld xmlns:a="http://schemas.openxmlformats.org/drawingml/2006/main" xmlns:r="http://schemas.openxmlformats.org/officeDocument/2006/relationships" xmlns:p="http://schemas.openxmlformats.org/presentationml/2006/main">
-  <p:cSld>
-    <p:spTree>
-      <p:nvGrpSpPr>
-        <p:cNvPr id="1" name=""/>
-        <p:cNvGrpSpPr/>
-        <p:nvPr/>
-      </p:nvGrpSpPr>
-      <p:grpSpPr>
-        <a:xfrm>
-          <a:off x="0" y="0"/>
-          <a:ext cx="0" cy="0"/>
-          <a:chOff x="0" y="0"/>
-          <a:chExt cx="0" cy="0"/>
-        </a:xfrm>
-      </p:grpSpPr>
-      <p:sp>
-        <p:nvSpPr>
-          <p:cNvPr id="2" name="Title 1"/>
-          <p:cNvSpPr>
-            <a:spLocks noGrp="1"/>
-          </p:cNvSpPr>
-          <p:nvPr>
-            <p:ph type="title"/>
-          </p:nvPr>
-        </p:nvSpPr>
-        <p:spPr/>
-        <p:txBody>
-          <a:bodyPr/>
-          <a:lstStyle/>
-          <a:p>
-            <a:r>
-              <a:rPr lang="en-US" dirty="0" smtClean="0"/>
               <a:t>Service Plans</a:t>
             </a:r>
             <a:endParaRPr lang="ru-RU" dirty="0"/>
@@ -42454,7 +40431,7 @@
 </p:sld>
 </file>
 
-<file path=ppt/slides/slide27.xml><?xml version="1.0" encoding="utf-8"?>
+<file path=ppt/slides/slide26.xml><?xml version="1.0" encoding="utf-8"?>
 <p:sld xmlns:a="http://schemas.openxmlformats.org/drawingml/2006/main" xmlns:r="http://schemas.openxmlformats.org/officeDocument/2006/relationships" xmlns:p="http://schemas.openxmlformats.org/presentationml/2006/main">
   <p:cSld>
     <p:spTree>
@@ -42533,7 +40510,7 @@
 </p:sld>
 </file>
 
-<file path=ppt/slides/slide28.xml><?xml version="1.0" encoding="utf-8"?>
+<file path=ppt/slides/slide27.xml><?xml version="1.0" encoding="utf-8"?>
 <p:sld xmlns:a="http://schemas.openxmlformats.org/drawingml/2006/main" xmlns:r="http://schemas.openxmlformats.org/officeDocument/2006/relationships" xmlns:p="http://schemas.openxmlformats.org/presentationml/2006/main">
   <p:cSld>
     <p:spTree>
@@ -42577,15 +40554,7 @@
                   <a:srgbClr val="00B0F0"/>
                 </a:solidFill>
               </a:rPr>
-              <a:t>SQL </a:t>
-            </a:r>
-            <a:r>
-              <a:rPr lang="en-US" dirty="0" smtClean="0">
-                <a:solidFill>
-                  <a:srgbClr val="00B0F0"/>
-                </a:solidFill>
-              </a:rPr>
-              <a:t>Databases</a:t>
+              <a:t>Traffic Manager</a:t>
             </a:r>
             <a:endParaRPr lang="ru-RU" dirty="0">
               <a:solidFill>
@@ -42595,40 +40564,303 @@
           </a:p>
         </p:txBody>
       </p:sp>
-      <p:pic>
-        <p:nvPicPr>
-          <p:cNvPr id="2" name="Picture 1"/>
-          <p:cNvPicPr>
-            <a:picLocks noChangeAspect="1"/>
-          </p:cNvPicPr>
-          <p:nvPr/>
-        </p:nvPicPr>
-        <p:blipFill>
-          <a:blip r:embed="rId2">
-            <a:extLst>
-              <a:ext uri="{28A0092B-C50C-407E-A947-70E740481C1C}">
-                <a14:useLocalDpi xmlns:a14="http://schemas.microsoft.com/office/drawing/2010/main" val="0"/>
-              </a:ext>
-            </a:extLst>
-          </a:blip>
-          <a:stretch>
-            <a:fillRect/>
-          </a:stretch>
-        </p:blipFill>
-        <p:spPr>
-          <a:xfrm>
-            <a:off x="6069453" y="2060848"/>
-            <a:ext cx="2032176" cy="2123624"/>
-          </a:xfrm>
-          <a:prstGeom prst="rect">
-            <a:avLst/>
-          </a:prstGeom>
-        </p:spPr>
-      </p:pic>
     </p:spTree>
     <p:extLst>
       <p:ext uri="{BB962C8B-B14F-4D97-AF65-F5344CB8AC3E}">
-        <p14:creationId xmlns:p14="http://schemas.microsoft.com/office/powerpoint/2010/main" val="1442076319"/>
+        <p14:creationId xmlns:p14="http://schemas.microsoft.com/office/powerpoint/2010/main" val="2003995988"/>
+      </p:ext>
+    </p:extLst>
+  </p:cSld>
+  <p:clrMapOvr>
+    <a:masterClrMapping/>
+  </p:clrMapOvr>
+</p:sld>
+</file>
+
+<file path=ppt/slides/slide28.xml><?xml version="1.0" encoding="utf-8"?>
+<p:sld xmlns:a="http://schemas.openxmlformats.org/drawingml/2006/main" xmlns:r="http://schemas.openxmlformats.org/officeDocument/2006/relationships" xmlns:p="http://schemas.openxmlformats.org/presentationml/2006/main">
+  <p:cSld>
+    <p:spTree>
+      <p:nvGrpSpPr>
+        <p:cNvPr id="1" name=""/>
+        <p:cNvGrpSpPr/>
+        <p:nvPr/>
+      </p:nvGrpSpPr>
+      <p:grpSpPr>
+        <a:xfrm>
+          <a:off x="0" y="0"/>
+          <a:ext cx="0" cy="0"/>
+          <a:chOff x="0" y="0"/>
+          <a:chExt cx="0" cy="0"/>
+        </a:xfrm>
+      </p:grpSpPr>
+      <p:sp>
+        <p:nvSpPr>
+          <p:cNvPr id="2" name="Title 1"/>
+          <p:cNvSpPr>
+            <a:spLocks noGrp="1"/>
+          </p:cNvSpPr>
+          <p:nvPr>
+            <p:ph type="title"/>
+          </p:nvPr>
+        </p:nvSpPr>
+        <p:spPr/>
+        <p:txBody>
+          <a:bodyPr/>
+          <a:lstStyle/>
+          <a:p>
+            <a:r>
+              <a:rPr lang="en-US" dirty="0" smtClean="0"/>
+              <a:t>Traffic </a:t>
+            </a:r>
+            <a:r>
+              <a:rPr lang="en-US" dirty="0" smtClean="0"/>
+              <a:t>Manager (Overview)</a:t>
+            </a:r>
+            <a:endParaRPr lang="ru-RU" dirty="0"/>
+          </a:p>
+        </p:txBody>
+      </p:sp>
+      <p:grpSp>
+        <p:nvGrpSpPr>
+          <p:cNvPr id="4" name="Group 3"/>
+          <p:cNvGrpSpPr/>
+          <p:nvPr/>
+        </p:nvGrpSpPr>
+        <p:grpSpPr>
+          <a:xfrm>
+            <a:off x="1703527" y="1484785"/>
+            <a:ext cx="10056560" cy="1368152"/>
+            <a:chOff x="1780308" y="4012490"/>
+            <a:chExt cx="10056560" cy="1368152"/>
+          </a:xfrm>
+        </p:grpSpPr>
+        <p:sp>
+          <p:nvSpPr>
+            <p:cNvPr id="5" name="Rounded Rectangle 4"/>
+            <p:cNvSpPr/>
+            <p:nvPr/>
+          </p:nvSpPr>
+          <p:spPr>
+            <a:xfrm>
+              <a:off x="1780308" y="4012490"/>
+              <a:ext cx="10009112" cy="1368152"/>
+            </a:xfrm>
+            <a:prstGeom prst="roundRect">
+              <a:avLst/>
+            </a:prstGeom>
+            <a:solidFill>
+              <a:schemeClr val="bg1">
+                <a:lumMod val="95000"/>
+              </a:schemeClr>
+            </a:solidFill>
+            <a:ln>
+              <a:solidFill>
+                <a:srgbClr val="00B0F0"/>
+              </a:solidFill>
+            </a:ln>
+          </p:spPr>
+          <p:style>
+            <a:lnRef idx="2">
+              <a:schemeClr val="accent1">
+                <a:shade val="50000"/>
+              </a:schemeClr>
+            </a:lnRef>
+            <a:fillRef idx="1">
+              <a:schemeClr val="accent1"/>
+            </a:fillRef>
+            <a:effectRef idx="0">
+              <a:schemeClr val="accent1"/>
+            </a:effectRef>
+            <a:fontRef idx="minor">
+              <a:schemeClr val="lt1"/>
+            </a:fontRef>
+          </p:style>
+          <p:txBody>
+            <a:bodyPr rtlCol="0" anchor="ctr"/>
+            <a:lstStyle/>
+            <a:p>
+              <a:pPr algn="ctr"/>
+              <a:endParaRPr lang="ru-RU"/>
+            </a:p>
+          </p:txBody>
+        </p:sp>
+        <p:sp>
+          <p:nvSpPr>
+            <p:cNvPr id="6" name="Rectangle 5"/>
+            <p:cNvSpPr/>
+            <p:nvPr/>
+          </p:nvSpPr>
+          <p:spPr>
+            <a:xfrm>
+              <a:off x="2108088" y="4099831"/>
+              <a:ext cx="9728780" cy="1200329"/>
+            </a:xfrm>
+            <a:prstGeom prst="rect">
+              <a:avLst/>
+            </a:prstGeom>
+          </p:spPr>
+          <p:txBody>
+            <a:bodyPr wrap="square">
+              <a:spAutoFit/>
+            </a:bodyPr>
+            <a:lstStyle/>
+            <a:p>
+              <a:r>
+                <a:rPr lang="en-US" sz="2400" dirty="0"/>
+                <a:t>	</a:t>
+              </a:r>
+              <a:r>
+                <a:rPr lang="en-US" sz="2400" dirty="0" smtClean="0"/>
+                <a:t>“</a:t>
+              </a:r>
+              <a:r>
+                <a:rPr lang="en-US" sz="2400" dirty="0"/>
+                <a:t>Microsoft Azure Traffic Manager allows </a:t>
+              </a:r>
+              <a:r>
+                <a:rPr lang="en-US" sz="2400" dirty="0" smtClean="0"/>
+                <a:t>to </a:t>
+              </a:r>
+              <a:r>
+                <a:rPr lang="en-US" sz="2400" dirty="0"/>
+                <a:t>control the distribution of user traffic to </a:t>
+              </a:r>
+              <a:r>
+                <a:rPr lang="en-US" sz="2400" dirty="0" smtClean="0"/>
+                <a:t>specified </a:t>
+              </a:r>
+              <a:r>
+                <a:rPr lang="en-US" sz="2400" dirty="0"/>
+                <a:t>endpoints, which can include Azure cloud services, websites, and other </a:t>
+              </a:r>
+              <a:r>
+                <a:rPr lang="en-US" sz="2400" dirty="0" smtClean="0"/>
+                <a:t>endpoints.”</a:t>
+              </a:r>
+              <a:endParaRPr lang="en-US" sz="2400" dirty="0"/>
+            </a:p>
+          </p:txBody>
+        </p:sp>
+      </p:grpSp>
+      <p:grpSp>
+        <p:nvGrpSpPr>
+          <p:cNvPr id="8" name="Group 7"/>
+          <p:cNvGrpSpPr/>
+          <p:nvPr/>
+        </p:nvGrpSpPr>
+        <p:grpSpPr>
+          <a:xfrm>
+            <a:off x="1703512" y="3212976"/>
+            <a:ext cx="10056560" cy="1584176"/>
+            <a:chOff x="1780308" y="4012490"/>
+            <a:chExt cx="10056560" cy="1584176"/>
+          </a:xfrm>
+        </p:grpSpPr>
+        <p:sp>
+          <p:nvSpPr>
+            <p:cNvPr id="9" name="Rounded Rectangle 8"/>
+            <p:cNvSpPr/>
+            <p:nvPr/>
+          </p:nvSpPr>
+          <p:spPr>
+            <a:xfrm>
+              <a:off x="1780308" y="4012490"/>
+              <a:ext cx="10009112" cy="1584176"/>
+            </a:xfrm>
+            <a:prstGeom prst="roundRect">
+              <a:avLst/>
+            </a:prstGeom>
+            <a:solidFill>
+              <a:schemeClr val="bg1">
+                <a:lumMod val="95000"/>
+              </a:schemeClr>
+            </a:solidFill>
+            <a:ln>
+              <a:solidFill>
+                <a:srgbClr val="00B0F0"/>
+              </a:solidFill>
+            </a:ln>
+          </p:spPr>
+          <p:style>
+            <a:lnRef idx="2">
+              <a:schemeClr val="accent1">
+                <a:shade val="50000"/>
+              </a:schemeClr>
+            </a:lnRef>
+            <a:fillRef idx="1">
+              <a:schemeClr val="accent1"/>
+            </a:fillRef>
+            <a:effectRef idx="0">
+              <a:schemeClr val="accent1"/>
+            </a:effectRef>
+            <a:fontRef idx="minor">
+              <a:schemeClr val="lt1"/>
+            </a:fontRef>
+          </p:style>
+          <p:txBody>
+            <a:bodyPr rtlCol="0" anchor="ctr"/>
+            <a:lstStyle/>
+            <a:p>
+              <a:pPr algn="ctr"/>
+              <a:endParaRPr lang="ru-RU"/>
+            </a:p>
+          </p:txBody>
+        </p:sp>
+        <p:sp>
+          <p:nvSpPr>
+            <p:cNvPr id="10" name="Rectangle 9"/>
+            <p:cNvSpPr/>
+            <p:nvPr/>
+          </p:nvSpPr>
+          <p:spPr>
+            <a:xfrm>
+              <a:off x="2108088" y="4180312"/>
+              <a:ext cx="9728780" cy="1200329"/>
+            </a:xfrm>
+            <a:prstGeom prst="rect">
+              <a:avLst/>
+            </a:prstGeom>
+          </p:spPr>
+          <p:txBody>
+            <a:bodyPr wrap="square">
+              <a:spAutoFit/>
+            </a:bodyPr>
+            <a:lstStyle/>
+            <a:p>
+              <a:r>
+                <a:rPr lang="en-US" sz="2400" dirty="0"/>
+                <a:t>	</a:t>
+              </a:r>
+              <a:r>
+                <a:rPr lang="en-US" sz="2400" dirty="0" smtClean="0"/>
+                <a:t>“Traffic </a:t>
+              </a:r>
+              <a:r>
+                <a:rPr lang="en-US" sz="2400" dirty="0"/>
+                <a:t>Manager works by applying an intelligent policy engine to Domain Name System (DNS) queries for the domain names of </a:t>
+              </a:r>
+              <a:r>
+                <a:rPr lang="en-US" sz="2400" dirty="0" smtClean="0"/>
+                <a:t>Internet </a:t>
+              </a:r>
+              <a:r>
+                <a:rPr lang="en-US" sz="2400" dirty="0"/>
+                <a:t>resources</a:t>
+              </a:r>
+              <a:r>
+                <a:rPr lang="en-US" sz="2400" dirty="0" smtClean="0"/>
+                <a:t>.”</a:t>
+              </a:r>
+              <a:endParaRPr lang="en-US" sz="2400" dirty="0"/>
+            </a:p>
+          </p:txBody>
+        </p:sp>
+      </p:grpSp>
+    </p:spTree>
+    <p:extLst>
+      <p:ext uri="{BB962C8B-B14F-4D97-AF65-F5344CB8AC3E}">
+        <p14:creationId xmlns:p14="http://schemas.microsoft.com/office/powerpoint/2010/main" val="3205957728"/>
       </p:ext>
     </p:extLst>
   </p:cSld>
@@ -42659,7 +40891,7 @@
                             </p:stCondLst>
                             <p:childTnLst>
                               <p:par>
-                                <p:cTn id="5" presetID="10" presetClass="entr" presetSubtype="0" fill="hold" nodeType="withEffect">
+                                <p:cTn id="5" presetID="22" presetClass="entr" presetSubtype="1" fill="hold" nodeType="afterEffect">
                                   <p:stCondLst>
                                     <p:cond delay="0"/>
                                   </p:stCondLst>
@@ -42672,7 +40904,7 @@
                                           </p:stCondLst>
                                         </p:cTn>
                                         <p:tgtEl>
-                                          <p:spTgt spid="2"/>
+                                          <p:spTgt spid="4"/>
                                         </p:tgtEl>
                                         <p:attrNameLst>
                                           <p:attrName>style.visibility</p:attrName>
@@ -42682,11 +40914,55 @@
                                         <p:strVal val="visible"/>
                                       </p:to>
                                     </p:set>
-                                    <p:animEffect transition="in" filter="fade">
+                                    <p:animEffect transition="in" filter="wipe(up)">
                                       <p:cBhvr>
                                         <p:cTn id="7" dur="1000"/>
                                         <p:tgtEl>
-                                          <p:spTgt spid="2"/>
+                                          <p:spTgt spid="4"/>
+                                        </p:tgtEl>
+                                      </p:cBhvr>
+                                    </p:animEffect>
+                                  </p:childTnLst>
+                                </p:cTn>
+                              </p:par>
+                            </p:childTnLst>
+                          </p:cTn>
+                        </p:par>
+                        <p:par>
+                          <p:cTn id="8" fill="hold">
+                            <p:stCondLst>
+                              <p:cond delay="1000"/>
+                            </p:stCondLst>
+                            <p:childTnLst>
+                              <p:par>
+                                <p:cTn id="9" presetID="22" presetClass="entr" presetSubtype="1" fill="hold" nodeType="afterEffect">
+                                  <p:stCondLst>
+                                    <p:cond delay="0"/>
+                                  </p:stCondLst>
+                                  <p:childTnLst>
+                                    <p:set>
+                                      <p:cBhvr>
+                                        <p:cTn id="10" dur="1" fill="hold">
+                                          <p:stCondLst>
+                                            <p:cond delay="0"/>
+                                          </p:stCondLst>
+                                        </p:cTn>
+                                        <p:tgtEl>
+                                          <p:spTgt spid="8"/>
+                                        </p:tgtEl>
+                                        <p:attrNameLst>
+                                          <p:attrName>style.visibility</p:attrName>
+                                        </p:attrNameLst>
+                                      </p:cBhvr>
+                                      <p:to>
+                                        <p:strVal val="visible"/>
+                                      </p:to>
+                                    </p:set>
+                                    <p:animEffect transition="in" filter="wipe(up)">
+                                      <p:cBhvr>
+                                        <p:cTn id="11" dur="1000"/>
+                                        <p:tgtEl>
+                                          <p:spTgt spid="8"/>
                                         </p:tgtEl>
                                       </p:cBhvr>
                                     </p:animEffect>
@@ -42756,17 +41032,13 @@
           <a:bodyPr/>
           <a:lstStyle/>
           <a:p>
-            <a:r>
-              <a:rPr lang="en-US" dirty="0" smtClean="0"/>
-              <a:t>Create Database</a:t>
-            </a:r>
-            <a:endParaRPr lang="ru-RU" dirty="0"/>
+            <a:endParaRPr lang="ru-RU"/>
           </a:p>
         </p:txBody>
       </p:sp>
       <p:sp>
         <p:nvSpPr>
-          <p:cNvPr id="3" name="Content Placeholder 2"/>
+          <p:cNvPr id="4" name="Content Placeholder 2"/>
           <p:cNvSpPr>
             <a:spLocks noGrp="1"/>
           </p:cNvSpPr>
@@ -42779,9 +41051,63 @@
           <a:bodyPr/>
           <a:lstStyle/>
           <a:p>
+            <a:pPr>
+              <a:lnSpc>
+                <a:spcPct val="150000"/>
+              </a:lnSpc>
+            </a:pPr>
             <a:r>
-              <a:rPr lang="en-US" cap="all" dirty="0"/>
-              <a:t>DATABASE THROUGHPUT UNITS</a:t>
+              <a:rPr lang="en-US" dirty="0"/>
+              <a:t>Improve availability of critical </a:t>
+            </a:r>
+            <a:r>
+              <a:rPr lang="en-US" dirty="0" smtClean="0"/>
+              <a:t>applications</a:t>
+            </a:r>
+          </a:p>
+          <a:p>
+            <a:pPr>
+              <a:lnSpc>
+                <a:spcPct val="150000"/>
+              </a:lnSpc>
+            </a:pPr>
+            <a:r>
+              <a:rPr lang="en-US" dirty="0"/>
+              <a:t>Improve responsiveness for high performing </a:t>
+            </a:r>
+            <a:r>
+              <a:rPr lang="en-US" dirty="0" smtClean="0"/>
+              <a:t>applications</a:t>
+            </a:r>
+          </a:p>
+          <a:p>
+            <a:pPr>
+              <a:lnSpc>
+                <a:spcPct val="150000"/>
+              </a:lnSpc>
+            </a:pPr>
+            <a:r>
+              <a:rPr lang="en-US" dirty="0"/>
+              <a:t>Upgrade and perform service maintenance without </a:t>
+            </a:r>
+            <a:r>
+              <a:rPr lang="en-US" dirty="0" smtClean="0"/>
+              <a:t>downtime</a:t>
+            </a:r>
+          </a:p>
+          <a:p>
+            <a:pPr>
+              <a:lnSpc>
+                <a:spcPct val="150000"/>
+              </a:lnSpc>
+            </a:pPr>
+            <a:r>
+              <a:rPr lang="en-US" dirty="0"/>
+              <a:t>Traffic distribution for large, complex </a:t>
+            </a:r>
+            <a:r>
+              <a:rPr lang="en-US" dirty="0" smtClean="0"/>
+              <a:t>deployments</a:t>
             </a:r>
             <a:endParaRPr lang="ru-RU" dirty="0"/>
           </a:p>
@@ -42790,7 +41116,7 @@
     </p:spTree>
     <p:extLst>
       <p:ext uri="{BB962C8B-B14F-4D97-AF65-F5344CB8AC3E}">
-        <p14:creationId xmlns:p14="http://schemas.microsoft.com/office/powerpoint/2010/main" val="3065126308"/>
+        <p14:creationId xmlns:p14="http://schemas.microsoft.com/office/powerpoint/2010/main" val="2420351876"/>
       </p:ext>
     </p:extLst>
   </p:cSld>
@@ -43216,6 +41542,272 @@
       </p:grpSpPr>
       <p:sp>
         <p:nvSpPr>
+          <p:cNvPr id="4" name="Title 3"/>
+          <p:cNvSpPr>
+            <a:spLocks noGrp="1"/>
+          </p:cNvSpPr>
+          <p:nvPr>
+            <p:ph type="title"/>
+          </p:nvPr>
+        </p:nvSpPr>
+        <p:spPr>
+          <a:xfrm>
+            <a:off x="1415480" y="4406903"/>
+            <a:ext cx="10776520" cy="1362075"/>
+          </a:xfrm>
+        </p:spPr>
+        <p:txBody>
+          <a:bodyPr/>
+          <a:lstStyle/>
+          <a:p>
+            <a:pPr algn="ctr"/>
+            <a:r>
+              <a:rPr lang="en-US" dirty="0" smtClean="0">
+                <a:solidFill>
+                  <a:srgbClr val="00B0F0"/>
+                </a:solidFill>
+              </a:rPr>
+              <a:t>SQL Databases</a:t>
+            </a:r>
+            <a:endParaRPr lang="ru-RU" dirty="0">
+              <a:solidFill>
+                <a:srgbClr val="00B0F0"/>
+              </a:solidFill>
+            </a:endParaRPr>
+          </a:p>
+        </p:txBody>
+      </p:sp>
+      <p:pic>
+        <p:nvPicPr>
+          <p:cNvPr id="2" name="Picture 1"/>
+          <p:cNvPicPr>
+            <a:picLocks noChangeAspect="1"/>
+          </p:cNvPicPr>
+          <p:nvPr/>
+        </p:nvPicPr>
+        <p:blipFill>
+          <a:blip r:embed="rId2">
+            <a:extLst>
+              <a:ext uri="{28A0092B-C50C-407E-A947-70E740481C1C}">
+                <a14:useLocalDpi xmlns:a14="http://schemas.microsoft.com/office/drawing/2010/main" val="0"/>
+              </a:ext>
+            </a:extLst>
+          </a:blip>
+          <a:stretch>
+            <a:fillRect/>
+          </a:stretch>
+        </p:blipFill>
+        <p:spPr>
+          <a:xfrm>
+            <a:off x="6069453" y="2060848"/>
+            <a:ext cx="2032176" cy="2123624"/>
+          </a:xfrm>
+          <a:prstGeom prst="rect">
+            <a:avLst/>
+          </a:prstGeom>
+        </p:spPr>
+      </p:pic>
+    </p:spTree>
+    <p:extLst>
+      <p:ext uri="{BB962C8B-B14F-4D97-AF65-F5344CB8AC3E}">
+        <p14:creationId xmlns:p14="http://schemas.microsoft.com/office/powerpoint/2010/main" val="1442076319"/>
+      </p:ext>
+    </p:extLst>
+  </p:cSld>
+  <p:clrMapOvr>
+    <a:masterClrMapping/>
+  </p:clrMapOvr>
+  <p:timing>
+    <p:tnLst>
+      <p:par>
+        <p:cTn id="1" dur="indefinite" restart="never" nodeType="tmRoot">
+          <p:childTnLst>
+            <p:seq concurrent="1" nextAc="seek">
+              <p:cTn id="2" dur="indefinite" nodeType="mainSeq">
+                <p:childTnLst>
+                  <p:par>
+                    <p:cTn id="3" fill="hold">
+                      <p:stCondLst>
+                        <p:cond delay="indefinite"/>
+                        <p:cond evt="onBegin" delay="0">
+                          <p:tn val="2"/>
+                        </p:cond>
+                      </p:stCondLst>
+                      <p:childTnLst>
+                        <p:par>
+                          <p:cTn id="4" fill="hold">
+                            <p:stCondLst>
+                              <p:cond delay="0"/>
+                            </p:stCondLst>
+                            <p:childTnLst>
+                              <p:par>
+                                <p:cTn id="5" presetID="10" presetClass="entr" presetSubtype="0" fill="hold" nodeType="withEffect">
+                                  <p:stCondLst>
+                                    <p:cond delay="0"/>
+                                  </p:stCondLst>
+                                  <p:childTnLst>
+                                    <p:set>
+                                      <p:cBhvr>
+                                        <p:cTn id="6" dur="1" fill="hold">
+                                          <p:stCondLst>
+                                            <p:cond delay="0"/>
+                                          </p:stCondLst>
+                                        </p:cTn>
+                                        <p:tgtEl>
+                                          <p:spTgt spid="2"/>
+                                        </p:tgtEl>
+                                        <p:attrNameLst>
+                                          <p:attrName>style.visibility</p:attrName>
+                                        </p:attrNameLst>
+                                      </p:cBhvr>
+                                      <p:to>
+                                        <p:strVal val="visible"/>
+                                      </p:to>
+                                    </p:set>
+                                    <p:animEffect transition="in" filter="fade">
+                                      <p:cBhvr>
+                                        <p:cTn id="7" dur="1000"/>
+                                        <p:tgtEl>
+                                          <p:spTgt spid="2"/>
+                                        </p:tgtEl>
+                                      </p:cBhvr>
+                                    </p:animEffect>
+                                  </p:childTnLst>
+                                </p:cTn>
+                              </p:par>
+                            </p:childTnLst>
+                          </p:cTn>
+                        </p:par>
+                      </p:childTnLst>
+                    </p:cTn>
+                  </p:par>
+                </p:childTnLst>
+              </p:cTn>
+              <p:prevCondLst>
+                <p:cond evt="onPrev" delay="0">
+                  <p:tgtEl>
+                    <p:sldTgt/>
+                  </p:tgtEl>
+                </p:cond>
+              </p:prevCondLst>
+              <p:nextCondLst>
+                <p:cond evt="onNext" delay="0">
+                  <p:tgtEl>
+                    <p:sldTgt/>
+                  </p:tgtEl>
+                </p:cond>
+              </p:nextCondLst>
+            </p:seq>
+          </p:childTnLst>
+        </p:cTn>
+      </p:par>
+    </p:tnLst>
+  </p:timing>
+</p:sld>
+</file>
+
+<file path=ppt/slides/slide31.xml><?xml version="1.0" encoding="utf-8"?>
+<p:sld xmlns:a="http://schemas.openxmlformats.org/drawingml/2006/main" xmlns:r="http://schemas.openxmlformats.org/officeDocument/2006/relationships" xmlns:p="http://schemas.openxmlformats.org/presentationml/2006/main">
+  <p:cSld>
+    <p:spTree>
+      <p:nvGrpSpPr>
+        <p:cNvPr id="1" name=""/>
+        <p:cNvGrpSpPr/>
+        <p:nvPr/>
+      </p:nvGrpSpPr>
+      <p:grpSpPr>
+        <a:xfrm>
+          <a:off x="0" y="0"/>
+          <a:ext cx="0" cy="0"/>
+          <a:chOff x="0" y="0"/>
+          <a:chExt cx="0" cy="0"/>
+        </a:xfrm>
+      </p:grpSpPr>
+      <p:sp>
+        <p:nvSpPr>
+          <p:cNvPr id="2" name="Title 1"/>
+          <p:cNvSpPr>
+            <a:spLocks noGrp="1"/>
+          </p:cNvSpPr>
+          <p:nvPr>
+            <p:ph type="title"/>
+          </p:nvPr>
+        </p:nvSpPr>
+        <p:spPr/>
+        <p:txBody>
+          <a:bodyPr/>
+          <a:lstStyle/>
+          <a:p>
+            <a:r>
+              <a:rPr lang="en-US" dirty="0" smtClean="0"/>
+              <a:t>Create Database</a:t>
+            </a:r>
+            <a:endParaRPr lang="ru-RU" dirty="0"/>
+          </a:p>
+        </p:txBody>
+      </p:sp>
+      <p:sp>
+        <p:nvSpPr>
+          <p:cNvPr id="3" name="Content Placeholder 2"/>
+          <p:cNvSpPr>
+            <a:spLocks noGrp="1"/>
+          </p:cNvSpPr>
+          <p:nvPr>
+            <p:ph idx="1"/>
+          </p:nvPr>
+        </p:nvSpPr>
+        <p:spPr/>
+        <p:txBody>
+          <a:bodyPr/>
+          <a:lstStyle/>
+          <a:p>
+            <a:r>
+              <a:rPr lang="en-US" cap="all" dirty="0"/>
+              <a:t>DATABASE THROUGHPUT UNITS</a:t>
+            </a:r>
+            <a:endParaRPr lang="ru-RU" dirty="0"/>
+          </a:p>
+        </p:txBody>
+      </p:sp>
+    </p:spTree>
+    <p:extLst>
+      <p:ext uri="{BB962C8B-B14F-4D97-AF65-F5344CB8AC3E}">
+        <p14:creationId xmlns:p14="http://schemas.microsoft.com/office/powerpoint/2010/main" val="3065126308"/>
+      </p:ext>
+    </p:extLst>
+  </p:cSld>
+  <p:clrMapOvr>
+    <a:masterClrMapping/>
+  </p:clrMapOvr>
+  <p:timing>
+    <p:tnLst>
+      <p:par>
+        <p:cTn id="1" dur="indefinite" restart="never" nodeType="tmRoot"/>
+      </p:par>
+    </p:tnLst>
+  </p:timing>
+</p:sld>
+</file>
+
+<file path=ppt/slides/slide32.xml><?xml version="1.0" encoding="utf-8"?>
+<p:sld xmlns:a="http://schemas.openxmlformats.org/drawingml/2006/main" xmlns:r="http://schemas.openxmlformats.org/officeDocument/2006/relationships" xmlns:p="http://schemas.openxmlformats.org/presentationml/2006/main">
+  <p:cSld>
+    <p:spTree>
+      <p:nvGrpSpPr>
+        <p:cNvPr id="1" name=""/>
+        <p:cNvGrpSpPr/>
+        <p:nvPr/>
+      </p:nvGrpSpPr>
+      <p:grpSpPr>
+        <a:xfrm>
+          <a:off x="0" y="0"/>
+          <a:ext cx="0" cy="0"/>
+          <a:chOff x="0" y="0"/>
+          <a:chExt cx="0" cy="0"/>
+        </a:xfrm>
+      </p:grpSpPr>
+      <p:sp>
+        <p:nvSpPr>
           <p:cNvPr id="2" name="Title 1"/>
           <p:cNvSpPr>
             <a:spLocks noGrp="1"/>
@@ -43298,7 +41890,7 @@
 </p:sld>
 </file>
 
-<file path=ppt/slides/slide31.xml><?xml version="1.0" encoding="utf-8"?>
+<file path=ppt/slides/slide33.xml><?xml version="1.0" encoding="utf-8"?>
 <p:sld xmlns:a="http://schemas.openxmlformats.org/drawingml/2006/main" xmlns:r="http://schemas.openxmlformats.org/officeDocument/2006/relationships" xmlns:p="http://schemas.openxmlformats.org/presentationml/2006/main">
   <p:cSld>
     <p:spTree>
@@ -43358,7 +41950,7 @@
 </p:sld>
 </file>
 
-<file path=ppt/slides/slide32.xml><?xml version="1.0" encoding="utf-8"?>
+<file path=ppt/slides/slide34.xml><?xml version="1.0" encoding="utf-8"?>
 <p:sld xmlns:a="http://schemas.openxmlformats.org/drawingml/2006/main" xmlns:r="http://schemas.openxmlformats.org/officeDocument/2006/relationships" xmlns:p="http://schemas.openxmlformats.org/presentationml/2006/main">
   <p:cSld>
     <p:spTree>
@@ -43426,7 +42018,7 @@
 </p:sld>
 </file>
 
-<file path=ppt/slides/slide33.xml><?xml version="1.0" encoding="utf-8"?>
+<file path=ppt/slides/slide35.xml><?xml version="1.0" encoding="utf-8"?>
 <p:sld xmlns:a="http://schemas.openxmlformats.org/drawingml/2006/main" xmlns:r="http://schemas.openxmlformats.org/officeDocument/2006/relationships" xmlns:p="http://schemas.openxmlformats.org/presentationml/2006/main">
   <p:cSld>
     <p:spTree>
@@ -44073,7 +42665,7 @@
 </p:sld>
 </file>
 
-<file path=ppt/slides/slide34.xml><?xml version="1.0" encoding="utf-8"?>
+<file path=ppt/slides/slide36.xml><?xml version="1.0" encoding="utf-8"?>
 <p:sld xmlns:a="http://schemas.openxmlformats.org/drawingml/2006/main" xmlns:r="http://schemas.openxmlformats.org/officeDocument/2006/relationships" xmlns:p="http://schemas.openxmlformats.org/presentationml/2006/main">
   <p:cSld>
     <p:spTree>

</xml_diff>